<commit_message>
add ranger for rf
</commit_message>
<xml_diff>
--- a/Lessons/F_Tree_RF/B_Decision Trees.pptx
+++ b/Lessons/F_Tree_RF/B_Decision Trees.pptx
@@ -5,7 +5,7 @@
     <p:sldMasterId id="2147483660" r:id="rId1"/>
   </p:sldMasterIdLst>
   <p:notesMasterIdLst>
-    <p:notesMasterId r:id="rId36"/>
+    <p:notesMasterId r:id="rId35"/>
   </p:notesMasterIdLst>
   <p:sldIdLst>
     <p:sldId id="297" r:id="rId2"/>
@@ -21,27 +21,26 @@
     <p:sldId id="307" r:id="rId12"/>
     <p:sldId id="308" r:id="rId13"/>
     <p:sldId id="310" r:id="rId14"/>
-    <p:sldId id="301" r:id="rId15"/>
-    <p:sldId id="311" r:id="rId16"/>
-    <p:sldId id="321" r:id="rId17"/>
-    <p:sldId id="312" r:id="rId18"/>
-    <p:sldId id="313" r:id="rId19"/>
-    <p:sldId id="314" r:id="rId20"/>
-    <p:sldId id="315" r:id="rId21"/>
-    <p:sldId id="316" r:id="rId22"/>
-    <p:sldId id="322" r:id="rId23"/>
-    <p:sldId id="323" r:id="rId24"/>
-    <p:sldId id="324" r:id="rId25"/>
-    <p:sldId id="325" r:id="rId26"/>
-    <p:sldId id="319" r:id="rId27"/>
-    <p:sldId id="341" r:id="rId28"/>
-    <p:sldId id="342" r:id="rId29"/>
-    <p:sldId id="343" r:id="rId30"/>
-    <p:sldId id="344" r:id="rId31"/>
-    <p:sldId id="345" r:id="rId32"/>
-    <p:sldId id="371" r:id="rId33"/>
-    <p:sldId id="329" r:id="rId34"/>
-    <p:sldId id="361" r:id="rId35"/>
+    <p:sldId id="311" r:id="rId15"/>
+    <p:sldId id="321" r:id="rId16"/>
+    <p:sldId id="312" r:id="rId17"/>
+    <p:sldId id="313" r:id="rId18"/>
+    <p:sldId id="314" r:id="rId19"/>
+    <p:sldId id="315" r:id="rId20"/>
+    <p:sldId id="316" r:id="rId21"/>
+    <p:sldId id="322" r:id="rId22"/>
+    <p:sldId id="323" r:id="rId23"/>
+    <p:sldId id="324" r:id="rId24"/>
+    <p:sldId id="325" r:id="rId25"/>
+    <p:sldId id="319" r:id="rId26"/>
+    <p:sldId id="341" r:id="rId27"/>
+    <p:sldId id="342" r:id="rId28"/>
+    <p:sldId id="343" r:id="rId29"/>
+    <p:sldId id="344" r:id="rId30"/>
+    <p:sldId id="345" r:id="rId31"/>
+    <p:sldId id="371" r:id="rId32"/>
+    <p:sldId id="329" r:id="rId33"/>
+    <p:sldId id="361" r:id="rId34"/>
   </p:sldIdLst>
   <p:sldSz cx="9144000" cy="6858000" type="screen4x3"/>
   <p:notesSz cx="6858000" cy="9144000"/>
@@ -244,7 +243,7 @@
           <a:p>
             <a:fld id="{B0C0A60C-850A-4EA4-9C14-A8FE98B94505}" type="datetimeFigureOut">
               <a:rPr lang="en-US" smtClean="0"/>
-              <a:t>10/23/23</a:t>
+              <a:t>10/21/24</a:t>
             </a:fld>
             <a:endParaRPr lang="en-US"/>
           </a:p>
@@ -985,7 +984,7 @@
                 </a:spcAft>
                 <a:defRPr/>
               </a:pPr>
-              <a:t>26</a:t>
+              <a:t>25</a:t>
             </a:fld>
             <a:endParaRPr lang="en-US">
               <a:cs typeface="Arial" charset="0"/>
@@ -1138,7 +1137,7 @@
           <a:p>
             <a:fld id="{5738B90E-0779-4C36-915C-6F05FCD89456}" type="datetime1">
               <a:rPr lang="en-US" smtClean="0"/>
-              <a:t>10/23/23</a:t>
+              <a:t>10/21/24</a:t>
             </a:fld>
             <a:endParaRPr lang="en-US"/>
           </a:p>
@@ -1356,7 +1355,7 @@
           <a:p>
             <a:fld id="{7B9EA29D-D431-42FE-B7B6-AAE4454C77D3}" type="datetime1">
               <a:rPr lang="en-US" smtClean="0"/>
-              <a:t>10/23/23</a:t>
+              <a:t>10/21/24</a:t>
             </a:fld>
             <a:endParaRPr lang="en-US"/>
           </a:p>
@@ -1616,7 +1615,7 @@
           <a:p>
             <a:fld id="{690D8A1E-EA8F-46C1-B891-AE0C00D9C314}" type="datetime1">
               <a:rPr lang="en-US" smtClean="0"/>
-              <a:t>10/23/23</a:t>
+              <a:t>10/21/24</a:t>
             </a:fld>
             <a:endParaRPr lang="en-US"/>
           </a:p>
@@ -1910,7 +1909,7 @@
           <a:p>
             <a:fld id="{D753EFC8-4232-4598-94F6-94C0EBAFC469}" type="datetime1">
               <a:rPr lang="en-US" smtClean="0"/>
-              <a:t>10/23/23</a:t>
+              <a:t>10/21/24</a:t>
             </a:fld>
             <a:endParaRPr lang="en-US"/>
           </a:p>
@@ -2225,7 +2224,7 @@
           <a:p>
             <a:fld id="{F3161074-1C18-4AE7-957D-F18524378C85}" type="datetime1">
               <a:rPr lang="en-US" smtClean="0"/>
-              <a:t>10/23/23</a:t>
+              <a:t>10/21/24</a:t>
             </a:fld>
             <a:endParaRPr lang="en-US"/>
           </a:p>
@@ -2499,7 +2498,7 @@
           <a:p>
             <a:fld id="{69BE256C-8D9A-4404-B47D-41A1AE514425}" type="datetime1">
               <a:rPr lang="en-US" smtClean="0"/>
-              <a:t>10/23/23</a:t>
+              <a:t>10/21/24</a:t>
             </a:fld>
             <a:endParaRPr lang="en-US"/>
           </a:p>
@@ -2933,7 +2932,7 @@
           <a:p>
             <a:fld id="{66CB2154-9035-4012-8189-BAAB61C5A5EE}" type="datetime1">
               <a:rPr lang="en-US" smtClean="0"/>
-              <a:t>10/23/23</a:t>
+              <a:t>10/21/24</a:t>
             </a:fld>
             <a:endParaRPr lang="en-US"/>
           </a:p>
@@ -3107,7 +3106,7 @@
           <a:p>
             <a:fld id="{6700A58B-DD98-43D0-B791-721480A02982}" type="datetime1">
               <a:rPr lang="en-US" smtClean="0"/>
-              <a:t>10/23/23</a:t>
+              <a:t>10/21/24</a:t>
             </a:fld>
             <a:endParaRPr lang="en-US"/>
           </a:p>
@@ -3299,7 +3298,7 @@
           <a:p>
             <a:fld id="{7DB6E382-4F61-4E24-BE1A-377EC83D0E3A}" type="datetime1">
               <a:rPr lang="en-US" smtClean="0"/>
-              <a:t>10/23/23</a:t>
+              <a:t>10/21/24</a:t>
             </a:fld>
             <a:endParaRPr lang="en-US"/>
           </a:p>
@@ -3610,7 +3609,7 @@
           <a:p>
             <a:fld id="{4142EED6-FC16-45B9-B8C4-2BC5DBA88325}" type="datetime1">
               <a:rPr lang="en-US" smtClean="0"/>
-              <a:t>10/23/23</a:t>
+              <a:t>10/21/24</a:t>
             </a:fld>
             <a:endParaRPr lang="en-US"/>
           </a:p>
@@ -3928,7 +3927,7 @@
           <a:p>
             <a:fld id="{DF59512B-4F1D-43D7-8819-2F53FEF69650}" type="datetime1">
               <a:rPr lang="en-US" smtClean="0"/>
-              <a:t>10/23/23</a:t>
+              <a:t>10/21/24</a:t>
             </a:fld>
             <a:endParaRPr lang="en-US"/>
           </a:p>
@@ -4204,7 +4203,7 @@
           <a:p>
             <a:fld id="{08437B94-E2BF-44DC-ADC5-B05FC9934E9D}" type="datetime1">
               <a:rPr lang="en-US" smtClean="0"/>
-              <a:t>10/23/23</a:t>
+              <a:t>10/21/24</a:t>
             </a:fld>
             <a:endParaRPr lang="en-US"/>
           </a:p>
@@ -4724,7 +4723,7 @@
           <a:p>
             <a:fld id="{5738B90E-0779-4C36-915C-6F05FCD89456}" type="datetime1">
               <a:rPr lang="en-US" smtClean="0"/>
-              <a:t>10/23/23</a:t>
+              <a:t>10/21/24</a:t>
             </a:fld>
             <a:endParaRPr lang="en-US"/>
           </a:p>
@@ -4840,7 +4839,7 @@
           <a:p>
             <a:fld id="{6700A58B-DD98-43D0-B791-721480A02982}" type="datetime1">
               <a:rPr lang="en-US" smtClean="0"/>
-              <a:t>10/23/23</a:t>
+              <a:t>10/21/24</a:t>
             </a:fld>
             <a:endParaRPr lang="en-US"/>
           </a:p>
@@ -5194,7 +5193,7 @@
           <a:p>
             <a:fld id="{6700A58B-DD98-43D0-B791-721480A02982}" type="datetime1">
               <a:rPr lang="en-US" smtClean="0"/>
-              <a:t>10/23/23</a:t>
+              <a:t>10/21/24</a:t>
             </a:fld>
             <a:endParaRPr lang="en-US"/>
           </a:p>
@@ -5489,7 +5488,7 @@
           <a:p>
             <a:fld id="{6700A58B-DD98-43D0-B791-721480A02982}" type="datetime1">
               <a:rPr lang="en-US" smtClean="0"/>
-              <a:t>10/23/23</a:t>
+              <a:t>10/21/24</a:t>
             </a:fld>
             <a:endParaRPr lang="en-US"/>
           </a:p>
@@ -5784,7 +5783,7 @@
           <a:p>
             <a:fld id="{6700A58B-DD98-43D0-B791-721480A02982}" type="datetime1">
               <a:rPr lang="en-US" smtClean="0"/>
-              <a:t>10/23/23</a:t>
+              <a:t>10/21/24</a:t>
             </a:fld>
             <a:endParaRPr lang="en-US"/>
           </a:p>
@@ -6178,350 +6177,6 @@
 </file>
 
 <file path=ppt/slides/slide14.xml><?xml version="1.0" encoding="utf-8"?>
-<p:sld xmlns:a="http://schemas.openxmlformats.org/drawingml/2006/main" xmlns:r="http://schemas.openxmlformats.org/officeDocument/2006/relationships" xmlns:p="http://schemas.openxmlformats.org/presentationml/2006/main" show="0">
-  <p:cSld>
-    <p:spTree>
-      <p:nvGrpSpPr>
-        <p:cNvPr id="1" name=""/>
-        <p:cNvGrpSpPr/>
-        <p:nvPr/>
-      </p:nvGrpSpPr>
-      <p:grpSpPr>
-        <a:xfrm>
-          <a:off x="0" y="0"/>
-          <a:ext cx="0" cy="0"/>
-          <a:chOff x="0" y="0"/>
-          <a:chExt cx="0" cy="0"/>
-        </a:xfrm>
-      </p:grpSpPr>
-      <p:sp>
-        <p:nvSpPr>
-          <p:cNvPr id="2" name="Date Placeholder 1">
-            <a:extLst>
-              <a:ext uri="{FF2B5EF4-FFF2-40B4-BE49-F238E27FC236}">
-                <a16:creationId xmlns:a16="http://schemas.microsoft.com/office/drawing/2014/main" id="{74C6B2BB-1B0F-4469-9AFE-88BDEA233451}"/>
-              </a:ext>
-            </a:extLst>
-          </p:cNvPr>
-          <p:cNvSpPr>
-            <a:spLocks noGrp="1"/>
-          </p:cNvSpPr>
-          <p:nvPr>
-            <p:ph type="dt" sz="half" idx="10"/>
-          </p:nvPr>
-        </p:nvSpPr>
-        <p:spPr/>
-        <p:txBody>
-          <a:bodyPr/>
-          <a:lstStyle/>
-          <a:p>
-            <a:fld id="{7DB6E382-4F61-4E24-BE1A-377EC83D0E3A}" type="datetime1">
-              <a:rPr lang="en-US" smtClean="0"/>
-              <a:t>10/23/23</a:t>
-            </a:fld>
-            <a:endParaRPr lang="en-US"/>
-          </a:p>
-        </p:txBody>
-      </p:sp>
-      <p:sp>
-        <p:nvSpPr>
-          <p:cNvPr id="3" name="Slide Number Placeholder 2">
-            <a:extLst>
-              <a:ext uri="{FF2B5EF4-FFF2-40B4-BE49-F238E27FC236}">
-                <a16:creationId xmlns:a16="http://schemas.microsoft.com/office/drawing/2014/main" id="{3D0C8680-CB2B-43D3-8BC1-B6B666E89CA2}"/>
-              </a:ext>
-            </a:extLst>
-          </p:cNvPr>
-          <p:cNvSpPr>
-            <a:spLocks noGrp="1"/>
-          </p:cNvSpPr>
-          <p:nvPr>
-            <p:ph type="sldNum" sz="quarter" idx="12"/>
-          </p:nvPr>
-        </p:nvSpPr>
-        <p:spPr/>
-        <p:txBody>
-          <a:bodyPr/>
-          <a:lstStyle/>
-          <a:p>
-            <a:fld id="{37290FF7-652B-4475-AEAB-8B1A5D23AE09}" type="slidenum">
-              <a:rPr lang="en-US" smtClean="0"/>
-              <a:t>14</a:t>
-            </a:fld>
-            <a:endParaRPr lang="en-US"/>
-          </a:p>
-        </p:txBody>
-      </p:sp>
-      <p:sp>
-        <p:nvSpPr>
-          <p:cNvPr id="4" name="Footer Placeholder 3">
-            <a:extLst>
-              <a:ext uri="{FF2B5EF4-FFF2-40B4-BE49-F238E27FC236}">
-                <a16:creationId xmlns:a16="http://schemas.microsoft.com/office/drawing/2014/main" id="{F63ED616-AFA4-4D7B-853F-E90EB22D6C24}"/>
-              </a:ext>
-            </a:extLst>
-          </p:cNvPr>
-          <p:cNvSpPr>
-            <a:spLocks noGrp="1"/>
-          </p:cNvSpPr>
-          <p:nvPr>
-            <p:ph type="ftr" sz="quarter" idx="3"/>
-          </p:nvPr>
-        </p:nvSpPr>
-        <p:spPr/>
-        <p:txBody>
-          <a:bodyPr/>
-          <a:lstStyle/>
-          <a:p>
-            <a:r>
-              <a:rPr lang="en-US" dirty="0"/>
-              <a:t>Kwartler </a:t>
-            </a:r>
-          </a:p>
-        </p:txBody>
-      </p:sp>
-      <p:pic>
-        <p:nvPicPr>
-          <p:cNvPr id="11266" name="Picture 2" descr="Image result for plinko">
-            <a:extLst>
-              <a:ext uri="{FF2B5EF4-FFF2-40B4-BE49-F238E27FC236}">
-                <a16:creationId xmlns:a16="http://schemas.microsoft.com/office/drawing/2014/main" id="{009DA161-9D27-45C3-A99C-439118BE34A4}"/>
-              </a:ext>
-            </a:extLst>
-          </p:cNvPr>
-          <p:cNvPicPr>
-            <a:picLocks noChangeAspect="1" noChangeArrowheads="1"/>
-          </p:cNvPicPr>
-          <p:nvPr/>
-        </p:nvPicPr>
-        <p:blipFill>
-          <a:blip r:embed="rId2">
-            <a:extLst>
-              <a:ext uri="{28A0092B-C50C-407E-A947-70E740481C1C}">
-                <a14:useLocalDpi xmlns:a14="http://schemas.microsoft.com/office/drawing/2010/main" val="0"/>
-              </a:ext>
-            </a:extLst>
-          </a:blip>
-          <a:srcRect/>
-          <a:stretch>
-            <a:fillRect/>
-          </a:stretch>
-        </p:blipFill>
-        <p:spPr bwMode="auto">
-          <a:xfrm>
-            <a:off x="859899" y="1337850"/>
-            <a:ext cx="7424202" cy="4182300"/>
-          </a:xfrm>
-          <a:prstGeom prst="rect">
-            <a:avLst/>
-          </a:prstGeom>
-          <a:noFill/>
-          <a:extLst>
-            <a:ext uri="{909E8E84-426E-40DD-AFC4-6F175D3DCCD1}">
-              <a14:hiddenFill xmlns:a14="http://schemas.microsoft.com/office/drawing/2010/main">
-                <a:solidFill>
-                  <a:srgbClr val="FFFFFF"/>
-                </a:solidFill>
-              </a14:hiddenFill>
-            </a:ext>
-          </a:extLst>
-        </p:spPr>
-      </p:pic>
-      <p:sp>
-        <p:nvSpPr>
-          <p:cNvPr id="6" name="Title 2">
-            <a:extLst>
-              <a:ext uri="{FF2B5EF4-FFF2-40B4-BE49-F238E27FC236}">
-                <a16:creationId xmlns:a16="http://schemas.microsoft.com/office/drawing/2014/main" id="{55AFAFAA-8BE0-4720-B383-5B0D99774A7C}"/>
-              </a:ext>
-            </a:extLst>
-          </p:cNvPr>
-          <p:cNvSpPr txBox="1">
-            <a:spLocks/>
-          </p:cNvSpPr>
-          <p:nvPr/>
-        </p:nvSpPr>
-        <p:spPr>
-          <a:xfrm>
-            <a:off x="628650" y="365126"/>
-            <a:ext cx="7886700" cy="591477"/>
-          </a:xfrm>
-          <a:prstGeom prst="rect">
-            <a:avLst/>
-          </a:prstGeom>
-        </p:spPr>
-        <p:txBody>
-          <a:bodyPr/>
-          <a:lstStyle>
-            <a:lvl1pPr algn="l" defTabSz="685800" rtl="0" eaLnBrk="1" latinLnBrk="0" hangingPunct="1">
-              <a:lnSpc>
-                <a:spcPct val="90000"/>
-              </a:lnSpc>
-              <a:spcBef>
-                <a:spcPct val="0"/>
-              </a:spcBef>
-              <a:buNone/>
-              <a:defRPr sz="3300" kern="1200">
-                <a:solidFill>
-                  <a:schemeClr val="tx1"/>
-                </a:solidFill>
-                <a:latin typeface="+mj-lt"/>
-                <a:ea typeface="+mj-ea"/>
-                <a:cs typeface="+mj-cs"/>
-              </a:defRPr>
-            </a:lvl1pPr>
-          </a:lstStyle>
-          <a:p>
-            <a:r>
-              <a:rPr lang="en-US" dirty="0"/>
-              <a:t>Our rule set is like </a:t>
-            </a:r>
-            <a:r>
-              <a:rPr lang="en-US" dirty="0" err="1"/>
-              <a:t>Plinko</a:t>
-            </a:r>
-            <a:r>
-              <a:rPr lang="en-US" dirty="0"/>
-              <a:t>!</a:t>
-            </a:r>
-          </a:p>
-        </p:txBody>
-      </p:sp>
-      <p:sp>
-        <p:nvSpPr>
-          <p:cNvPr id="7" name="TextBox 6">
-            <a:extLst>
-              <a:ext uri="{FF2B5EF4-FFF2-40B4-BE49-F238E27FC236}">
-                <a16:creationId xmlns:a16="http://schemas.microsoft.com/office/drawing/2014/main" id="{1106C54C-7155-4B9F-B808-185C8ACD5EA5}"/>
-              </a:ext>
-            </a:extLst>
-          </p:cNvPr>
-          <p:cNvSpPr txBox="1"/>
-          <p:nvPr/>
-        </p:nvSpPr>
-        <p:spPr>
-          <a:xfrm>
-            <a:off x="304799" y="5715000"/>
-            <a:ext cx="8729545" cy="424423"/>
-          </a:xfrm>
-          <a:prstGeom prst="rect">
-            <a:avLst/>
-          </a:prstGeom>
-          <a:solidFill>
-            <a:schemeClr val="accent3"/>
-          </a:solidFill>
-          <a:ln>
-            <a:noFill/>
-          </a:ln>
-        </p:spPr>
-        <p:style>
-          <a:lnRef idx="2">
-            <a:schemeClr val="accent1">
-              <a:shade val="50000"/>
-            </a:schemeClr>
-          </a:lnRef>
-          <a:fillRef idx="1">
-            <a:schemeClr val="accent1"/>
-          </a:fillRef>
-          <a:effectRef idx="0">
-            <a:schemeClr val="accent1"/>
-          </a:effectRef>
-          <a:fontRef idx="minor">
-            <a:schemeClr val="lt1"/>
-          </a:fontRef>
-        </p:style>
-        <p:txBody>
-          <a:bodyPr rtlCol="0" anchor="ctr"/>
-          <a:lstStyle>
-            <a:defPPr>
-              <a:defRPr lang="en-US"/>
-            </a:defPPr>
-            <a:lvl1pPr algn="ctr">
-              <a:defRPr sz="1400" i="1">
-                <a:solidFill>
-                  <a:schemeClr val="lt1"/>
-                </a:solidFill>
-              </a:defRPr>
-            </a:lvl1pPr>
-            <a:lvl2pPr>
-              <a:defRPr>
-                <a:solidFill>
-                  <a:schemeClr val="lt1"/>
-                </a:solidFill>
-              </a:defRPr>
-            </a:lvl2pPr>
-            <a:lvl3pPr>
-              <a:defRPr>
-                <a:solidFill>
-                  <a:schemeClr val="lt1"/>
-                </a:solidFill>
-              </a:defRPr>
-            </a:lvl3pPr>
-            <a:lvl4pPr>
-              <a:defRPr>
-                <a:solidFill>
-                  <a:schemeClr val="lt1"/>
-                </a:solidFill>
-              </a:defRPr>
-            </a:lvl4pPr>
-            <a:lvl5pPr>
-              <a:defRPr>
-                <a:solidFill>
-                  <a:schemeClr val="lt1"/>
-                </a:solidFill>
-              </a:defRPr>
-            </a:lvl5pPr>
-            <a:lvl6pPr>
-              <a:defRPr>
-                <a:solidFill>
-                  <a:schemeClr val="lt1"/>
-                </a:solidFill>
-              </a:defRPr>
-            </a:lvl6pPr>
-            <a:lvl7pPr>
-              <a:defRPr>
-                <a:solidFill>
-                  <a:schemeClr val="lt1"/>
-                </a:solidFill>
-              </a:defRPr>
-            </a:lvl7pPr>
-            <a:lvl8pPr>
-              <a:defRPr>
-                <a:solidFill>
-                  <a:schemeClr val="lt1"/>
-                </a:solidFill>
-              </a:defRPr>
-            </a:lvl8pPr>
-            <a:lvl9pPr>
-              <a:defRPr>
-                <a:solidFill>
-                  <a:schemeClr val="lt1"/>
-                </a:solidFill>
-              </a:defRPr>
-            </a:lvl9pPr>
-          </a:lstStyle>
-          <a:p>
-            <a:r>
-              <a:rPr lang="en-US" i="0" dirty="0"/>
-              <a:t>With our rule tree we can score a new potential customer to call.</a:t>
-            </a:r>
-          </a:p>
-        </p:txBody>
-      </p:sp>
-    </p:spTree>
-    <p:extLst>
-      <p:ext uri="{BB962C8B-B14F-4D97-AF65-F5344CB8AC3E}">
-        <p14:creationId xmlns:p14="http://schemas.microsoft.com/office/powerpoint/2010/main" val="4104884691"/>
-      </p:ext>
-    </p:extLst>
-  </p:cSld>
-  <p:clrMapOvr>
-    <a:masterClrMapping/>
-  </p:clrMapOvr>
-</p:sld>
-</file>
-
-<file path=ppt/slides/slide15.xml><?xml version="1.0" encoding="utf-8"?>
 <p:sld xmlns:a="http://schemas.openxmlformats.org/drawingml/2006/main" xmlns:r="http://schemas.openxmlformats.org/officeDocument/2006/relationships" xmlns:p="http://schemas.openxmlformats.org/presentationml/2006/main">
   <p:cSld>
     <p:spTree>
@@ -6561,7 +6216,7 @@
           <a:p>
             <a:fld id="{6700A58B-DD98-43D0-B791-721480A02982}" type="datetime1">
               <a:rPr lang="en-US" smtClean="0"/>
-              <a:t>10/23/23</a:t>
+              <a:t>10/21/24</a:t>
             </a:fld>
             <a:endParaRPr lang="en-US"/>
           </a:p>
@@ -6618,7 +6273,7 @@
           <a:p>
             <a:fld id="{37290FF7-652B-4475-AEAB-8B1A5D23AE09}" type="slidenum">
               <a:rPr lang="en-US" smtClean="0"/>
-              <a:t>15</a:t>
+              <a:t>14</a:t>
             </a:fld>
             <a:endParaRPr lang="en-US"/>
           </a:p>
@@ -7315,7 +6970,7 @@
 </p:sld>
 </file>
 
-<file path=ppt/slides/slide16.xml><?xml version="1.0" encoding="utf-8"?>
+<file path=ppt/slides/slide15.xml><?xml version="1.0" encoding="utf-8"?>
 <p:sld xmlns:a="http://schemas.openxmlformats.org/drawingml/2006/main" xmlns:r="http://schemas.openxmlformats.org/officeDocument/2006/relationships" xmlns:p="http://schemas.openxmlformats.org/presentationml/2006/main">
   <p:cSld>
     <p:spTree>
@@ -7355,7 +7010,7 @@
           <a:p>
             <a:fld id="{6700A58B-DD98-43D0-B791-721480A02982}" type="datetime1">
               <a:rPr lang="en-US" smtClean="0"/>
-              <a:t>10/23/23</a:t>
+              <a:t>10/21/24</a:t>
             </a:fld>
             <a:endParaRPr lang="en-US"/>
           </a:p>
@@ -7412,7 +7067,7 @@
           <a:p>
             <a:fld id="{37290FF7-652B-4475-AEAB-8B1A5D23AE09}" type="slidenum">
               <a:rPr lang="en-US" smtClean="0"/>
-              <a:t>16</a:t>
+              <a:t>15</a:t>
             </a:fld>
             <a:endParaRPr lang="en-US"/>
           </a:p>
@@ -8236,7 +7891,7 @@
 </p:sld>
 </file>
 
-<file path=ppt/slides/slide17.xml><?xml version="1.0" encoding="utf-8"?>
+<file path=ppt/slides/slide16.xml><?xml version="1.0" encoding="utf-8"?>
 <p:sld xmlns:a="http://schemas.openxmlformats.org/drawingml/2006/main" xmlns:r="http://schemas.openxmlformats.org/officeDocument/2006/relationships" xmlns:p="http://schemas.openxmlformats.org/presentationml/2006/main">
   <p:cSld>
     <p:spTree>
@@ -8276,7 +7931,7 @@
           <a:p>
             <a:fld id="{6700A58B-DD98-43D0-B791-721480A02982}" type="datetime1">
               <a:rPr lang="en-US" smtClean="0"/>
-              <a:t>10/23/23</a:t>
+              <a:t>10/21/24</a:t>
             </a:fld>
             <a:endParaRPr lang="en-US"/>
           </a:p>
@@ -8341,7 +7996,7 @@
           <a:p>
             <a:fld id="{37290FF7-652B-4475-AEAB-8B1A5D23AE09}" type="slidenum">
               <a:rPr lang="en-US" smtClean="0"/>
-              <a:t>17</a:t>
+              <a:t>16</a:t>
             </a:fld>
             <a:endParaRPr lang="en-US"/>
           </a:p>
@@ -9029,7 +8684,7 @@
 </p:sld>
 </file>
 
-<file path=ppt/slides/slide18.xml><?xml version="1.0" encoding="utf-8"?>
+<file path=ppt/slides/slide17.xml><?xml version="1.0" encoding="utf-8"?>
 <p:sld xmlns:a="http://schemas.openxmlformats.org/drawingml/2006/main" xmlns:r="http://schemas.openxmlformats.org/officeDocument/2006/relationships" xmlns:p="http://schemas.openxmlformats.org/presentationml/2006/main">
   <p:cSld>
     <p:spTree>
@@ -9710,7 +9365,7 @@
           <a:p>
             <a:fld id="{6700A58B-DD98-43D0-B791-721480A02982}" type="datetime1">
               <a:rPr lang="en-US" smtClean="0"/>
-              <a:t>10/23/23</a:t>
+              <a:t>10/21/24</a:t>
             </a:fld>
             <a:endParaRPr lang="en-US"/>
           </a:p>
@@ -9775,7 +9430,7 @@
           <a:p>
             <a:fld id="{37290FF7-652B-4475-AEAB-8B1A5D23AE09}" type="slidenum">
               <a:rPr lang="en-US" smtClean="0"/>
-              <a:t>18</a:t>
+              <a:t>17</a:t>
             </a:fld>
             <a:endParaRPr lang="en-US"/>
           </a:p>
@@ -9927,7 +9582,7 @@
 </p:sld>
 </file>
 
-<file path=ppt/slides/slide19.xml><?xml version="1.0" encoding="utf-8"?>
+<file path=ppt/slides/slide18.xml><?xml version="1.0" encoding="utf-8"?>
 <p:sld xmlns:a="http://schemas.openxmlformats.org/drawingml/2006/main" xmlns:r="http://schemas.openxmlformats.org/officeDocument/2006/relationships" xmlns:p="http://schemas.openxmlformats.org/presentationml/2006/main">
   <p:cSld>
     <p:spTree>
@@ -10608,7 +10263,7 @@
           <a:p>
             <a:fld id="{6700A58B-DD98-43D0-B791-721480A02982}" type="datetime1">
               <a:rPr lang="en-US" smtClean="0"/>
-              <a:t>10/23/23</a:t>
+              <a:t>10/21/24</a:t>
             </a:fld>
             <a:endParaRPr lang="en-US"/>
           </a:p>
@@ -10673,7 +10328,7 @@
           <a:p>
             <a:fld id="{37290FF7-652B-4475-AEAB-8B1A5D23AE09}" type="slidenum">
               <a:rPr lang="en-US" smtClean="0"/>
-              <a:t>19</a:t>
+              <a:t>18</a:t>
             </a:fld>
             <a:endParaRPr lang="en-US"/>
           </a:p>
@@ -10862,504 +10517,7 @@
 </p:sld>
 </file>
 
-<file path=ppt/slides/slide2.xml><?xml version="1.0" encoding="utf-8"?>
-<p:sld xmlns:a="http://schemas.openxmlformats.org/drawingml/2006/main" xmlns:r="http://schemas.openxmlformats.org/officeDocument/2006/relationships" xmlns:p="http://schemas.openxmlformats.org/presentationml/2006/main">
-  <p:cSld>
-    <p:spTree>
-      <p:nvGrpSpPr>
-        <p:cNvPr id="1" name=""/>
-        <p:cNvGrpSpPr/>
-        <p:nvPr/>
-      </p:nvGrpSpPr>
-      <p:grpSpPr>
-        <a:xfrm>
-          <a:off x="0" y="0"/>
-          <a:ext cx="0" cy="0"/>
-          <a:chOff x="0" y="0"/>
-          <a:chExt cx="0" cy="0"/>
-        </a:xfrm>
-      </p:grpSpPr>
-      <p:cxnSp>
-        <p:nvCxnSpPr>
-          <p:cNvPr id="13" name="Straight Arrow Connector 12"/>
-          <p:cNvCxnSpPr/>
-          <p:nvPr/>
-        </p:nvCxnSpPr>
-        <p:spPr>
-          <a:xfrm>
-            <a:off x="653142" y="2253349"/>
-            <a:ext cx="0" cy="3200400"/>
-          </a:xfrm>
-          <a:prstGeom prst="straightConnector1">
-            <a:avLst/>
-          </a:prstGeom>
-          <a:ln>
-            <a:tailEnd type="triangle"/>
-          </a:ln>
-        </p:spPr>
-        <p:style>
-          <a:lnRef idx="1">
-            <a:schemeClr val="accent1"/>
-          </a:lnRef>
-          <a:fillRef idx="0">
-            <a:schemeClr val="accent1"/>
-          </a:fillRef>
-          <a:effectRef idx="0">
-            <a:schemeClr val="accent1"/>
-          </a:effectRef>
-          <a:fontRef idx="minor">
-            <a:schemeClr val="tx1"/>
-          </a:fontRef>
-        </p:style>
-      </p:cxnSp>
-      <p:sp>
-        <p:nvSpPr>
-          <p:cNvPr id="2" name="Date Placeholder 1"/>
-          <p:cNvSpPr>
-            <a:spLocks noGrp="1"/>
-          </p:cNvSpPr>
-          <p:nvPr>
-            <p:ph type="dt" sz="half" idx="10"/>
-          </p:nvPr>
-        </p:nvSpPr>
-        <p:spPr/>
-        <p:txBody>
-          <a:bodyPr/>
-          <a:lstStyle/>
-          <a:p>
-            <a:fld id="{6700A58B-DD98-43D0-B791-721480A02982}" type="datetime1">
-              <a:rPr lang="en-US" smtClean="0"/>
-              <a:t>10/23/23</a:t>
-            </a:fld>
-            <a:endParaRPr lang="en-US"/>
-          </a:p>
-        </p:txBody>
-      </p:sp>
-      <p:sp>
-        <p:nvSpPr>
-          <p:cNvPr id="3" name="Title 2"/>
-          <p:cNvSpPr>
-            <a:spLocks noGrp="1"/>
-          </p:cNvSpPr>
-          <p:nvPr>
-            <p:ph type="title"/>
-          </p:nvPr>
-        </p:nvSpPr>
-        <p:spPr/>
-        <p:txBody>
-          <a:bodyPr/>
-          <a:lstStyle/>
-          <a:p>
-            <a:r>
-              <a:rPr lang="en-US" dirty="0"/>
-              <a:t>Review steps</a:t>
-            </a:r>
-          </a:p>
-        </p:txBody>
-      </p:sp>
-      <p:sp>
-        <p:nvSpPr>
-          <p:cNvPr id="4" name="Slide Number Placeholder 3"/>
-          <p:cNvSpPr>
-            <a:spLocks noGrp="1"/>
-          </p:cNvSpPr>
-          <p:nvPr>
-            <p:ph type="sldNum" sz="quarter" idx="12"/>
-          </p:nvPr>
-        </p:nvSpPr>
-        <p:spPr/>
-        <p:txBody>
-          <a:bodyPr/>
-          <a:lstStyle/>
-          <a:p>
-            <a:fld id="{37290FF7-652B-4475-AEAB-8B1A5D23AE09}" type="slidenum">
-              <a:rPr lang="en-US" smtClean="0"/>
-              <a:t>2</a:t>
-            </a:fld>
-            <a:endParaRPr lang="en-US"/>
-          </a:p>
-        </p:txBody>
-      </p:sp>
-      <p:sp>
-        <p:nvSpPr>
-          <p:cNvPr id="5" name="Footer Placeholder 4"/>
-          <p:cNvSpPr>
-            <a:spLocks noGrp="1"/>
-          </p:cNvSpPr>
-          <p:nvPr>
-            <p:ph type="ftr" sz="quarter" idx="3"/>
-          </p:nvPr>
-        </p:nvSpPr>
-        <p:spPr/>
-        <p:txBody>
-          <a:bodyPr/>
-          <a:lstStyle/>
-          <a:p>
-            <a:r>
-              <a:rPr lang="en-US" dirty="0"/>
-              <a:t>Kwartler </a:t>
-            </a:r>
-          </a:p>
-        </p:txBody>
-      </p:sp>
-      <p:sp>
-        <p:nvSpPr>
-          <p:cNvPr id="6" name="TextBox 5"/>
-          <p:cNvSpPr txBox="1"/>
-          <p:nvPr/>
-        </p:nvSpPr>
-        <p:spPr>
-          <a:xfrm>
-            <a:off x="1387929" y="1077686"/>
-            <a:ext cx="8066315" cy="5047536"/>
-          </a:xfrm>
-          <a:prstGeom prst="rect">
-            <a:avLst/>
-          </a:prstGeom>
-          <a:noFill/>
-        </p:spPr>
-        <p:txBody>
-          <a:bodyPr wrap="square" rtlCol="0">
-            <a:spAutoFit/>
-          </a:bodyPr>
-          <a:lstStyle/>
-          <a:p>
-            <a:pPr marL="342900" indent="-342900">
-              <a:buFont typeface="+mj-lt"/>
-              <a:buAutoNum type="arabicPeriod"/>
-            </a:pPr>
-            <a:r>
-              <a:rPr lang="en-US" sz="2000" dirty="0"/>
-              <a:t>Load data</a:t>
-            </a:r>
-          </a:p>
-          <a:p>
-            <a:pPr marL="914400" lvl="1" indent="-457200">
-              <a:buFont typeface="Arial" panose="020B0604020202020204" pitchFamily="34" charset="0"/>
-              <a:buChar char="•"/>
-            </a:pPr>
-            <a:r>
-              <a:rPr lang="en-US" sz="1200" dirty="0"/>
-              <a:t>read.csv()</a:t>
-            </a:r>
-          </a:p>
-          <a:p>
-            <a:pPr marL="914400" lvl="1" indent="-457200">
-              <a:buFont typeface="Arial" panose="020B0604020202020204" pitchFamily="34" charset="0"/>
-              <a:buChar char="•"/>
-            </a:pPr>
-            <a:endParaRPr lang="en-US" sz="1600" dirty="0"/>
-          </a:p>
-          <a:p>
-            <a:pPr marL="342900" indent="-342900">
-              <a:buFont typeface="+mj-lt"/>
-              <a:buAutoNum type="arabicPeriod"/>
-            </a:pPr>
-            <a:r>
-              <a:rPr lang="en-US" sz="2000" dirty="0"/>
-              <a:t>Partition to avoid overfitting</a:t>
-            </a:r>
-          </a:p>
-          <a:p>
-            <a:pPr marL="914400" lvl="1" indent="-457200">
-              <a:buFont typeface="Arial" panose="020B0604020202020204" pitchFamily="34" charset="0"/>
-              <a:buChar char="•"/>
-            </a:pPr>
-            <a:r>
-              <a:rPr lang="en-US" sz="1200" dirty="0"/>
-              <a:t>sample(), </a:t>
-            </a:r>
-            <a:r>
-              <a:rPr lang="en-US" sz="1200" dirty="0" err="1"/>
-              <a:t>df</a:t>
-            </a:r>
-            <a:r>
-              <a:rPr lang="en-US" sz="1200" dirty="0"/>
-              <a:t>[</a:t>
-            </a:r>
-            <a:r>
-              <a:rPr lang="en-US" sz="1200" dirty="0" err="1"/>
-              <a:t>idx</a:t>
-            </a:r>
-            <a:r>
-              <a:rPr lang="en-US" sz="1200" dirty="0"/>
-              <a:t>, ] etc.</a:t>
-            </a:r>
-          </a:p>
-          <a:p>
-            <a:pPr lvl="1"/>
-            <a:endParaRPr lang="en-US" sz="1600" dirty="0"/>
-          </a:p>
-          <a:p>
-            <a:pPr marL="342900" indent="-342900">
-              <a:buFont typeface="+mj-lt"/>
-              <a:buAutoNum type="arabicPeriod"/>
-            </a:pPr>
-            <a:r>
-              <a:rPr lang="en-US" sz="2000" dirty="0"/>
-              <a:t>Exploratory Data Analysis</a:t>
-            </a:r>
-          </a:p>
-          <a:p>
-            <a:pPr marL="914400" lvl="1" indent="-457200">
-              <a:buFont typeface="Arial" panose="020B0604020202020204" pitchFamily="34" charset="0"/>
-              <a:buChar char="•"/>
-            </a:pPr>
-            <a:r>
-              <a:rPr lang="en-US" sz="1600" dirty="0"/>
-              <a:t>summary(), plot(), table() etc.</a:t>
-            </a:r>
-          </a:p>
-          <a:p>
-            <a:pPr lvl="1"/>
-            <a:endParaRPr lang="en-US" sz="1600" dirty="0"/>
-          </a:p>
-          <a:p>
-            <a:pPr marL="342900" indent="-342900">
-              <a:buFont typeface="+mj-lt"/>
-              <a:buAutoNum type="arabicPeriod"/>
-            </a:pPr>
-            <a:r>
-              <a:rPr lang="en-US" sz="2000" dirty="0"/>
-              <a:t>Prepare data for modeling</a:t>
-            </a:r>
-          </a:p>
-          <a:p>
-            <a:pPr marL="914400" lvl="1" indent="-457200">
-              <a:buFont typeface="Arial" panose="020B0604020202020204" pitchFamily="34" charset="0"/>
-              <a:buChar char="•"/>
-            </a:pPr>
-            <a:r>
-              <a:rPr lang="en-US" sz="1200" dirty="0" err="1"/>
-              <a:t>Vtreat:designTreatmentsC</a:t>
-            </a:r>
-            <a:r>
-              <a:rPr lang="en-US" sz="1200" dirty="0"/>
-              <a:t>/N(), prepare()</a:t>
-            </a:r>
-          </a:p>
-          <a:p>
-            <a:pPr marL="457200" indent="-457200">
-              <a:buFont typeface="Arial" panose="020B0604020202020204" pitchFamily="34" charset="0"/>
-              <a:buChar char="•"/>
-            </a:pPr>
-            <a:endParaRPr lang="en-US" sz="1600" dirty="0"/>
-          </a:p>
-          <a:p>
-            <a:r>
-              <a:rPr lang="en-US" sz="2000" dirty="0"/>
-              <a:t>5. Model</a:t>
-            </a:r>
-          </a:p>
-          <a:p>
-            <a:pPr marL="914400" lvl="1" indent="-457200">
-              <a:buFont typeface="Arial" panose="020B0604020202020204" pitchFamily="34" charset="0"/>
-              <a:buChar char="•"/>
-            </a:pPr>
-            <a:r>
-              <a:rPr lang="en-US" sz="1200" dirty="0"/>
-              <a:t>Regression, Logistic Regression, KNN etc.</a:t>
-            </a:r>
-          </a:p>
-          <a:p>
-            <a:endParaRPr lang="en-US" sz="1600" dirty="0"/>
-          </a:p>
-          <a:p>
-            <a:r>
-              <a:rPr lang="en-US" sz="2000" dirty="0"/>
-              <a:t>6. Get Results (classification or prediction)</a:t>
-            </a:r>
-          </a:p>
-          <a:p>
-            <a:pPr marL="914400" lvl="1" indent="-457200">
-              <a:buFont typeface="Arial" panose="020B0604020202020204" pitchFamily="34" charset="0"/>
-              <a:buChar char="•"/>
-            </a:pPr>
-            <a:r>
-              <a:rPr lang="en-US" sz="1200" dirty="0"/>
-              <a:t>predict()</a:t>
-            </a:r>
-          </a:p>
-          <a:p>
-            <a:endParaRPr lang="en-US" sz="1600" dirty="0"/>
-          </a:p>
-          <a:p>
-            <a:r>
-              <a:rPr lang="en-US" sz="2000" dirty="0"/>
-              <a:t>7. Key Performance Indicators</a:t>
-            </a:r>
-          </a:p>
-          <a:p>
-            <a:pPr marL="914400" lvl="1" indent="-457200">
-              <a:buFont typeface="Arial" panose="020B0604020202020204" pitchFamily="34" charset="0"/>
-              <a:buChar char="•"/>
-            </a:pPr>
-            <a:r>
-              <a:rPr lang="en-US" sz="1200" dirty="0"/>
-              <a:t>RMSE, Accuracy, MAPE – depends on the modeling exercise i.e. regression or classification</a:t>
-            </a:r>
-          </a:p>
-        </p:txBody>
-      </p:sp>
-      <p:sp>
-        <p:nvSpPr>
-          <p:cNvPr id="7" name="TextBox 6"/>
-          <p:cNvSpPr txBox="1"/>
-          <p:nvPr/>
-        </p:nvSpPr>
-        <p:spPr>
-          <a:xfrm>
-            <a:off x="49693" y="1828800"/>
-            <a:ext cx="1226041" cy="461665"/>
-          </a:xfrm>
-          <a:prstGeom prst="rect">
-            <a:avLst/>
-          </a:prstGeom>
-          <a:noFill/>
-        </p:spPr>
-        <p:txBody>
-          <a:bodyPr wrap="none" rtlCol="0">
-            <a:spAutoFit/>
-          </a:bodyPr>
-          <a:lstStyle/>
-          <a:p>
-            <a:r>
-              <a:rPr lang="en-US" sz="2400" b="1" u="sng" dirty="0"/>
-              <a:t>SAMPLE</a:t>
-            </a:r>
-          </a:p>
-        </p:txBody>
-      </p:sp>
-      <p:sp>
-        <p:nvSpPr>
-          <p:cNvPr id="8" name="TextBox 7"/>
-          <p:cNvSpPr txBox="1"/>
-          <p:nvPr/>
-        </p:nvSpPr>
-        <p:spPr>
-          <a:xfrm>
-            <a:off x="0" y="2667000"/>
-            <a:ext cx="1325427" cy="461665"/>
-          </a:xfrm>
-          <a:prstGeom prst="rect">
-            <a:avLst/>
-          </a:prstGeom>
-          <a:noFill/>
-        </p:spPr>
-        <p:txBody>
-          <a:bodyPr wrap="none" rtlCol="0">
-            <a:spAutoFit/>
-          </a:bodyPr>
-          <a:lstStyle/>
-          <a:p>
-            <a:r>
-              <a:rPr lang="en-US" sz="2400" b="1" u="sng" dirty="0"/>
-              <a:t>EXPLORE</a:t>
-            </a:r>
-          </a:p>
-        </p:txBody>
-      </p:sp>
-      <p:sp>
-        <p:nvSpPr>
-          <p:cNvPr id="9" name="TextBox 8"/>
-          <p:cNvSpPr txBox="1"/>
-          <p:nvPr/>
-        </p:nvSpPr>
-        <p:spPr>
-          <a:xfrm>
-            <a:off x="42992" y="3423557"/>
-            <a:ext cx="1239442" cy="461665"/>
-          </a:xfrm>
-          <a:prstGeom prst="rect">
-            <a:avLst/>
-          </a:prstGeom>
-          <a:noFill/>
-        </p:spPr>
-        <p:txBody>
-          <a:bodyPr wrap="none" rtlCol="0">
-            <a:spAutoFit/>
-          </a:bodyPr>
-          <a:lstStyle/>
-          <a:p>
-            <a:r>
-              <a:rPr lang="en-US" sz="2400" b="1" u="sng" dirty="0"/>
-              <a:t>MODIFY</a:t>
-            </a:r>
-          </a:p>
-        </p:txBody>
-      </p:sp>
-      <p:sp>
-        <p:nvSpPr>
-          <p:cNvPr id="10" name="TextBox 9"/>
-          <p:cNvSpPr txBox="1"/>
-          <p:nvPr/>
-        </p:nvSpPr>
-        <p:spPr>
-          <a:xfrm>
-            <a:off x="94288" y="4125686"/>
-            <a:ext cx="1136850" cy="461665"/>
-          </a:xfrm>
-          <a:prstGeom prst="rect">
-            <a:avLst/>
-          </a:prstGeom>
-          <a:noFill/>
-        </p:spPr>
-        <p:txBody>
-          <a:bodyPr wrap="none" rtlCol="0">
-            <a:spAutoFit/>
-          </a:bodyPr>
-          <a:lstStyle/>
-          <a:p>
-            <a:r>
-              <a:rPr lang="en-US" sz="2400" b="1" u="sng" dirty="0"/>
-              <a:t>MODEL</a:t>
-            </a:r>
-          </a:p>
-        </p:txBody>
-      </p:sp>
-      <p:sp>
-        <p:nvSpPr>
-          <p:cNvPr id="11" name="TextBox 10"/>
-          <p:cNvSpPr txBox="1"/>
-          <p:nvPr/>
-        </p:nvSpPr>
-        <p:spPr>
-          <a:xfrm>
-            <a:off x="3558" y="5502729"/>
-            <a:ext cx="1318310" cy="461665"/>
-          </a:xfrm>
-          <a:prstGeom prst="rect">
-            <a:avLst/>
-          </a:prstGeom>
-          <a:noFill/>
-        </p:spPr>
-        <p:txBody>
-          <a:bodyPr wrap="none" rtlCol="0">
-            <a:spAutoFit/>
-          </a:bodyPr>
-          <a:lstStyle/>
-          <a:p>
-            <a:r>
-              <a:rPr lang="en-US" sz="2400" b="1" u="sng" dirty="0"/>
-              <a:t>ANALYZE</a:t>
-            </a:r>
-          </a:p>
-        </p:txBody>
-      </p:sp>
-    </p:spTree>
-    <p:extLst>
-      <p:ext uri="{BB962C8B-B14F-4D97-AF65-F5344CB8AC3E}">
-        <p14:creationId xmlns:p14="http://schemas.microsoft.com/office/powerpoint/2010/main" val="430253828"/>
-      </p:ext>
-    </p:extLst>
-  </p:cSld>
-  <p:clrMapOvr>
-    <a:masterClrMapping/>
-  </p:clrMapOvr>
-</p:sld>
-</file>
-
-<file path=ppt/slides/slide20.xml><?xml version="1.0" encoding="utf-8"?>
+<file path=ppt/slides/slide19.xml><?xml version="1.0" encoding="utf-8"?>
 <p:sld xmlns:a="http://schemas.openxmlformats.org/drawingml/2006/main" xmlns:r="http://schemas.openxmlformats.org/officeDocument/2006/relationships" xmlns:p="http://schemas.openxmlformats.org/presentationml/2006/main">
   <p:cSld>
     <p:spTree>
@@ -12040,7 +11198,7 @@
           <a:p>
             <a:fld id="{6700A58B-DD98-43D0-B791-721480A02982}" type="datetime1">
               <a:rPr lang="en-US" smtClean="0"/>
-              <a:t>10/23/23</a:t>
+              <a:t>10/21/24</a:t>
             </a:fld>
             <a:endParaRPr lang="en-US"/>
           </a:p>
@@ -12105,7 +11263,7 @@
           <a:p>
             <a:fld id="{37290FF7-652B-4475-AEAB-8B1A5D23AE09}" type="slidenum">
               <a:rPr lang="en-US" smtClean="0"/>
-              <a:t>20</a:t>
+              <a:t>19</a:t>
             </a:fld>
             <a:endParaRPr lang="en-US"/>
           </a:p>
@@ -12294,7 +11452,504 @@
 </p:sld>
 </file>
 
-<file path=ppt/slides/slide21.xml><?xml version="1.0" encoding="utf-8"?>
+<file path=ppt/slides/slide2.xml><?xml version="1.0" encoding="utf-8"?>
+<p:sld xmlns:a="http://schemas.openxmlformats.org/drawingml/2006/main" xmlns:r="http://schemas.openxmlformats.org/officeDocument/2006/relationships" xmlns:p="http://schemas.openxmlformats.org/presentationml/2006/main">
+  <p:cSld>
+    <p:spTree>
+      <p:nvGrpSpPr>
+        <p:cNvPr id="1" name=""/>
+        <p:cNvGrpSpPr/>
+        <p:nvPr/>
+      </p:nvGrpSpPr>
+      <p:grpSpPr>
+        <a:xfrm>
+          <a:off x="0" y="0"/>
+          <a:ext cx="0" cy="0"/>
+          <a:chOff x="0" y="0"/>
+          <a:chExt cx="0" cy="0"/>
+        </a:xfrm>
+      </p:grpSpPr>
+      <p:cxnSp>
+        <p:nvCxnSpPr>
+          <p:cNvPr id="13" name="Straight Arrow Connector 12"/>
+          <p:cNvCxnSpPr/>
+          <p:nvPr/>
+        </p:nvCxnSpPr>
+        <p:spPr>
+          <a:xfrm>
+            <a:off x="653142" y="2253349"/>
+            <a:ext cx="0" cy="3200400"/>
+          </a:xfrm>
+          <a:prstGeom prst="straightConnector1">
+            <a:avLst/>
+          </a:prstGeom>
+          <a:ln>
+            <a:tailEnd type="triangle"/>
+          </a:ln>
+        </p:spPr>
+        <p:style>
+          <a:lnRef idx="1">
+            <a:schemeClr val="accent1"/>
+          </a:lnRef>
+          <a:fillRef idx="0">
+            <a:schemeClr val="accent1"/>
+          </a:fillRef>
+          <a:effectRef idx="0">
+            <a:schemeClr val="accent1"/>
+          </a:effectRef>
+          <a:fontRef idx="minor">
+            <a:schemeClr val="tx1"/>
+          </a:fontRef>
+        </p:style>
+      </p:cxnSp>
+      <p:sp>
+        <p:nvSpPr>
+          <p:cNvPr id="2" name="Date Placeholder 1"/>
+          <p:cNvSpPr>
+            <a:spLocks noGrp="1"/>
+          </p:cNvSpPr>
+          <p:nvPr>
+            <p:ph type="dt" sz="half" idx="10"/>
+          </p:nvPr>
+        </p:nvSpPr>
+        <p:spPr/>
+        <p:txBody>
+          <a:bodyPr/>
+          <a:lstStyle/>
+          <a:p>
+            <a:fld id="{6700A58B-DD98-43D0-B791-721480A02982}" type="datetime1">
+              <a:rPr lang="en-US" smtClean="0"/>
+              <a:t>10/21/24</a:t>
+            </a:fld>
+            <a:endParaRPr lang="en-US"/>
+          </a:p>
+        </p:txBody>
+      </p:sp>
+      <p:sp>
+        <p:nvSpPr>
+          <p:cNvPr id="3" name="Title 2"/>
+          <p:cNvSpPr>
+            <a:spLocks noGrp="1"/>
+          </p:cNvSpPr>
+          <p:nvPr>
+            <p:ph type="title"/>
+          </p:nvPr>
+        </p:nvSpPr>
+        <p:spPr/>
+        <p:txBody>
+          <a:bodyPr/>
+          <a:lstStyle/>
+          <a:p>
+            <a:r>
+              <a:rPr lang="en-US" dirty="0"/>
+              <a:t>Review steps</a:t>
+            </a:r>
+          </a:p>
+        </p:txBody>
+      </p:sp>
+      <p:sp>
+        <p:nvSpPr>
+          <p:cNvPr id="4" name="Slide Number Placeholder 3"/>
+          <p:cNvSpPr>
+            <a:spLocks noGrp="1"/>
+          </p:cNvSpPr>
+          <p:nvPr>
+            <p:ph type="sldNum" sz="quarter" idx="12"/>
+          </p:nvPr>
+        </p:nvSpPr>
+        <p:spPr/>
+        <p:txBody>
+          <a:bodyPr/>
+          <a:lstStyle/>
+          <a:p>
+            <a:fld id="{37290FF7-652B-4475-AEAB-8B1A5D23AE09}" type="slidenum">
+              <a:rPr lang="en-US" smtClean="0"/>
+              <a:t>2</a:t>
+            </a:fld>
+            <a:endParaRPr lang="en-US"/>
+          </a:p>
+        </p:txBody>
+      </p:sp>
+      <p:sp>
+        <p:nvSpPr>
+          <p:cNvPr id="5" name="Footer Placeholder 4"/>
+          <p:cNvSpPr>
+            <a:spLocks noGrp="1"/>
+          </p:cNvSpPr>
+          <p:nvPr>
+            <p:ph type="ftr" sz="quarter" idx="3"/>
+          </p:nvPr>
+        </p:nvSpPr>
+        <p:spPr/>
+        <p:txBody>
+          <a:bodyPr/>
+          <a:lstStyle/>
+          <a:p>
+            <a:r>
+              <a:rPr lang="en-US" dirty="0"/>
+              <a:t>Kwartler </a:t>
+            </a:r>
+          </a:p>
+        </p:txBody>
+      </p:sp>
+      <p:sp>
+        <p:nvSpPr>
+          <p:cNvPr id="6" name="TextBox 5"/>
+          <p:cNvSpPr txBox="1"/>
+          <p:nvPr/>
+        </p:nvSpPr>
+        <p:spPr>
+          <a:xfrm>
+            <a:off x="1387929" y="1077686"/>
+            <a:ext cx="8066315" cy="5047536"/>
+          </a:xfrm>
+          <a:prstGeom prst="rect">
+            <a:avLst/>
+          </a:prstGeom>
+          <a:noFill/>
+        </p:spPr>
+        <p:txBody>
+          <a:bodyPr wrap="square" rtlCol="0">
+            <a:spAutoFit/>
+          </a:bodyPr>
+          <a:lstStyle/>
+          <a:p>
+            <a:pPr marL="342900" indent="-342900">
+              <a:buFont typeface="+mj-lt"/>
+              <a:buAutoNum type="arabicPeriod"/>
+            </a:pPr>
+            <a:r>
+              <a:rPr lang="en-US" sz="2000" dirty="0"/>
+              <a:t>Load data</a:t>
+            </a:r>
+          </a:p>
+          <a:p>
+            <a:pPr marL="914400" lvl="1" indent="-457200">
+              <a:buFont typeface="Arial" panose="020B0604020202020204" pitchFamily="34" charset="0"/>
+              <a:buChar char="•"/>
+            </a:pPr>
+            <a:r>
+              <a:rPr lang="en-US" sz="1200" dirty="0"/>
+              <a:t>read.csv()</a:t>
+            </a:r>
+          </a:p>
+          <a:p>
+            <a:pPr marL="914400" lvl="1" indent="-457200">
+              <a:buFont typeface="Arial" panose="020B0604020202020204" pitchFamily="34" charset="0"/>
+              <a:buChar char="•"/>
+            </a:pPr>
+            <a:endParaRPr lang="en-US" sz="1600" dirty="0"/>
+          </a:p>
+          <a:p>
+            <a:pPr marL="342900" indent="-342900">
+              <a:buFont typeface="+mj-lt"/>
+              <a:buAutoNum type="arabicPeriod"/>
+            </a:pPr>
+            <a:r>
+              <a:rPr lang="en-US" sz="2000" dirty="0"/>
+              <a:t>Partition to avoid overfitting</a:t>
+            </a:r>
+          </a:p>
+          <a:p>
+            <a:pPr marL="914400" lvl="1" indent="-457200">
+              <a:buFont typeface="Arial" panose="020B0604020202020204" pitchFamily="34" charset="0"/>
+              <a:buChar char="•"/>
+            </a:pPr>
+            <a:r>
+              <a:rPr lang="en-US" sz="1200" dirty="0"/>
+              <a:t>sample(), </a:t>
+            </a:r>
+            <a:r>
+              <a:rPr lang="en-US" sz="1200" dirty="0" err="1"/>
+              <a:t>df</a:t>
+            </a:r>
+            <a:r>
+              <a:rPr lang="en-US" sz="1200" dirty="0"/>
+              <a:t>[</a:t>
+            </a:r>
+            <a:r>
+              <a:rPr lang="en-US" sz="1200" dirty="0" err="1"/>
+              <a:t>idx</a:t>
+            </a:r>
+            <a:r>
+              <a:rPr lang="en-US" sz="1200" dirty="0"/>
+              <a:t>, ] etc.</a:t>
+            </a:r>
+          </a:p>
+          <a:p>
+            <a:pPr lvl="1"/>
+            <a:endParaRPr lang="en-US" sz="1600" dirty="0"/>
+          </a:p>
+          <a:p>
+            <a:pPr marL="342900" indent="-342900">
+              <a:buFont typeface="+mj-lt"/>
+              <a:buAutoNum type="arabicPeriod"/>
+            </a:pPr>
+            <a:r>
+              <a:rPr lang="en-US" sz="2000" dirty="0"/>
+              <a:t>Exploratory Data Analysis</a:t>
+            </a:r>
+          </a:p>
+          <a:p>
+            <a:pPr marL="914400" lvl="1" indent="-457200">
+              <a:buFont typeface="Arial" panose="020B0604020202020204" pitchFamily="34" charset="0"/>
+              <a:buChar char="•"/>
+            </a:pPr>
+            <a:r>
+              <a:rPr lang="en-US" sz="1600" dirty="0"/>
+              <a:t>summary(), plot(), table() etc.</a:t>
+            </a:r>
+          </a:p>
+          <a:p>
+            <a:pPr lvl="1"/>
+            <a:endParaRPr lang="en-US" sz="1600" dirty="0"/>
+          </a:p>
+          <a:p>
+            <a:pPr marL="342900" indent="-342900">
+              <a:buFont typeface="+mj-lt"/>
+              <a:buAutoNum type="arabicPeriod"/>
+            </a:pPr>
+            <a:r>
+              <a:rPr lang="en-US" sz="2000" dirty="0"/>
+              <a:t>Prepare data for modeling</a:t>
+            </a:r>
+          </a:p>
+          <a:p>
+            <a:pPr marL="914400" lvl="1" indent="-457200">
+              <a:buFont typeface="Arial" panose="020B0604020202020204" pitchFamily="34" charset="0"/>
+              <a:buChar char="•"/>
+            </a:pPr>
+            <a:r>
+              <a:rPr lang="en-US" sz="1200" dirty="0" err="1"/>
+              <a:t>Vtreat:designTreatmentsC</a:t>
+            </a:r>
+            <a:r>
+              <a:rPr lang="en-US" sz="1200" dirty="0"/>
+              <a:t>/N(), prepare()</a:t>
+            </a:r>
+          </a:p>
+          <a:p>
+            <a:pPr marL="457200" indent="-457200">
+              <a:buFont typeface="Arial" panose="020B0604020202020204" pitchFamily="34" charset="0"/>
+              <a:buChar char="•"/>
+            </a:pPr>
+            <a:endParaRPr lang="en-US" sz="1600" dirty="0"/>
+          </a:p>
+          <a:p>
+            <a:r>
+              <a:rPr lang="en-US" sz="2000" dirty="0"/>
+              <a:t>5. Model</a:t>
+            </a:r>
+          </a:p>
+          <a:p>
+            <a:pPr marL="914400" lvl="1" indent="-457200">
+              <a:buFont typeface="Arial" panose="020B0604020202020204" pitchFamily="34" charset="0"/>
+              <a:buChar char="•"/>
+            </a:pPr>
+            <a:r>
+              <a:rPr lang="en-US" sz="1200" dirty="0"/>
+              <a:t>Regression, Logistic Regression, KNN etc.</a:t>
+            </a:r>
+          </a:p>
+          <a:p>
+            <a:endParaRPr lang="en-US" sz="1600" dirty="0"/>
+          </a:p>
+          <a:p>
+            <a:r>
+              <a:rPr lang="en-US" sz="2000" dirty="0"/>
+              <a:t>6. Get Results (classification or prediction)</a:t>
+            </a:r>
+          </a:p>
+          <a:p>
+            <a:pPr marL="914400" lvl="1" indent="-457200">
+              <a:buFont typeface="Arial" panose="020B0604020202020204" pitchFamily="34" charset="0"/>
+              <a:buChar char="•"/>
+            </a:pPr>
+            <a:r>
+              <a:rPr lang="en-US" sz="1200" dirty="0"/>
+              <a:t>predict()</a:t>
+            </a:r>
+          </a:p>
+          <a:p>
+            <a:endParaRPr lang="en-US" sz="1600" dirty="0"/>
+          </a:p>
+          <a:p>
+            <a:r>
+              <a:rPr lang="en-US" sz="2000" dirty="0"/>
+              <a:t>7. Key Performance Indicators</a:t>
+            </a:r>
+          </a:p>
+          <a:p>
+            <a:pPr marL="914400" lvl="1" indent="-457200">
+              <a:buFont typeface="Arial" panose="020B0604020202020204" pitchFamily="34" charset="0"/>
+              <a:buChar char="•"/>
+            </a:pPr>
+            <a:r>
+              <a:rPr lang="en-US" sz="1200" dirty="0"/>
+              <a:t>RMSE, Accuracy, MAPE – depends on the modeling exercise i.e. regression or classification</a:t>
+            </a:r>
+          </a:p>
+        </p:txBody>
+      </p:sp>
+      <p:sp>
+        <p:nvSpPr>
+          <p:cNvPr id="7" name="TextBox 6"/>
+          <p:cNvSpPr txBox="1"/>
+          <p:nvPr/>
+        </p:nvSpPr>
+        <p:spPr>
+          <a:xfrm>
+            <a:off x="49693" y="1828800"/>
+            <a:ext cx="1226041" cy="461665"/>
+          </a:xfrm>
+          <a:prstGeom prst="rect">
+            <a:avLst/>
+          </a:prstGeom>
+          <a:noFill/>
+        </p:spPr>
+        <p:txBody>
+          <a:bodyPr wrap="none" rtlCol="0">
+            <a:spAutoFit/>
+          </a:bodyPr>
+          <a:lstStyle/>
+          <a:p>
+            <a:r>
+              <a:rPr lang="en-US" sz="2400" b="1" u="sng" dirty="0"/>
+              <a:t>SAMPLE</a:t>
+            </a:r>
+          </a:p>
+        </p:txBody>
+      </p:sp>
+      <p:sp>
+        <p:nvSpPr>
+          <p:cNvPr id="8" name="TextBox 7"/>
+          <p:cNvSpPr txBox="1"/>
+          <p:nvPr/>
+        </p:nvSpPr>
+        <p:spPr>
+          <a:xfrm>
+            <a:off x="0" y="2667000"/>
+            <a:ext cx="1325427" cy="461665"/>
+          </a:xfrm>
+          <a:prstGeom prst="rect">
+            <a:avLst/>
+          </a:prstGeom>
+          <a:noFill/>
+        </p:spPr>
+        <p:txBody>
+          <a:bodyPr wrap="none" rtlCol="0">
+            <a:spAutoFit/>
+          </a:bodyPr>
+          <a:lstStyle/>
+          <a:p>
+            <a:r>
+              <a:rPr lang="en-US" sz="2400" b="1" u="sng" dirty="0"/>
+              <a:t>EXPLORE</a:t>
+            </a:r>
+          </a:p>
+        </p:txBody>
+      </p:sp>
+      <p:sp>
+        <p:nvSpPr>
+          <p:cNvPr id="9" name="TextBox 8"/>
+          <p:cNvSpPr txBox="1"/>
+          <p:nvPr/>
+        </p:nvSpPr>
+        <p:spPr>
+          <a:xfrm>
+            <a:off x="42992" y="3423557"/>
+            <a:ext cx="1239442" cy="461665"/>
+          </a:xfrm>
+          <a:prstGeom prst="rect">
+            <a:avLst/>
+          </a:prstGeom>
+          <a:noFill/>
+        </p:spPr>
+        <p:txBody>
+          <a:bodyPr wrap="none" rtlCol="0">
+            <a:spAutoFit/>
+          </a:bodyPr>
+          <a:lstStyle/>
+          <a:p>
+            <a:r>
+              <a:rPr lang="en-US" sz="2400" b="1" u="sng" dirty="0"/>
+              <a:t>MODIFY</a:t>
+            </a:r>
+          </a:p>
+        </p:txBody>
+      </p:sp>
+      <p:sp>
+        <p:nvSpPr>
+          <p:cNvPr id="10" name="TextBox 9"/>
+          <p:cNvSpPr txBox="1"/>
+          <p:nvPr/>
+        </p:nvSpPr>
+        <p:spPr>
+          <a:xfrm>
+            <a:off x="94288" y="4125686"/>
+            <a:ext cx="1136850" cy="461665"/>
+          </a:xfrm>
+          <a:prstGeom prst="rect">
+            <a:avLst/>
+          </a:prstGeom>
+          <a:noFill/>
+        </p:spPr>
+        <p:txBody>
+          <a:bodyPr wrap="none" rtlCol="0">
+            <a:spAutoFit/>
+          </a:bodyPr>
+          <a:lstStyle/>
+          <a:p>
+            <a:r>
+              <a:rPr lang="en-US" sz="2400" b="1" u="sng" dirty="0"/>
+              <a:t>MODEL</a:t>
+            </a:r>
+          </a:p>
+        </p:txBody>
+      </p:sp>
+      <p:sp>
+        <p:nvSpPr>
+          <p:cNvPr id="11" name="TextBox 10"/>
+          <p:cNvSpPr txBox="1"/>
+          <p:nvPr/>
+        </p:nvSpPr>
+        <p:spPr>
+          <a:xfrm>
+            <a:off x="3558" y="5502729"/>
+            <a:ext cx="1318310" cy="461665"/>
+          </a:xfrm>
+          <a:prstGeom prst="rect">
+            <a:avLst/>
+          </a:prstGeom>
+          <a:noFill/>
+        </p:spPr>
+        <p:txBody>
+          <a:bodyPr wrap="none" rtlCol="0">
+            <a:spAutoFit/>
+          </a:bodyPr>
+          <a:lstStyle/>
+          <a:p>
+            <a:r>
+              <a:rPr lang="en-US" sz="2400" b="1" u="sng" dirty="0"/>
+              <a:t>ANALYZE</a:t>
+            </a:r>
+          </a:p>
+        </p:txBody>
+      </p:sp>
+    </p:spTree>
+    <p:extLst>
+      <p:ext uri="{BB962C8B-B14F-4D97-AF65-F5344CB8AC3E}">
+        <p14:creationId xmlns:p14="http://schemas.microsoft.com/office/powerpoint/2010/main" val="430253828"/>
+      </p:ext>
+    </p:extLst>
+  </p:cSld>
+  <p:clrMapOvr>
+    <a:masterClrMapping/>
+  </p:clrMapOvr>
+</p:sld>
+</file>
+
+<file path=ppt/slides/slide20.xml><?xml version="1.0" encoding="utf-8"?>
 <p:sld xmlns:a="http://schemas.openxmlformats.org/drawingml/2006/main" xmlns:r="http://schemas.openxmlformats.org/officeDocument/2006/relationships" xmlns:p="http://schemas.openxmlformats.org/presentationml/2006/main">
   <p:cSld>
     <p:spTree>
@@ -12364,7 +12019,7 @@
           <a:p>
             <a:fld id="{6700A58B-DD98-43D0-B791-721480A02982}" type="datetime1">
               <a:rPr lang="en-US" smtClean="0"/>
-              <a:t>10/23/23</a:t>
+              <a:t>10/21/24</a:t>
             </a:fld>
             <a:endParaRPr lang="en-US"/>
           </a:p>
@@ -12625,7 +12280,7 @@
 </p:sld>
 </file>
 
-<file path=ppt/slides/slide22.xml><?xml version="1.0" encoding="utf-8"?>
+<file path=ppt/slides/slide21.xml><?xml version="1.0" encoding="utf-8"?>
 <p:sld xmlns:a="http://schemas.openxmlformats.org/drawingml/2006/main" xmlns:r="http://schemas.openxmlformats.org/officeDocument/2006/relationships" xmlns:p="http://schemas.openxmlformats.org/presentationml/2006/main">
   <p:cSld>
     <p:spTree>
@@ -13649,7 +13304,7 @@
                 <a:tabLst/>
                 <a:defRPr/>
               </a:pPr>
-              <a:t>10/23/23</a:t>
+              <a:t>10/21/24</a:t>
             </a:fld>
             <a:endParaRPr kumimoji="0" lang="en-US" sz="900" b="0" i="0" u="none" strike="noStrike" kern="1200" cap="none" spc="0" normalizeH="0" baseline="0" noProof="0">
               <a:ln>
@@ -13783,7 +13438,7 @@
                 <a:tabLst/>
                 <a:defRPr/>
               </a:pPr>
-              <a:t>22</a:t>
+              <a:t>21</a:t>
             </a:fld>
             <a:endParaRPr kumimoji="0" lang="en-US" sz="900" b="0" i="0" u="none" strike="noStrike" kern="1200" cap="none" spc="0" normalizeH="0" baseline="0" noProof="0">
               <a:ln>
@@ -14115,7 +13770,7 @@
 </p:sld>
 </file>
 
-<file path=ppt/slides/slide23.xml><?xml version="1.0" encoding="utf-8"?>
+<file path=ppt/slides/slide22.xml><?xml version="1.0" encoding="utf-8"?>
 <p:sld xmlns:a="http://schemas.openxmlformats.org/drawingml/2006/main" xmlns:r="http://schemas.openxmlformats.org/officeDocument/2006/relationships" xmlns:p="http://schemas.openxmlformats.org/presentationml/2006/main">
   <p:cSld>
     <p:spTree>
@@ -15139,7 +14794,7 @@
                 <a:tabLst/>
                 <a:defRPr/>
               </a:pPr>
-              <a:t>10/23/23</a:t>
+              <a:t>10/21/24</a:t>
             </a:fld>
             <a:endParaRPr kumimoji="0" lang="en-US" sz="900" b="0" i="0" u="none" strike="noStrike" kern="1200" cap="none" spc="0" normalizeH="0" baseline="0" noProof="0">
               <a:ln>
@@ -15268,7 +14923,7 @@
                 <a:tabLst/>
                 <a:defRPr/>
               </a:pPr>
-              <a:t>23</a:t>
+              <a:t>22</a:t>
             </a:fld>
             <a:endParaRPr kumimoji="0" lang="en-US" sz="900" b="0" i="0" u="none" strike="noStrike" kern="1200" cap="none" spc="0" normalizeH="0" baseline="0" noProof="0">
               <a:ln>
@@ -15667,7 +15322,7 @@
 </p:sld>
 </file>
 
-<file path=ppt/slides/slide24.xml><?xml version="1.0" encoding="utf-8"?>
+<file path=ppt/slides/slide23.xml><?xml version="1.0" encoding="utf-8"?>
 <p:sld xmlns:a="http://schemas.openxmlformats.org/drawingml/2006/main" xmlns:r="http://schemas.openxmlformats.org/officeDocument/2006/relationships" xmlns:p="http://schemas.openxmlformats.org/presentationml/2006/main">
   <p:cSld>
     <p:spTree>
@@ -16691,7 +16346,7 @@
                 <a:tabLst/>
                 <a:defRPr/>
               </a:pPr>
-              <a:t>10/23/23</a:t>
+              <a:t>10/21/24</a:t>
             </a:fld>
             <a:endParaRPr kumimoji="0" lang="en-US" sz="900" b="0" i="0" u="none" strike="noStrike" kern="1200" cap="none" spc="0" normalizeH="0" baseline="0" noProof="0">
               <a:ln>
@@ -16754,6 +16409,651 @@
             <a:extLst>
               <a:ext uri="{FF2B5EF4-FFF2-40B4-BE49-F238E27FC236}">
                 <a16:creationId xmlns:a16="http://schemas.microsoft.com/office/drawing/2014/main" id="{1622718E-B7F3-4361-9A5A-C403876E2F31}"/>
+              </a:ext>
+            </a:extLst>
+          </p:cNvPr>
+          <p:cNvSpPr>
+            <a:spLocks noGrp="1"/>
+          </p:cNvSpPr>
+          <p:nvPr>
+            <p:ph type="sldNum" sz="quarter" idx="12"/>
+          </p:nvPr>
+        </p:nvSpPr>
+        <p:spPr/>
+        <p:txBody>
+          <a:bodyPr/>
+          <a:lstStyle/>
+          <a:p>
+            <a:pPr marL="0" marR="0" lvl="0" indent="0" algn="r" defTabSz="914400" rtl="0" eaLnBrk="1" fontAlgn="auto" latinLnBrk="0" hangingPunct="1">
+              <a:lnSpc>
+                <a:spcPct val="100000"/>
+              </a:lnSpc>
+              <a:spcBef>
+                <a:spcPts val="0"/>
+              </a:spcBef>
+              <a:spcAft>
+                <a:spcPts val="0"/>
+              </a:spcAft>
+              <a:buClrTx/>
+              <a:buSzTx/>
+              <a:buFontTx/>
+              <a:buNone/>
+              <a:tabLst/>
+              <a:defRPr/>
+            </a:pPr>
+            <a:fld id="{37290FF7-652B-4475-AEAB-8B1A5D23AE09}" type="slidenum">
+              <a:rPr kumimoji="0" lang="en-US" sz="900" b="0" i="0" u="none" strike="noStrike" kern="1200" cap="none" spc="0" normalizeH="0" baseline="0" noProof="0" smtClean="0">
+                <a:ln>
+                  <a:noFill/>
+                </a:ln>
+                <a:solidFill>
+                  <a:prstClr val="black">
+                    <a:tint val="75000"/>
+                  </a:prstClr>
+                </a:solidFill>
+                <a:effectLst/>
+                <a:uLnTx/>
+                <a:uFillTx/>
+                <a:latin typeface="Calibri" panose="020F0502020204030204"/>
+                <a:ea typeface="+mn-ea"/>
+                <a:cs typeface="+mn-cs"/>
+              </a:rPr>
+              <a:pPr marL="0" marR="0" lvl="0" indent="0" algn="r" defTabSz="914400" rtl="0" eaLnBrk="1" fontAlgn="auto" latinLnBrk="0" hangingPunct="1">
+                <a:lnSpc>
+                  <a:spcPct val="100000"/>
+                </a:lnSpc>
+                <a:spcBef>
+                  <a:spcPts val="0"/>
+                </a:spcBef>
+                <a:spcAft>
+                  <a:spcPts val="0"/>
+                </a:spcAft>
+                <a:buClrTx/>
+                <a:buSzTx/>
+                <a:buFontTx/>
+                <a:buNone/>
+                <a:tabLst/>
+                <a:defRPr/>
+              </a:pPr>
+              <a:t>23</a:t>
+            </a:fld>
+            <a:endParaRPr kumimoji="0" lang="en-US" sz="900" b="0" i="0" u="none" strike="noStrike" kern="1200" cap="none" spc="0" normalizeH="0" baseline="0" noProof="0">
+              <a:ln>
+                <a:noFill/>
+              </a:ln>
+              <a:solidFill>
+                <a:prstClr val="black">
+                  <a:tint val="75000"/>
+                </a:prstClr>
+              </a:solidFill>
+              <a:effectLst/>
+              <a:uLnTx/>
+              <a:uFillTx/>
+              <a:latin typeface="Calibri" panose="020F0502020204030204"/>
+              <a:ea typeface="+mn-ea"/>
+              <a:cs typeface="+mn-cs"/>
+            </a:endParaRPr>
+          </a:p>
+        </p:txBody>
+      </p:sp>
+      <p:sp>
+        <p:nvSpPr>
+          <p:cNvPr id="5" name="Footer Placeholder 4">
+            <a:extLst>
+              <a:ext uri="{FF2B5EF4-FFF2-40B4-BE49-F238E27FC236}">
+                <a16:creationId xmlns:a16="http://schemas.microsoft.com/office/drawing/2014/main" id="{A4BDCFDF-3D86-483E-A9AE-50A3B58B2260}"/>
+              </a:ext>
+            </a:extLst>
+          </p:cNvPr>
+          <p:cNvSpPr>
+            <a:spLocks noGrp="1"/>
+          </p:cNvSpPr>
+          <p:nvPr>
+            <p:ph type="ftr" sz="quarter" idx="3"/>
+          </p:nvPr>
+        </p:nvSpPr>
+        <p:spPr/>
+        <p:txBody>
+          <a:bodyPr/>
+          <a:lstStyle/>
+          <a:p>
+            <a:pPr marL="0" marR="0" lvl="0" indent="0" algn="ctr" defTabSz="914400" rtl="0" eaLnBrk="1" fontAlgn="auto" latinLnBrk="0" hangingPunct="1">
+              <a:lnSpc>
+                <a:spcPct val="100000"/>
+              </a:lnSpc>
+              <a:spcBef>
+                <a:spcPts val="0"/>
+              </a:spcBef>
+              <a:spcAft>
+                <a:spcPts val="0"/>
+              </a:spcAft>
+              <a:buClrTx/>
+              <a:buSzTx/>
+              <a:buFontTx/>
+              <a:buNone/>
+              <a:tabLst/>
+              <a:defRPr/>
+            </a:pPr>
+            <a:r>
+              <a:rPr kumimoji="0" lang="en-US" sz="900" b="0" i="0" u="none" strike="noStrike" kern="1200" cap="none" spc="0" normalizeH="0" baseline="0" noProof="0" dirty="0">
+                <a:ln>
+                  <a:noFill/>
+                </a:ln>
+                <a:solidFill>
+                  <a:prstClr val="black">
+                    <a:tint val="75000"/>
+                  </a:prstClr>
+                </a:solidFill>
+                <a:effectLst/>
+                <a:uLnTx/>
+                <a:uFillTx/>
+                <a:latin typeface="Calibri" panose="020F0502020204030204"/>
+                <a:ea typeface="+mn-ea"/>
+                <a:cs typeface="+mn-cs"/>
+              </a:rPr>
+              <a:t>Kwartler </a:t>
+            </a:r>
+          </a:p>
+        </p:txBody>
+      </p:sp>
+      <p:sp>
+        <p:nvSpPr>
+          <p:cNvPr id="20" name="Oval 19">
+            <a:extLst>
+              <a:ext uri="{FF2B5EF4-FFF2-40B4-BE49-F238E27FC236}">
+                <a16:creationId xmlns:a16="http://schemas.microsoft.com/office/drawing/2014/main" id="{C4B97301-62D5-4D3A-B60B-AC5FC4284485}"/>
+              </a:ext>
+            </a:extLst>
+          </p:cNvPr>
+          <p:cNvSpPr/>
+          <p:nvPr/>
+        </p:nvSpPr>
+        <p:spPr>
+          <a:xfrm>
+            <a:off x="2290740" y="4804313"/>
+            <a:ext cx="947872" cy="867941"/>
+          </a:xfrm>
+          <a:prstGeom prst="ellipse">
+            <a:avLst/>
+          </a:prstGeom>
+          <a:solidFill>
+            <a:schemeClr val="accent6"/>
+          </a:solidFill>
+        </p:spPr>
+        <p:style>
+          <a:lnRef idx="2">
+            <a:schemeClr val="accent1">
+              <a:shade val="50000"/>
+            </a:schemeClr>
+          </a:lnRef>
+          <a:fillRef idx="1">
+            <a:schemeClr val="accent1"/>
+          </a:fillRef>
+          <a:effectRef idx="0">
+            <a:schemeClr val="accent1"/>
+          </a:effectRef>
+          <a:fontRef idx="minor">
+            <a:schemeClr val="lt1"/>
+          </a:fontRef>
+        </p:style>
+        <p:txBody>
+          <a:bodyPr rtlCol="0" anchor="ctr"/>
+          <a:lstStyle/>
+          <a:p>
+            <a:pPr marL="0" marR="0" lvl="0" indent="0" algn="ctr" defTabSz="914400" rtl="0" eaLnBrk="1" fontAlgn="auto" latinLnBrk="0" hangingPunct="1">
+              <a:lnSpc>
+                <a:spcPct val="100000"/>
+              </a:lnSpc>
+              <a:spcBef>
+                <a:spcPts val="0"/>
+              </a:spcBef>
+              <a:spcAft>
+                <a:spcPts val="0"/>
+              </a:spcAft>
+              <a:buClrTx/>
+              <a:buSzTx/>
+              <a:buFontTx/>
+              <a:buNone/>
+              <a:tabLst/>
+              <a:defRPr/>
+            </a:pPr>
+            <a:r>
+              <a:rPr kumimoji="0" lang="en-US" sz="1050" b="0" i="0" u="none" strike="noStrike" kern="1200" cap="none" spc="0" normalizeH="0" baseline="0" noProof="0" dirty="0">
+                <a:ln>
+                  <a:noFill/>
+                </a:ln>
+                <a:solidFill>
+                  <a:prstClr val="white"/>
+                </a:solidFill>
+                <a:effectLst/>
+                <a:uLnTx/>
+                <a:uFillTx/>
+                <a:latin typeface="Calibri" panose="020F0502020204030204"/>
+                <a:ea typeface="+mn-ea"/>
+                <a:cs typeface="+mn-cs"/>
+              </a:rPr>
+              <a:t>Age = </a:t>
+            </a:r>
+            <a:r>
+              <a:rPr lang="en-US" sz="1050" dirty="0">
+                <a:solidFill>
+                  <a:prstClr val="white"/>
+                </a:solidFill>
+                <a:latin typeface="Calibri" panose="020F0502020204030204"/>
+              </a:rPr>
+              <a:t>25</a:t>
+            </a:r>
+            <a:endParaRPr kumimoji="0" lang="en-US" sz="1050" b="0" i="0" u="none" strike="noStrike" kern="1200" cap="none" spc="0" normalizeH="0" baseline="0" noProof="0" dirty="0">
+              <a:ln>
+                <a:noFill/>
+              </a:ln>
+              <a:solidFill>
+                <a:prstClr val="white"/>
+              </a:solidFill>
+              <a:effectLst/>
+              <a:uLnTx/>
+              <a:uFillTx/>
+              <a:latin typeface="Calibri" panose="020F0502020204030204"/>
+              <a:ea typeface="+mn-ea"/>
+              <a:cs typeface="+mn-cs"/>
+            </a:endParaRPr>
+          </a:p>
+          <a:p>
+            <a:pPr marL="0" marR="0" lvl="0" indent="0" algn="ctr" defTabSz="914400" rtl="0" eaLnBrk="1" fontAlgn="auto" latinLnBrk="0" hangingPunct="1">
+              <a:lnSpc>
+                <a:spcPct val="100000"/>
+              </a:lnSpc>
+              <a:spcBef>
+                <a:spcPts val="0"/>
+              </a:spcBef>
+              <a:spcAft>
+                <a:spcPts val="0"/>
+              </a:spcAft>
+              <a:buClrTx/>
+              <a:buSzTx/>
+              <a:buFontTx/>
+              <a:buNone/>
+              <a:tabLst/>
+              <a:defRPr/>
+            </a:pPr>
+            <a:r>
+              <a:rPr kumimoji="0" lang="en-US" sz="1050" b="0" i="0" u="none" strike="noStrike" kern="1200" cap="none" spc="0" normalizeH="0" baseline="0" noProof="0" dirty="0">
+                <a:ln>
+                  <a:noFill/>
+                </a:ln>
+                <a:solidFill>
+                  <a:prstClr val="white"/>
+                </a:solidFill>
+                <a:effectLst/>
+                <a:uLnTx/>
+                <a:uFillTx/>
+                <a:latin typeface="Calibri" panose="020F0502020204030204"/>
+                <a:ea typeface="+mn-ea"/>
+                <a:cs typeface="+mn-cs"/>
+              </a:rPr>
+              <a:t>Duration = </a:t>
+            </a:r>
+            <a:r>
+              <a:rPr lang="en-US" sz="1050" dirty="0">
+                <a:solidFill>
+                  <a:prstClr val="white"/>
+                </a:solidFill>
+                <a:latin typeface="Calibri" panose="020F0502020204030204"/>
+              </a:rPr>
+              <a:t>365</a:t>
+            </a:r>
+            <a:endParaRPr kumimoji="0" lang="en-US" sz="1050" b="0" i="0" u="none" strike="noStrike" kern="1200" cap="none" spc="0" normalizeH="0" baseline="0" noProof="0" dirty="0">
+              <a:ln>
+                <a:noFill/>
+              </a:ln>
+              <a:solidFill>
+                <a:prstClr val="white"/>
+              </a:solidFill>
+              <a:effectLst/>
+              <a:uLnTx/>
+              <a:uFillTx/>
+              <a:latin typeface="Calibri" panose="020F0502020204030204"/>
+              <a:ea typeface="+mn-ea"/>
+              <a:cs typeface="+mn-cs"/>
+            </a:endParaRPr>
+          </a:p>
+        </p:txBody>
+      </p:sp>
+      <p:sp>
+        <p:nvSpPr>
+          <p:cNvPr id="21" name="Arrow: Down 20">
+            <a:extLst>
+              <a:ext uri="{FF2B5EF4-FFF2-40B4-BE49-F238E27FC236}">
+                <a16:creationId xmlns:a16="http://schemas.microsoft.com/office/drawing/2014/main" id="{A731FE05-C3F8-44A3-BB55-6EFDE0781CCE}"/>
+              </a:ext>
+            </a:extLst>
+          </p:cNvPr>
+          <p:cNvSpPr/>
+          <p:nvPr/>
+        </p:nvSpPr>
+        <p:spPr>
+          <a:xfrm rot="1339528">
+            <a:off x="3060996" y="4350712"/>
+            <a:ext cx="281348" cy="626999"/>
+          </a:xfrm>
+          <a:prstGeom prst="downArrow">
+            <a:avLst/>
+          </a:prstGeom>
+        </p:spPr>
+        <p:style>
+          <a:lnRef idx="2">
+            <a:schemeClr val="accent1">
+              <a:shade val="50000"/>
+            </a:schemeClr>
+          </a:lnRef>
+          <a:fillRef idx="1">
+            <a:schemeClr val="accent1"/>
+          </a:fillRef>
+          <a:effectRef idx="0">
+            <a:schemeClr val="accent1"/>
+          </a:effectRef>
+          <a:fontRef idx="minor">
+            <a:schemeClr val="lt1"/>
+          </a:fontRef>
+        </p:style>
+        <p:txBody>
+          <a:bodyPr rtlCol="0" anchor="ctr"/>
+          <a:lstStyle/>
+          <a:p>
+            <a:pPr marL="0" marR="0" lvl="0" indent="0" algn="ctr" defTabSz="914400" rtl="0" eaLnBrk="1" fontAlgn="auto" latinLnBrk="0" hangingPunct="1">
+              <a:lnSpc>
+                <a:spcPct val="100000"/>
+              </a:lnSpc>
+              <a:spcBef>
+                <a:spcPts val="0"/>
+              </a:spcBef>
+              <a:spcAft>
+                <a:spcPts val="0"/>
+              </a:spcAft>
+              <a:buClrTx/>
+              <a:buSzTx/>
+              <a:buFontTx/>
+              <a:buNone/>
+              <a:tabLst/>
+              <a:defRPr/>
+            </a:pPr>
+            <a:endParaRPr kumimoji="0" lang="en-US" sz="1800" b="0" i="0" u="none" strike="noStrike" kern="1200" cap="none" spc="0" normalizeH="0" baseline="0" noProof="0">
+              <a:ln>
+                <a:noFill/>
+              </a:ln>
+              <a:solidFill>
+                <a:prstClr val="white"/>
+              </a:solidFill>
+              <a:effectLst/>
+              <a:uLnTx/>
+              <a:uFillTx/>
+              <a:latin typeface="Calibri" panose="020F0502020204030204"/>
+              <a:ea typeface="+mn-ea"/>
+              <a:cs typeface="+mn-cs"/>
+            </a:endParaRPr>
+          </a:p>
+        </p:txBody>
+      </p:sp>
+      <p:sp>
+        <p:nvSpPr>
+          <p:cNvPr id="6" name="TextBox 5">
+            <a:extLst>
+              <a:ext uri="{FF2B5EF4-FFF2-40B4-BE49-F238E27FC236}">
+                <a16:creationId xmlns:a16="http://schemas.microsoft.com/office/drawing/2014/main" id="{2E862172-BFCE-4A92-9D62-B4EACB71372C}"/>
+              </a:ext>
+            </a:extLst>
+          </p:cNvPr>
+          <p:cNvSpPr txBox="1"/>
+          <p:nvPr/>
+        </p:nvSpPr>
+        <p:spPr>
+          <a:xfrm>
+            <a:off x="5791200" y="1604518"/>
+            <a:ext cx="3200400" cy="1477328"/>
+          </a:xfrm>
+          <a:prstGeom prst="rect">
+            <a:avLst/>
+          </a:prstGeom>
+          <a:solidFill>
+            <a:schemeClr val="accent5"/>
+          </a:solidFill>
+        </p:spPr>
+        <p:txBody>
+          <a:bodyPr wrap="square" rtlCol="0">
+            <a:spAutoFit/>
+          </a:bodyPr>
+          <a:lstStyle/>
+          <a:p>
+            <a:pPr marL="0" marR="0" lvl="0" indent="0" algn="l" defTabSz="914400" rtl="0" eaLnBrk="1" fontAlgn="auto" latinLnBrk="0" hangingPunct="1">
+              <a:lnSpc>
+                <a:spcPct val="100000"/>
+              </a:lnSpc>
+              <a:spcBef>
+                <a:spcPts val="0"/>
+              </a:spcBef>
+              <a:spcAft>
+                <a:spcPts val="0"/>
+              </a:spcAft>
+              <a:buClrTx/>
+              <a:buSzTx/>
+              <a:buFontTx/>
+              <a:buNone/>
+              <a:tabLst/>
+              <a:defRPr/>
+            </a:pPr>
+            <a:r>
+              <a:rPr lang="en-US" dirty="0">
+                <a:solidFill>
+                  <a:prstClr val="black"/>
+                </a:solidFill>
+                <a:latin typeface="Calibri" panose="020F0502020204030204"/>
+              </a:rPr>
+              <a:t>Now the duration is less than 635 so the record drops to the terminal “NO”  and has a probability of accepting the loan offer of ~10%</a:t>
+            </a:r>
+            <a:endParaRPr kumimoji="0" lang="en-US" sz="1800" b="0" i="0" u="none" strike="noStrike" kern="1200" cap="none" spc="0" normalizeH="0" baseline="0" noProof="0" dirty="0">
+              <a:ln>
+                <a:noFill/>
+              </a:ln>
+              <a:solidFill>
+                <a:prstClr val="black"/>
+              </a:solidFill>
+              <a:effectLst/>
+              <a:uLnTx/>
+              <a:uFillTx/>
+              <a:latin typeface="Calibri" panose="020F0502020204030204"/>
+              <a:ea typeface="+mn-ea"/>
+              <a:cs typeface="+mn-cs"/>
+            </a:endParaRPr>
+          </a:p>
+        </p:txBody>
+      </p:sp>
+    </p:spTree>
+    <p:extLst>
+      <p:ext uri="{BB962C8B-B14F-4D97-AF65-F5344CB8AC3E}">
+        <p14:creationId xmlns:p14="http://schemas.microsoft.com/office/powerpoint/2010/main" val="3721702506"/>
+      </p:ext>
+    </p:extLst>
+  </p:cSld>
+  <p:clrMapOvr>
+    <a:masterClrMapping/>
+  </p:clrMapOvr>
+</p:sld>
+</file>
+
+<file path=ppt/slides/slide24.xml><?xml version="1.0" encoding="utf-8"?>
+<p:sld xmlns:a="http://schemas.openxmlformats.org/drawingml/2006/main" xmlns:r="http://schemas.openxmlformats.org/officeDocument/2006/relationships" xmlns:p="http://schemas.openxmlformats.org/presentationml/2006/main">
+  <p:cSld>
+    <p:spTree>
+      <p:nvGrpSpPr>
+        <p:cNvPr id="1" name=""/>
+        <p:cNvGrpSpPr/>
+        <p:nvPr/>
+      </p:nvGrpSpPr>
+      <p:grpSpPr>
+        <a:xfrm>
+          <a:off x="0" y="0"/>
+          <a:ext cx="0" cy="0"/>
+          <a:chOff x="0" y="0"/>
+          <a:chExt cx="0" cy="0"/>
+        </a:xfrm>
+      </p:grpSpPr>
+      <p:pic>
+        <p:nvPicPr>
+          <p:cNvPr id="6" name="Picture 5">
+            <a:extLst>
+              <a:ext uri="{FF2B5EF4-FFF2-40B4-BE49-F238E27FC236}">
+                <a16:creationId xmlns:a16="http://schemas.microsoft.com/office/drawing/2014/main" id="{1C822ADE-CAD8-4FC5-AA4B-066A40169EBC}"/>
+              </a:ext>
+            </a:extLst>
+          </p:cNvPr>
+          <p:cNvPicPr>
+            <a:picLocks noChangeAspect="1"/>
+          </p:cNvPicPr>
+          <p:nvPr/>
+        </p:nvPicPr>
+        <p:blipFill>
+          <a:blip r:embed="rId2"/>
+          <a:stretch>
+            <a:fillRect/>
+          </a:stretch>
+        </p:blipFill>
+        <p:spPr>
+          <a:xfrm>
+            <a:off x="1524000" y="1200832"/>
+            <a:ext cx="5614254" cy="5332219"/>
+          </a:xfrm>
+          <a:prstGeom prst="rect">
+            <a:avLst/>
+          </a:prstGeom>
+        </p:spPr>
+      </p:pic>
+      <p:sp>
+        <p:nvSpPr>
+          <p:cNvPr id="2" name="Date Placeholder 1">
+            <a:extLst>
+              <a:ext uri="{FF2B5EF4-FFF2-40B4-BE49-F238E27FC236}">
+                <a16:creationId xmlns:a16="http://schemas.microsoft.com/office/drawing/2014/main" id="{231DB28B-F86F-49C3-9E90-BBA54DEB762A}"/>
+              </a:ext>
+            </a:extLst>
+          </p:cNvPr>
+          <p:cNvSpPr>
+            <a:spLocks noGrp="1"/>
+          </p:cNvSpPr>
+          <p:nvPr>
+            <p:ph type="dt" sz="half" idx="10"/>
+          </p:nvPr>
+        </p:nvSpPr>
+        <p:spPr/>
+        <p:txBody>
+          <a:bodyPr/>
+          <a:lstStyle/>
+          <a:p>
+            <a:pPr marL="0" marR="0" lvl="0" indent="0" algn="l" defTabSz="914400" rtl="0" eaLnBrk="1" fontAlgn="auto" latinLnBrk="0" hangingPunct="1">
+              <a:lnSpc>
+                <a:spcPct val="100000"/>
+              </a:lnSpc>
+              <a:spcBef>
+                <a:spcPts val="0"/>
+              </a:spcBef>
+              <a:spcAft>
+                <a:spcPts val="0"/>
+              </a:spcAft>
+              <a:buClrTx/>
+              <a:buSzTx/>
+              <a:buFontTx/>
+              <a:buNone/>
+              <a:tabLst/>
+              <a:defRPr/>
+            </a:pPr>
+            <a:fld id="{6700A58B-DD98-43D0-B791-721480A02982}" type="datetime1">
+              <a:rPr kumimoji="0" lang="en-US" sz="900" b="0" i="0" u="none" strike="noStrike" kern="1200" cap="none" spc="0" normalizeH="0" baseline="0" noProof="0" smtClean="0">
+                <a:ln>
+                  <a:noFill/>
+                </a:ln>
+                <a:solidFill>
+                  <a:prstClr val="black">
+                    <a:tint val="75000"/>
+                  </a:prstClr>
+                </a:solidFill>
+                <a:effectLst/>
+                <a:uLnTx/>
+                <a:uFillTx/>
+                <a:latin typeface="Calibri" panose="020F0502020204030204"/>
+                <a:ea typeface="+mn-ea"/>
+                <a:cs typeface="+mn-cs"/>
+              </a:rPr>
+              <a:pPr marL="0" marR="0" lvl="0" indent="0" algn="l" defTabSz="914400" rtl="0" eaLnBrk="1" fontAlgn="auto" latinLnBrk="0" hangingPunct="1">
+                <a:lnSpc>
+                  <a:spcPct val="100000"/>
+                </a:lnSpc>
+                <a:spcBef>
+                  <a:spcPts val="0"/>
+                </a:spcBef>
+                <a:spcAft>
+                  <a:spcPts val="0"/>
+                </a:spcAft>
+                <a:buClrTx/>
+                <a:buSzTx/>
+                <a:buFontTx/>
+                <a:buNone/>
+                <a:tabLst/>
+                <a:defRPr/>
+              </a:pPr>
+              <a:t>10/21/24</a:t>
+            </a:fld>
+            <a:endParaRPr kumimoji="0" lang="en-US" sz="900" b="0" i="0" u="none" strike="noStrike" kern="1200" cap="none" spc="0" normalizeH="0" baseline="0" noProof="0">
+              <a:ln>
+                <a:noFill/>
+              </a:ln>
+              <a:solidFill>
+                <a:prstClr val="black">
+                  <a:tint val="75000"/>
+                </a:prstClr>
+              </a:solidFill>
+              <a:effectLst/>
+              <a:uLnTx/>
+              <a:uFillTx/>
+              <a:latin typeface="Calibri" panose="020F0502020204030204"/>
+              <a:ea typeface="+mn-ea"/>
+              <a:cs typeface="+mn-cs"/>
+            </a:endParaRPr>
+          </a:p>
+        </p:txBody>
+      </p:sp>
+      <p:sp>
+        <p:nvSpPr>
+          <p:cNvPr id="3" name="Title 2">
+            <a:extLst>
+              <a:ext uri="{FF2B5EF4-FFF2-40B4-BE49-F238E27FC236}">
+                <a16:creationId xmlns:a16="http://schemas.microsoft.com/office/drawing/2014/main" id="{B10DF302-8836-406C-93BA-FC26714BD6C5}"/>
+              </a:ext>
+            </a:extLst>
+          </p:cNvPr>
+          <p:cNvSpPr>
+            <a:spLocks noGrp="1"/>
+          </p:cNvSpPr>
+          <p:nvPr>
+            <p:ph type="title"/>
+          </p:nvPr>
+        </p:nvSpPr>
+        <p:spPr/>
+        <p:txBody>
+          <a:bodyPr/>
+          <a:lstStyle/>
+          <a:p>
+            <a:r>
+              <a:rPr lang="en-US" dirty="0"/>
+              <a:t>2 Rule Tree</a:t>
+            </a:r>
+          </a:p>
+        </p:txBody>
+      </p:sp>
+      <p:sp>
+        <p:nvSpPr>
+          <p:cNvPr id="4" name="Slide Number Placeholder 3">
+            <a:extLst>
+              <a:ext uri="{FF2B5EF4-FFF2-40B4-BE49-F238E27FC236}">
+                <a16:creationId xmlns:a16="http://schemas.microsoft.com/office/drawing/2014/main" id="{C1A7BFED-0798-47F8-9058-CB0D619631DA}"/>
               </a:ext>
             </a:extLst>
           </p:cNvPr>
@@ -16846,651 +17146,6 @@
           <p:cNvPr id="5" name="Footer Placeholder 4">
             <a:extLst>
               <a:ext uri="{FF2B5EF4-FFF2-40B4-BE49-F238E27FC236}">
-                <a16:creationId xmlns:a16="http://schemas.microsoft.com/office/drawing/2014/main" id="{A4BDCFDF-3D86-483E-A9AE-50A3B58B2260}"/>
-              </a:ext>
-            </a:extLst>
-          </p:cNvPr>
-          <p:cNvSpPr>
-            <a:spLocks noGrp="1"/>
-          </p:cNvSpPr>
-          <p:nvPr>
-            <p:ph type="ftr" sz="quarter" idx="3"/>
-          </p:nvPr>
-        </p:nvSpPr>
-        <p:spPr/>
-        <p:txBody>
-          <a:bodyPr/>
-          <a:lstStyle/>
-          <a:p>
-            <a:pPr marL="0" marR="0" lvl="0" indent="0" algn="ctr" defTabSz="914400" rtl="0" eaLnBrk="1" fontAlgn="auto" latinLnBrk="0" hangingPunct="1">
-              <a:lnSpc>
-                <a:spcPct val="100000"/>
-              </a:lnSpc>
-              <a:spcBef>
-                <a:spcPts val="0"/>
-              </a:spcBef>
-              <a:spcAft>
-                <a:spcPts val="0"/>
-              </a:spcAft>
-              <a:buClrTx/>
-              <a:buSzTx/>
-              <a:buFontTx/>
-              <a:buNone/>
-              <a:tabLst/>
-              <a:defRPr/>
-            </a:pPr>
-            <a:r>
-              <a:rPr kumimoji="0" lang="en-US" sz="900" b="0" i="0" u="none" strike="noStrike" kern="1200" cap="none" spc="0" normalizeH="0" baseline="0" noProof="0" dirty="0">
-                <a:ln>
-                  <a:noFill/>
-                </a:ln>
-                <a:solidFill>
-                  <a:prstClr val="black">
-                    <a:tint val="75000"/>
-                  </a:prstClr>
-                </a:solidFill>
-                <a:effectLst/>
-                <a:uLnTx/>
-                <a:uFillTx/>
-                <a:latin typeface="Calibri" panose="020F0502020204030204"/>
-                <a:ea typeface="+mn-ea"/>
-                <a:cs typeface="+mn-cs"/>
-              </a:rPr>
-              <a:t>Kwartler </a:t>
-            </a:r>
-          </a:p>
-        </p:txBody>
-      </p:sp>
-      <p:sp>
-        <p:nvSpPr>
-          <p:cNvPr id="20" name="Oval 19">
-            <a:extLst>
-              <a:ext uri="{FF2B5EF4-FFF2-40B4-BE49-F238E27FC236}">
-                <a16:creationId xmlns:a16="http://schemas.microsoft.com/office/drawing/2014/main" id="{C4B97301-62D5-4D3A-B60B-AC5FC4284485}"/>
-              </a:ext>
-            </a:extLst>
-          </p:cNvPr>
-          <p:cNvSpPr/>
-          <p:nvPr/>
-        </p:nvSpPr>
-        <p:spPr>
-          <a:xfrm>
-            <a:off x="2290740" y="4804313"/>
-            <a:ext cx="947872" cy="867941"/>
-          </a:xfrm>
-          <a:prstGeom prst="ellipse">
-            <a:avLst/>
-          </a:prstGeom>
-          <a:solidFill>
-            <a:schemeClr val="accent6"/>
-          </a:solidFill>
-        </p:spPr>
-        <p:style>
-          <a:lnRef idx="2">
-            <a:schemeClr val="accent1">
-              <a:shade val="50000"/>
-            </a:schemeClr>
-          </a:lnRef>
-          <a:fillRef idx="1">
-            <a:schemeClr val="accent1"/>
-          </a:fillRef>
-          <a:effectRef idx="0">
-            <a:schemeClr val="accent1"/>
-          </a:effectRef>
-          <a:fontRef idx="minor">
-            <a:schemeClr val="lt1"/>
-          </a:fontRef>
-        </p:style>
-        <p:txBody>
-          <a:bodyPr rtlCol="0" anchor="ctr"/>
-          <a:lstStyle/>
-          <a:p>
-            <a:pPr marL="0" marR="0" lvl="0" indent="0" algn="ctr" defTabSz="914400" rtl="0" eaLnBrk="1" fontAlgn="auto" latinLnBrk="0" hangingPunct="1">
-              <a:lnSpc>
-                <a:spcPct val="100000"/>
-              </a:lnSpc>
-              <a:spcBef>
-                <a:spcPts val="0"/>
-              </a:spcBef>
-              <a:spcAft>
-                <a:spcPts val="0"/>
-              </a:spcAft>
-              <a:buClrTx/>
-              <a:buSzTx/>
-              <a:buFontTx/>
-              <a:buNone/>
-              <a:tabLst/>
-              <a:defRPr/>
-            </a:pPr>
-            <a:r>
-              <a:rPr kumimoji="0" lang="en-US" sz="1050" b="0" i="0" u="none" strike="noStrike" kern="1200" cap="none" spc="0" normalizeH="0" baseline="0" noProof="0" dirty="0">
-                <a:ln>
-                  <a:noFill/>
-                </a:ln>
-                <a:solidFill>
-                  <a:prstClr val="white"/>
-                </a:solidFill>
-                <a:effectLst/>
-                <a:uLnTx/>
-                <a:uFillTx/>
-                <a:latin typeface="Calibri" panose="020F0502020204030204"/>
-                <a:ea typeface="+mn-ea"/>
-                <a:cs typeface="+mn-cs"/>
-              </a:rPr>
-              <a:t>Age = </a:t>
-            </a:r>
-            <a:r>
-              <a:rPr lang="en-US" sz="1050" dirty="0">
-                <a:solidFill>
-                  <a:prstClr val="white"/>
-                </a:solidFill>
-                <a:latin typeface="Calibri" panose="020F0502020204030204"/>
-              </a:rPr>
-              <a:t>25</a:t>
-            </a:r>
-            <a:endParaRPr kumimoji="0" lang="en-US" sz="1050" b="0" i="0" u="none" strike="noStrike" kern="1200" cap="none" spc="0" normalizeH="0" baseline="0" noProof="0" dirty="0">
-              <a:ln>
-                <a:noFill/>
-              </a:ln>
-              <a:solidFill>
-                <a:prstClr val="white"/>
-              </a:solidFill>
-              <a:effectLst/>
-              <a:uLnTx/>
-              <a:uFillTx/>
-              <a:latin typeface="Calibri" panose="020F0502020204030204"/>
-              <a:ea typeface="+mn-ea"/>
-              <a:cs typeface="+mn-cs"/>
-            </a:endParaRPr>
-          </a:p>
-          <a:p>
-            <a:pPr marL="0" marR="0" lvl="0" indent="0" algn="ctr" defTabSz="914400" rtl="0" eaLnBrk="1" fontAlgn="auto" latinLnBrk="0" hangingPunct="1">
-              <a:lnSpc>
-                <a:spcPct val="100000"/>
-              </a:lnSpc>
-              <a:spcBef>
-                <a:spcPts val="0"/>
-              </a:spcBef>
-              <a:spcAft>
-                <a:spcPts val="0"/>
-              </a:spcAft>
-              <a:buClrTx/>
-              <a:buSzTx/>
-              <a:buFontTx/>
-              <a:buNone/>
-              <a:tabLst/>
-              <a:defRPr/>
-            </a:pPr>
-            <a:r>
-              <a:rPr kumimoji="0" lang="en-US" sz="1050" b="0" i="0" u="none" strike="noStrike" kern="1200" cap="none" spc="0" normalizeH="0" baseline="0" noProof="0" dirty="0">
-                <a:ln>
-                  <a:noFill/>
-                </a:ln>
-                <a:solidFill>
-                  <a:prstClr val="white"/>
-                </a:solidFill>
-                <a:effectLst/>
-                <a:uLnTx/>
-                <a:uFillTx/>
-                <a:latin typeface="Calibri" panose="020F0502020204030204"/>
-                <a:ea typeface="+mn-ea"/>
-                <a:cs typeface="+mn-cs"/>
-              </a:rPr>
-              <a:t>Duration = </a:t>
-            </a:r>
-            <a:r>
-              <a:rPr lang="en-US" sz="1050" dirty="0">
-                <a:solidFill>
-                  <a:prstClr val="white"/>
-                </a:solidFill>
-                <a:latin typeface="Calibri" panose="020F0502020204030204"/>
-              </a:rPr>
-              <a:t>365</a:t>
-            </a:r>
-            <a:endParaRPr kumimoji="0" lang="en-US" sz="1050" b="0" i="0" u="none" strike="noStrike" kern="1200" cap="none" spc="0" normalizeH="0" baseline="0" noProof="0" dirty="0">
-              <a:ln>
-                <a:noFill/>
-              </a:ln>
-              <a:solidFill>
-                <a:prstClr val="white"/>
-              </a:solidFill>
-              <a:effectLst/>
-              <a:uLnTx/>
-              <a:uFillTx/>
-              <a:latin typeface="Calibri" panose="020F0502020204030204"/>
-              <a:ea typeface="+mn-ea"/>
-              <a:cs typeface="+mn-cs"/>
-            </a:endParaRPr>
-          </a:p>
-        </p:txBody>
-      </p:sp>
-      <p:sp>
-        <p:nvSpPr>
-          <p:cNvPr id="21" name="Arrow: Down 20">
-            <a:extLst>
-              <a:ext uri="{FF2B5EF4-FFF2-40B4-BE49-F238E27FC236}">
-                <a16:creationId xmlns:a16="http://schemas.microsoft.com/office/drawing/2014/main" id="{A731FE05-C3F8-44A3-BB55-6EFDE0781CCE}"/>
-              </a:ext>
-            </a:extLst>
-          </p:cNvPr>
-          <p:cNvSpPr/>
-          <p:nvPr/>
-        </p:nvSpPr>
-        <p:spPr>
-          <a:xfrm rot="1339528">
-            <a:off x="3060996" y="4350712"/>
-            <a:ext cx="281348" cy="626999"/>
-          </a:xfrm>
-          <a:prstGeom prst="downArrow">
-            <a:avLst/>
-          </a:prstGeom>
-        </p:spPr>
-        <p:style>
-          <a:lnRef idx="2">
-            <a:schemeClr val="accent1">
-              <a:shade val="50000"/>
-            </a:schemeClr>
-          </a:lnRef>
-          <a:fillRef idx="1">
-            <a:schemeClr val="accent1"/>
-          </a:fillRef>
-          <a:effectRef idx="0">
-            <a:schemeClr val="accent1"/>
-          </a:effectRef>
-          <a:fontRef idx="minor">
-            <a:schemeClr val="lt1"/>
-          </a:fontRef>
-        </p:style>
-        <p:txBody>
-          <a:bodyPr rtlCol="0" anchor="ctr"/>
-          <a:lstStyle/>
-          <a:p>
-            <a:pPr marL="0" marR="0" lvl="0" indent="0" algn="ctr" defTabSz="914400" rtl="0" eaLnBrk="1" fontAlgn="auto" latinLnBrk="0" hangingPunct="1">
-              <a:lnSpc>
-                <a:spcPct val="100000"/>
-              </a:lnSpc>
-              <a:spcBef>
-                <a:spcPts val="0"/>
-              </a:spcBef>
-              <a:spcAft>
-                <a:spcPts val="0"/>
-              </a:spcAft>
-              <a:buClrTx/>
-              <a:buSzTx/>
-              <a:buFontTx/>
-              <a:buNone/>
-              <a:tabLst/>
-              <a:defRPr/>
-            </a:pPr>
-            <a:endParaRPr kumimoji="0" lang="en-US" sz="1800" b="0" i="0" u="none" strike="noStrike" kern="1200" cap="none" spc="0" normalizeH="0" baseline="0" noProof="0">
-              <a:ln>
-                <a:noFill/>
-              </a:ln>
-              <a:solidFill>
-                <a:prstClr val="white"/>
-              </a:solidFill>
-              <a:effectLst/>
-              <a:uLnTx/>
-              <a:uFillTx/>
-              <a:latin typeface="Calibri" panose="020F0502020204030204"/>
-              <a:ea typeface="+mn-ea"/>
-              <a:cs typeface="+mn-cs"/>
-            </a:endParaRPr>
-          </a:p>
-        </p:txBody>
-      </p:sp>
-      <p:sp>
-        <p:nvSpPr>
-          <p:cNvPr id="6" name="TextBox 5">
-            <a:extLst>
-              <a:ext uri="{FF2B5EF4-FFF2-40B4-BE49-F238E27FC236}">
-                <a16:creationId xmlns:a16="http://schemas.microsoft.com/office/drawing/2014/main" id="{2E862172-BFCE-4A92-9D62-B4EACB71372C}"/>
-              </a:ext>
-            </a:extLst>
-          </p:cNvPr>
-          <p:cNvSpPr txBox="1"/>
-          <p:nvPr/>
-        </p:nvSpPr>
-        <p:spPr>
-          <a:xfrm>
-            <a:off x="5791200" y="1604518"/>
-            <a:ext cx="3200400" cy="1477328"/>
-          </a:xfrm>
-          <a:prstGeom prst="rect">
-            <a:avLst/>
-          </a:prstGeom>
-          <a:solidFill>
-            <a:schemeClr val="accent5"/>
-          </a:solidFill>
-        </p:spPr>
-        <p:txBody>
-          <a:bodyPr wrap="square" rtlCol="0">
-            <a:spAutoFit/>
-          </a:bodyPr>
-          <a:lstStyle/>
-          <a:p>
-            <a:pPr marL="0" marR="0" lvl="0" indent="0" algn="l" defTabSz="914400" rtl="0" eaLnBrk="1" fontAlgn="auto" latinLnBrk="0" hangingPunct="1">
-              <a:lnSpc>
-                <a:spcPct val="100000"/>
-              </a:lnSpc>
-              <a:spcBef>
-                <a:spcPts val="0"/>
-              </a:spcBef>
-              <a:spcAft>
-                <a:spcPts val="0"/>
-              </a:spcAft>
-              <a:buClrTx/>
-              <a:buSzTx/>
-              <a:buFontTx/>
-              <a:buNone/>
-              <a:tabLst/>
-              <a:defRPr/>
-            </a:pPr>
-            <a:r>
-              <a:rPr lang="en-US" dirty="0">
-                <a:solidFill>
-                  <a:prstClr val="black"/>
-                </a:solidFill>
-                <a:latin typeface="Calibri" panose="020F0502020204030204"/>
-              </a:rPr>
-              <a:t>Now the duration is less than 635 so the record drops to the terminal “NO”  and has a probability of accepting the loan offer of ~10%</a:t>
-            </a:r>
-            <a:endParaRPr kumimoji="0" lang="en-US" sz="1800" b="0" i="0" u="none" strike="noStrike" kern="1200" cap="none" spc="0" normalizeH="0" baseline="0" noProof="0" dirty="0">
-              <a:ln>
-                <a:noFill/>
-              </a:ln>
-              <a:solidFill>
-                <a:prstClr val="black"/>
-              </a:solidFill>
-              <a:effectLst/>
-              <a:uLnTx/>
-              <a:uFillTx/>
-              <a:latin typeface="Calibri" panose="020F0502020204030204"/>
-              <a:ea typeface="+mn-ea"/>
-              <a:cs typeface="+mn-cs"/>
-            </a:endParaRPr>
-          </a:p>
-        </p:txBody>
-      </p:sp>
-    </p:spTree>
-    <p:extLst>
-      <p:ext uri="{BB962C8B-B14F-4D97-AF65-F5344CB8AC3E}">
-        <p14:creationId xmlns:p14="http://schemas.microsoft.com/office/powerpoint/2010/main" val="3721702506"/>
-      </p:ext>
-    </p:extLst>
-  </p:cSld>
-  <p:clrMapOvr>
-    <a:masterClrMapping/>
-  </p:clrMapOvr>
-</p:sld>
-</file>
-
-<file path=ppt/slides/slide25.xml><?xml version="1.0" encoding="utf-8"?>
-<p:sld xmlns:a="http://schemas.openxmlformats.org/drawingml/2006/main" xmlns:r="http://schemas.openxmlformats.org/officeDocument/2006/relationships" xmlns:p="http://schemas.openxmlformats.org/presentationml/2006/main">
-  <p:cSld>
-    <p:spTree>
-      <p:nvGrpSpPr>
-        <p:cNvPr id="1" name=""/>
-        <p:cNvGrpSpPr/>
-        <p:nvPr/>
-      </p:nvGrpSpPr>
-      <p:grpSpPr>
-        <a:xfrm>
-          <a:off x="0" y="0"/>
-          <a:ext cx="0" cy="0"/>
-          <a:chOff x="0" y="0"/>
-          <a:chExt cx="0" cy="0"/>
-        </a:xfrm>
-      </p:grpSpPr>
-      <p:pic>
-        <p:nvPicPr>
-          <p:cNvPr id="6" name="Picture 5">
-            <a:extLst>
-              <a:ext uri="{FF2B5EF4-FFF2-40B4-BE49-F238E27FC236}">
-                <a16:creationId xmlns:a16="http://schemas.microsoft.com/office/drawing/2014/main" id="{1C822ADE-CAD8-4FC5-AA4B-066A40169EBC}"/>
-              </a:ext>
-            </a:extLst>
-          </p:cNvPr>
-          <p:cNvPicPr>
-            <a:picLocks noChangeAspect="1"/>
-          </p:cNvPicPr>
-          <p:nvPr/>
-        </p:nvPicPr>
-        <p:blipFill>
-          <a:blip r:embed="rId2"/>
-          <a:stretch>
-            <a:fillRect/>
-          </a:stretch>
-        </p:blipFill>
-        <p:spPr>
-          <a:xfrm>
-            <a:off x="1524000" y="1200832"/>
-            <a:ext cx="5614254" cy="5332219"/>
-          </a:xfrm>
-          <a:prstGeom prst="rect">
-            <a:avLst/>
-          </a:prstGeom>
-        </p:spPr>
-      </p:pic>
-      <p:sp>
-        <p:nvSpPr>
-          <p:cNvPr id="2" name="Date Placeholder 1">
-            <a:extLst>
-              <a:ext uri="{FF2B5EF4-FFF2-40B4-BE49-F238E27FC236}">
-                <a16:creationId xmlns:a16="http://schemas.microsoft.com/office/drawing/2014/main" id="{231DB28B-F86F-49C3-9E90-BBA54DEB762A}"/>
-              </a:ext>
-            </a:extLst>
-          </p:cNvPr>
-          <p:cNvSpPr>
-            <a:spLocks noGrp="1"/>
-          </p:cNvSpPr>
-          <p:nvPr>
-            <p:ph type="dt" sz="half" idx="10"/>
-          </p:nvPr>
-        </p:nvSpPr>
-        <p:spPr/>
-        <p:txBody>
-          <a:bodyPr/>
-          <a:lstStyle/>
-          <a:p>
-            <a:pPr marL="0" marR="0" lvl="0" indent="0" algn="l" defTabSz="914400" rtl="0" eaLnBrk="1" fontAlgn="auto" latinLnBrk="0" hangingPunct="1">
-              <a:lnSpc>
-                <a:spcPct val="100000"/>
-              </a:lnSpc>
-              <a:spcBef>
-                <a:spcPts val="0"/>
-              </a:spcBef>
-              <a:spcAft>
-                <a:spcPts val="0"/>
-              </a:spcAft>
-              <a:buClrTx/>
-              <a:buSzTx/>
-              <a:buFontTx/>
-              <a:buNone/>
-              <a:tabLst/>
-              <a:defRPr/>
-            </a:pPr>
-            <a:fld id="{6700A58B-DD98-43D0-B791-721480A02982}" type="datetime1">
-              <a:rPr kumimoji="0" lang="en-US" sz="900" b="0" i="0" u="none" strike="noStrike" kern="1200" cap="none" spc="0" normalizeH="0" baseline="0" noProof="0" smtClean="0">
-                <a:ln>
-                  <a:noFill/>
-                </a:ln>
-                <a:solidFill>
-                  <a:prstClr val="black">
-                    <a:tint val="75000"/>
-                  </a:prstClr>
-                </a:solidFill>
-                <a:effectLst/>
-                <a:uLnTx/>
-                <a:uFillTx/>
-                <a:latin typeface="Calibri" panose="020F0502020204030204"/>
-                <a:ea typeface="+mn-ea"/>
-                <a:cs typeface="+mn-cs"/>
-              </a:rPr>
-              <a:pPr marL="0" marR="0" lvl="0" indent="0" algn="l" defTabSz="914400" rtl="0" eaLnBrk="1" fontAlgn="auto" latinLnBrk="0" hangingPunct="1">
-                <a:lnSpc>
-                  <a:spcPct val="100000"/>
-                </a:lnSpc>
-                <a:spcBef>
-                  <a:spcPts val="0"/>
-                </a:spcBef>
-                <a:spcAft>
-                  <a:spcPts val="0"/>
-                </a:spcAft>
-                <a:buClrTx/>
-                <a:buSzTx/>
-                <a:buFontTx/>
-                <a:buNone/>
-                <a:tabLst/>
-                <a:defRPr/>
-              </a:pPr>
-              <a:t>10/23/23</a:t>
-            </a:fld>
-            <a:endParaRPr kumimoji="0" lang="en-US" sz="900" b="0" i="0" u="none" strike="noStrike" kern="1200" cap="none" spc="0" normalizeH="0" baseline="0" noProof="0">
-              <a:ln>
-                <a:noFill/>
-              </a:ln>
-              <a:solidFill>
-                <a:prstClr val="black">
-                  <a:tint val="75000"/>
-                </a:prstClr>
-              </a:solidFill>
-              <a:effectLst/>
-              <a:uLnTx/>
-              <a:uFillTx/>
-              <a:latin typeface="Calibri" panose="020F0502020204030204"/>
-              <a:ea typeface="+mn-ea"/>
-              <a:cs typeface="+mn-cs"/>
-            </a:endParaRPr>
-          </a:p>
-        </p:txBody>
-      </p:sp>
-      <p:sp>
-        <p:nvSpPr>
-          <p:cNvPr id="3" name="Title 2">
-            <a:extLst>
-              <a:ext uri="{FF2B5EF4-FFF2-40B4-BE49-F238E27FC236}">
-                <a16:creationId xmlns:a16="http://schemas.microsoft.com/office/drawing/2014/main" id="{B10DF302-8836-406C-93BA-FC26714BD6C5}"/>
-              </a:ext>
-            </a:extLst>
-          </p:cNvPr>
-          <p:cNvSpPr>
-            <a:spLocks noGrp="1"/>
-          </p:cNvSpPr>
-          <p:nvPr>
-            <p:ph type="title"/>
-          </p:nvPr>
-        </p:nvSpPr>
-        <p:spPr/>
-        <p:txBody>
-          <a:bodyPr/>
-          <a:lstStyle/>
-          <a:p>
-            <a:r>
-              <a:rPr lang="en-US" dirty="0"/>
-              <a:t>2 Rule Tree</a:t>
-            </a:r>
-          </a:p>
-        </p:txBody>
-      </p:sp>
-      <p:sp>
-        <p:nvSpPr>
-          <p:cNvPr id="4" name="Slide Number Placeholder 3">
-            <a:extLst>
-              <a:ext uri="{FF2B5EF4-FFF2-40B4-BE49-F238E27FC236}">
-                <a16:creationId xmlns:a16="http://schemas.microsoft.com/office/drawing/2014/main" id="{C1A7BFED-0798-47F8-9058-CB0D619631DA}"/>
-              </a:ext>
-            </a:extLst>
-          </p:cNvPr>
-          <p:cNvSpPr>
-            <a:spLocks noGrp="1"/>
-          </p:cNvSpPr>
-          <p:nvPr>
-            <p:ph type="sldNum" sz="quarter" idx="12"/>
-          </p:nvPr>
-        </p:nvSpPr>
-        <p:spPr/>
-        <p:txBody>
-          <a:bodyPr/>
-          <a:lstStyle/>
-          <a:p>
-            <a:pPr marL="0" marR="0" lvl="0" indent="0" algn="r" defTabSz="914400" rtl="0" eaLnBrk="1" fontAlgn="auto" latinLnBrk="0" hangingPunct="1">
-              <a:lnSpc>
-                <a:spcPct val="100000"/>
-              </a:lnSpc>
-              <a:spcBef>
-                <a:spcPts val="0"/>
-              </a:spcBef>
-              <a:spcAft>
-                <a:spcPts val="0"/>
-              </a:spcAft>
-              <a:buClrTx/>
-              <a:buSzTx/>
-              <a:buFontTx/>
-              <a:buNone/>
-              <a:tabLst/>
-              <a:defRPr/>
-            </a:pPr>
-            <a:fld id="{37290FF7-652B-4475-AEAB-8B1A5D23AE09}" type="slidenum">
-              <a:rPr kumimoji="0" lang="en-US" sz="900" b="0" i="0" u="none" strike="noStrike" kern="1200" cap="none" spc="0" normalizeH="0" baseline="0" noProof="0" smtClean="0">
-                <a:ln>
-                  <a:noFill/>
-                </a:ln>
-                <a:solidFill>
-                  <a:prstClr val="black">
-                    <a:tint val="75000"/>
-                  </a:prstClr>
-                </a:solidFill>
-                <a:effectLst/>
-                <a:uLnTx/>
-                <a:uFillTx/>
-                <a:latin typeface="Calibri" panose="020F0502020204030204"/>
-                <a:ea typeface="+mn-ea"/>
-                <a:cs typeface="+mn-cs"/>
-              </a:rPr>
-              <a:pPr marL="0" marR="0" lvl="0" indent="0" algn="r" defTabSz="914400" rtl="0" eaLnBrk="1" fontAlgn="auto" latinLnBrk="0" hangingPunct="1">
-                <a:lnSpc>
-                  <a:spcPct val="100000"/>
-                </a:lnSpc>
-                <a:spcBef>
-                  <a:spcPts val="0"/>
-                </a:spcBef>
-                <a:spcAft>
-                  <a:spcPts val="0"/>
-                </a:spcAft>
-                <a:buClrTx/>
-                <a:buSzTx/>
-                <a:buFontTx/>
-                <a:buNone/>
-                <a:tabLst/>
-                <a:defRPr/>
-              </a:pPr>
-              <a:t>25</a:t>
-            </a:fld>
-            <a:endParaRPr kumimoji="0" lang="en-US" sz="900" b="0" i="0" u="none" strike="noStrike" kern="1200" cap="none" spc="0" normalizeH="0" baseline="0" noProof="0">
-              <a:ln>
-                <a:noFill/>
-              </a:ln>
-              <a:solidFill>
-                <a:prstClr val="black">
-                  <a:tint val="75000"/>
-                </a:prstClr>
-              </a:solidFill>
-              <a:effectLst/>
-              <a:uLnTx/>
-              <a:uFillTx/>
-              <a:latin typeface="Calibri" panose="020F0502020204030204"/>
-              <a:ea typeface="+mn-ea"/>
-              <a:cs typeface="+mn-cs"/>
-            </a:endParaRPr>
-          </a:p>
-        </p:txBody>
-      </p:sp>
-      <p:sp>
-        <p:nvSpPr>
-          <p:cNvPr id="5" name="Footer Placeholder 4">
-            <a:extLst>
-              <a:ext uri="{FF2B5EF4-FFF2-40B4-BE49-F238E27FC236}">
                 <a16:creationId xmlns:a16="http://schemas.microsoft.com/office/drawing/2014/main" id="{A3B36522-D67D-44E0-A415-4E03F507B647}"/>
               </a:ext>
             </a:extLst>
@@ -17900,7 +17555,7 @@
 </p:sld>
 </file>
 
-<file path=ppt/slides/slide26.xml><?xml version="1.0" encoding="utf-8"?>
+<file path=ppt/slides/slide25.xml><?xml version="1.0" encoding="utf-8"?>
 <p:sld xmlns:a="http://schemas.openxmlformats.org/drawingml/2006/main" xmlns:r="http://schemas.openxmlformats.org/officeDocument/2006/relationships" xmlns:p="http://schemas.openxmlformats.org/presentationml/2006/main" show="0">
   <p:cSld>
     <p:spTree>
@@ -18042,7 +17697,7 @@
           <a:p>
             <a:fld id="{9B19E99B-5349-415A-8E56-8E989211A366}" type="datetime1">
               <a:rPr lang="en-US" smtClean="0"/>
-              <a:t>10/23/23</a:t>
+              <a:t>10/21/24</a:t>
             </a:fld>
             <a:endParaRPr lang="en-US"/>
           </a:p>
@@ -18113,6 +17768,253 @@
     <p:extLst>
       <p:ext uri="{BB962C8B-B14F-4D97-AF65-F5344CB8AC3E}">
         <p14:creationId xmlns:p14="http://schemas.microsoft.com/office/powerpoint/2010/main" val="3388001067"/>
+      </p:ext>
+    </p:extLst>
+  </p:cSld>
+  <p:clrMapOvr>
+    <a:masterClrMapping/>
+  </p:clrMapOvr>
+</p:sld>
+</file>
+
+<file path=ppt/slides/slide26.xml><?xml version="1.0" encoding="utf-8"?>
+<p:sld xmlns:a="http://schemas.openxmlformats.org/drawingml/2006/main" xmlns:r="http://schemas.openxmlformats.org/officeDocument/2006/relationships" xmlns:p="http://schemas.openxmlformats.org/presentationml/2006/main">
+  <p:cSld>
+    <p:spTree>
+      <p:nvGrpSpPr>
+        <p:cNvPr id="1" name=""/>
+        <p:cNvGrpSpPr/>
+        <p:nvPr/>
+      </p:nvGrpSpPr>
+      <p:grpSpPr>
+        <a:xfrm>
+          <a:off x="0" y="0"/>
+          <a:ext cx="0" cy="0"/>
+          <a:chOff x="0" y="0"/>
+          <a:chExt cx="0" cy="0"/>
+        </a:xfrm>
+      </p:grpSpPr>
+      <p:pic>
+        <p:nvPicPr>
+          <p:cNvPr id="6" name="Picture 5">
+            <a:extLst>
+              <a:ext uri="{FF2B5EF4-FFF2-40B4-BE49-F238E27FC236}">
+                <a16:creationId xmlns:a16="http://schemas.microsoft.com/office/drawing/2014/main" id="{F95EBBD1-26D1-4A95-B565-8E6DCD7C19CB}"/>
+              </a:ext>
+            </a:extLst>
+          </p:cNvPr>
+          <p:cNvPicPr>
+            <a:picLocks noChangeAspect="1"/>
+          </p:cNvPicPr>
+          <p:nvPr/>
+        </p:nvPicPr>
+        <p:blipFill>
+          <a:blip r:embed="rId2"/>
+          <a:stretch>
+            <a:fillRect/>
+          </a:stretch>
+        </p:blipFill>
+        <p:spPr>
+          <a:xfrm>
+            <a:off x="1524000" y="1200832"/>
+            <a:ext cx="5614254" cy="5332219"/>
+          </a:xfrm>
+          <a:prstGeom prst="rect">
+            <a:avLst/>
+          </a:prstGeom>
+        </p:spPr>
+      </p:pic>
+      <p:sp>
+        <p:nvSpPr>
+          <p:cNvPr id="2" name="Date Placeholder 1">
+            <a:extLst>
+              <a:ext uri="{FF2B5EF4-FFF2-40B4-BE49-F238E27FC236}">
+                <a16:creationId xmlns:a16="http://schemas.microsoft.com/office/drawing/2014/main" id="{42E0C9CE-67EB-4AD0-836D-C783C61D2488}"/>
+              </a:ext>
+            </a:extLst>
+          </p:cNvPr>
+          <p:cNvSpPr>
+            <a:spLocks noGrp="1"/>
+          </p:cNvSpPr>
+          <p:nvPr>
+            <p:ph type="dt" sz="half" idx="10"/>
+          </p:nvPr>
+        </p:nvSpPr>
+        <p:spPr/>
+        <p:txBody>
+          <a:bodyPr/>
+          <a:lstStyle/>
+          <a:p>
+            <a:fld id="{6700A58B-DD98-43D0-B791-721480A02982}" type="datetime1">
+              <a:rPr lang="en-US" smtClean="0"/>
+              <a:t>10/21/24</a:t>
+            </a:fld>
+            <a:endParaRPr lang="en-US"/>
+          </a:p>
+        </p:txBody>
+      </p:sp>
+      <p:sp>
+        <p:nvSpPr>
+          <p:cNvPr id="3" name="Title 2">
+            <a:extLst>
+              <a:ext uri="{FF2B5EF4-FFF2-40B4-BE49-F238E27FC236}">
+                <a16:creationId xmlns:a16="http://schemas.microsoft.com/office/drawing/2014/main" id="{DE073A4E-881B-4087-888F-54EFDE9A13C8}"/>
+              </a:ext>
+            </a:extLst>
+          </p:cNvPr>
+          <p:cNvSpPr>
+            <a:spLocks noGrp="1"/>
+          </p:cNvSpPr>
+          <p:nvPr>
+            <p:ph type="title"/>
+          </p:nvPr>
+        </p:nvSpPr>
+        <p:spPr/>
+        <p:txBody>
+          <a:bodyPr/>
+          <a:lstStyle/>
+          <a:p>
+            <a:r>
+              <a:rPr lang="en-US" dirty="0"/>
+              <a:t>An example of overfitting…</a:t>
+            </a:r>
+          </a:p>
+        </p:txBody>
+      </p:sp>
+      <p:sp>
+        <p:nvSpPr>
+          <p:cNvPr id="4" name="Slide Number Placeholder 3">
+            <a:extLst>
+              <a:ext uri="{FF2B5EF4-FFF2-40B4-BE49-F238E27FC236}">
+                <a16:creationId xmlns:a16="http://schemas.microsoft.com/office/drawing/2014/main" id="{266C3AAE-17CC-4F12-939B-CC4079F7A6FA}"/>
+              </a:ext>
+            </a:extLst>
+          </p:cNvPr>
+          <p:cNvSpPr>
+            <a:spLocks noGrp="1"/>
+          </p:cNvSpPr>
+          <p:nvPr>
+            <p:ph type="sldNum" sz="quarter" idx="12"/>
+          </p:nvPr>
+        </p:nvSpPr>
+        <p:spPr/>
+        <p:txBody>
+          <a:bodyPr/>
+          <a:lstStyle/>
+          <a:p>
+            <a:fld id="{37290FF7-652B-4475-AEAB-8B1A5D23AE09}" type="slidenum">
+              <a:rPr lang="en-US" smtClean="0"/>
+              <a:t>26</a:t>
+            </a:fld>
+            <a:endParaRPr lang="en-US"/>
+          </a:p>
+        </p:txBody>
+      </p:sp>
+      <p:sp>
+        <p:nvSpPr>
+          <p:cNvPr id="5" name="Footer Placeholder 4">
+            <a:extLst>
+              <a:ext uri="{FF2B5EF4-FFF2-40B4-BE49-F238E27FC236}">
+                <a16:creationId xmlns:a16="http://schemas.microsoft.com/office/drawing/2014/main" id="{16F8BC43-5941-46AD-A185-8D6356B93980}"/>
+              </a:ext>
+            </a:extLst>
+          </p:cNvPr>
+          <p:cNvSpPr>
+            <a:spLocks noGrp="1"/>
+          </p:cNvSpPr>
+          <p:nvPr>
+            <p:ph type="ftr" sz="quarter" idx="3"/>
+          </p:nvPr>
+        </p:nvSpPr>
+        <p:spPr/>
+        <p:txBody>
+          <a:bodyPr/>
+          <a:lstStyle/>
+          <a:p>
+            <a:r>
+              <a:rPr lang="en-US" dirty="0"/>
+              <a:t>Kwartler </a:t>
+            </a:r>
+          </a:p>
+        </p:txBody>
+      </p:sp>
+      <p:sp>
+        <p:nvSpPr>
+          <p:cNvPr id="7" name="TextBox 6">
+            <a:extLst>
+              <a:ext uri="{FF2B5EF4-FFF2-40B4-BE49-F238E27FC236}">
+                <a16:creationId xmlns:a16="http://schemas.microsoft.com/office/drawing/2014/main" id="{E97BFE1E-5F1A-4D5B-A90C-2D63F23FB9BF}"/>
+              </a:ext>
+            </a:extLst>
+          </p:cNvPr>
+          <p:cNvSpPr txBox="1"/>
+          <p:nvPr/>
+        </p:nvSpPr>
+        <p:spPr>
+          <a:xfrm>
+            <a:off x="5744308" y="1439976"/>
+            <a:ext cx="3200400" cy="738664"/>
+          </a:xfrm>
+          <a:prstGeom prst="rect">
+            <a:avLst/>
+          </a:prstGeom>
+          <a:solidFill>
+            <a:schemeClr val="accent5"/>
+          </a:solidFill>
+        </p:spPr>
+        <p:txBody>
+          <a:bodyPr wrap="square" rtlCol="0">
+            <a:spAutoFit/>
+          </a:bodyPr>
+          <a:lstStyle/>
+          <a:p>
+            <a:pPr marL="0" marR="0" lvl="0" indent="0" algn="l" defTabSz="914400" rtl="0" eaLnBrk="1" fontAlgn="auto" latinLnBrk="0" hangingPunct="1">
+              <a:lnSpc>
+                <a:spcPct val="100000"/>
+              </a:lnSpc>
+              <a:spcBef>
+                <a:spcPts val="0"/>
+              </a:spcBef>
+              <a:spcAft>
+                <a:spcPts val="0"/>
+              </a:spcAft>
+              <a:buClrTx/>
+              <a:buSzTx/>
+              <a:buFontTx/>
+              <a:buNone/>
+              <a:tabLst/>
+              <a:defRPr/>
+            </a:pPr>
+            <a:r>
+              <a:rPr lang="en-US" sz="1400" dirty="0">
+                <a:solidFill>
+                  <a:prstClr val="black"/>
+                </a:solidFill>
+                <a:latin typeface="Calibri" panose="020F0502020204030204"/>
+              </a:rPr>
+              <a:t>2 rules still have some impurity in each section.  Maybe we should keep adding rules.</a:t>
+            </a:r>
+            <a:endParaRPr kumimoji="0" lang="en-US" sz="1400" b="0" i="0" u="none" strike="noStrike" kern="1200" cap="none" spc="0" normalizeH="0" baseline="0" noProof="0" dirty="0">
+              <a:ln>
+                <a:noFill/>
+              </a:ln>
+              <a:solidFill>
+                <a:prstClr val="black"/>
+              </a:solidFill>
+              <a:effectLst/>
+              <a:uLnTx/>
+              <a:uFillTx/>
+              <a:latin typeface="Calibri" panose="020F0502020204030204"/>
+              <a:ea typeface="+mn-ea"/>
+              <a:cs typeface="+mn-cs"/>
+            </a:endParaRPr>
+          </a:p>
+        </p:txBody>
+      </p:sp>
+    </p:spTree>
+    <p:extLst>
+      <p:ext uri="{BB962C8B-B14F-4D97-AF65-F5344CB8AC3E}">
+        <p14:creationId xmlns:p14="http://schemas.microsoft.com/office/powerpoint/2010/main" val="2204241904"/>
       </p:ext>
     </p:extLst>
   </p:cSld>
@@ -18192,7 +18094,7 @@
           <a:p>
             <a:fld id="{6700A58B-DD98-43D0-B791-721480A02982}" type="datetime1">
               <a:rPr lang="en-US" smtClean="0"/>
-              <a:t>10/23/23</a:t>
+              <a:t>10/21/24</a:t>
             </a:fld>
             <a:endParaRPr lang="en-US"/>
           </a:p>
@@ -18298,7 +18200,7 @@
         <p:spPr>
           <a:xfrm>
             <a:off x="5744308" y="1439976"/>
-            <a:ext cx="3200400" cy="738664"/>
+            <a:ext cx="3200400" cy="307777"/>
           </a:xfrm>
           <a:prstGeom prst="rect">
             <a:avLst/>
@@ -18337,7 +18239,7 @@
                 </a:solidFill>
                 <a:latin typeface="Calibri" panose="020F0502020204030204"/>
               </a:rPr>
-              <a:t>2 rules still have some impurity in each section.  Maybe we should keep adding rules.</a:t>
+              <a:t>Adding this rule improves the purity</a:t>
             </a:r>
             <a:endParaRPr kumimoji="0" lang="en-US" sz="1400" b="0" i="0" u="none" strike="noStrike" kern="1200" cap="none" spc="0" normalizeH="0" baseline="0" noProof="0" dirty="0">
               <a:ln>
@@ -18356,10 +18258,81 @@
           </a:p>
         </p:txBody>
       </p:sp>
+      <p:cxnSp>
+        <p:nvCxnSpPr>
+          <p:cNvPr id="9" name="Straight Connector 8">
+            <a:extLst>
+              <a:ext uri="{FF2B5EF4-FFF2-40B4-BE49-F238E27FC236}">
+                <a16:creationId xmlns:a16="http://schemas.microsoft.com/office/drawing/2014/main" id="{F1B989BF-6D09-4F99-8558-B02294075237}"/>
+              </a:ext>
+            </a:extLst>
+          </p:cNvPr>
+          <p:cNvCxnSpPr/>
+          <p:nvPr/>
+        </p:nvCxnSpPr>
+        <p:spPr>
+          <a:xfrm flipH="1">
+            <a:off x="1295400" y="5562600"/>
+            <a:ext cx="2667000" cy="0"/>
+          </a:xfrm>
+          <a:prstGeom prst="line">
+            <a:avLst/>
+          </a:prstGeom>
+        </p:spPr>
+        <p:style>
+          <a:lnRef idx="1">
+            <a:schemeClr val="accent1"/>
+          </a:lnRef>
+          <a:fillRef idx="0">
+            <a:schemeClr val="accent1"/>
+          </a:fillRef>
+          <a:effectRef idx="0">
+            <a:schemeClr val="accent1"/>
+          </a:effectRef>
+          <a:fontRef idx="minor">
+            <a:schemeClr val="tx1"/>
+          </a:fontRef>
+        </p:style>
+      </p:cxnSp>
+      <p:sp>
+        <p:nvSpPr>
+          <p:cNvPr id="10" name="TextBox 9">
+            <a:extLst>
+              <a:ext uri="{FF2B5EF4-FFF2-40B4-BE49-F238E27FC236}">
+                <a16:creationId xmlns:a16="http://schemas.microsoft.com/office/drawing/2014/main" id="{A85B5247-BAD5-4715-BC07-F01B88B46BFC}"/>
+              </a:ext>
+            </a:extLst>
+          </p:cNvPr>
+          <p:cNvSpPr txBox="1"/>
+          <p:nvPr/>
+        </p:nvSpPr>
+        <p:spPr>
+          <a:xfrm>
+            <a:off x="279565" y="5377934"/>
+            <a:ext cx="995465" cy="369332"/>
+          </a:xfrm>
+          <a:prstGeom prst="rect">
+            <a:avLst/>
+          </a:prstGeom>
+          <a:noFill/>
+        </p:spPr>
+        <p:txBody>
+          <a:bodyPr wrap="none" rtlCol="0">
+            <a:spAutoFit/>
+          </a:bodyPr>
+          <a:lstStyle/>
+          <a:p>
+            <a:r>
+              <a:rPr lang="en-US" dirty="0"/>
+              <a:t>Age &lt; 22</a:t>
+            </a:r>
+          </a:p>
+        </p:txBody>
+      </p:sp>
     </p:spTree>
     <p:extLst>
       <p:ext uri="{BB962C8B-B14F-4D97-AF65-F5344CB8AC3E}">
-        <p14:creationId xmlns:p14="http://schemas.microsoft.com/office/powerpoint/2010/main" val="2204241904"/>
+        <p14:creationId xmlns:p14="http://schemas.microsoft.com/office/powerpoint/2010/main" val="935637694"/>
       </p:ext>
     </p:extLst>
   </p:cSld>
@@ -18439,7 +18412,7 @@
           <a:p>
             <a:fld id="{6700A58B-DD98-43D0-B791-721480A02982}" type="datetime1">
               <a:rPr lang="en-US" smtClean="0"/>
-              <a:t>10/23/23</a:t>
+              <a:t>10/21/24</a:t>
             </a:fld>
             <a:endParaRPr lang="en-US"/>
           </a:p>
@@ -18545,7 +18518,7 @@
         <p:spPr>
           <a:xfrm>
             <a:off x="5744308" y="1439976"/>
-            <a:ext cx="3200400" cy="307777"/>
+            <a:ext cx="3200400" cy="523220"/>
           </a:xfrm>
           <a:prstGeom prst="rect">
             <a:avLst/>
@@ -18584,7 +18557,7 @@
                 </a:solidFill>
                 <a:latin typeface="Calibri" panose="020F0502020204030204"/>
               </a:rPr>
-              <a:t>Adding this rule improves the purity</a:t>
+              <a:t>These additional rules look like they help too.</a:t>
             </a:r>
             <a:endParaRPr kumimoji="0" lang="en-US" sz="1400" b="0" i="0" u="none" strike="noStrike" kern="1200" cap="none" spc="0" normalizeH="0" baseline="0" noProof="0" dirty="0">
               <a:ln>
@@ -18674,10 +18647,154 @@
           </a:p>
         </p:txBody>
       </p:sp>
+      <p:cxnSp>
+        <p:nvCxnSpPr>
+          <p:cNvPr id="11" name="Straight Connector 10">
+            <a:extLst>
+              <a:ext uri="{FF2B5EF4-FFF2-40B4-BE49-F238E27FC236}">
+                <a16:creationId xmlns:a16="http://schemas.microsoft.com/office/drawing/2014/main" id="{B56B45D8-4AF9-4A75-B1BC-F37A316684D3}"/>
+              </a:ext>
+            </a:extLst>
+          </p:cNvPr>
+          <p:cNvCxnSpPr/>
+          <p:nvPr/>
+        </p:nvCxnSpPr>
+        <p:spPr>
+          <a:xfrm flipH="1">
+            <a:off x="1295400" y="2667000"/>
+            <a:ext cx="2667000" cy="0"/>
+          </a:xfrm>
+          <a:prstGeom prst="line">
+            <a:avLst/>
+          </a:prstGeom>
+        </p:spPr>
+        <p:style>
+          <a:lnRef idx="1">
+            <a:schemeClr val="accent1"/>
+          </a:lnRef>
+          <a:fillRef idx="0">
+            <a:schemeClr val="accent1"/>
+          </a:fillRef>
+          <a:effectRef idx="0">
+            <a:schemeClr val="accent1"/>
+          </a:effectRef>
+          <a:fontRef idx="minor">
+            <a:schemeClr val="tx1"/>
+          </a:fontRef>
+        </p:style>
+      </p:cxnSp>
+      <p:sp>
+        <p:nvSpPr>
+          <p:cNvPr id="12" name="TextBox 11">
+            <a:extLst>
+              <a:ext uri="{FF2B5EF4-FFF2-40B4-BE49-F238E27FC236}">
+                <a16:creationId xmlns:a16="http://schemas.microsoft.com/office/drawing/2014/main" id="{7910CBFE-AE67-4759-9761-F48B3425AE17}"/>
+              </a:ext>
+            </a:extLst>
+          </p:cNvPr>
+          <p:cNvSpPr txBox="1"/>
+          <p:nvPr/>
+        </p:nvSpPr>
+        <p:spPr>
+          <a:xfrm>
+            <a:off x="279565" y="2482334"/>
+            <a:ext cx="995465" cy="369332"/>
+          </a:xfrm>
+          <a:prstGeom prst="rect">
+            <a:avLst/>
+          </a:prstGeom>
+          <a:noFill/>
+        </p:spPr>
+        <p:txBody>
+          <a:bodyPr wrap="none" rtlCol="0">
+            <a:spAutoFit/>
+          </a:bodyPr>
+          <a:lstStyle/>
+          <a:p>
+            <a:r>
+              <a:rPr lang="en-US" dirty="0"/>
+              <a:t>Age &gt; 62</a:t>
+            </a:r>
+          </a:p>
+        </p:txBody>
+      </p:sp>
+      <p:cxnSp>
+        <p:nvCxnSpPr>
+          <p:cNvPr id="13" name="Straight Connector 12">
+            <a:extLst>
+              <a:ext uri="{FF2B5EF4-FFF2-40B4-BE49-F238E27FC236}">
+                <a16:creationId xmlns:a16="http://schemas.microsoft.com/office/drawing/2014/main" id="{CC76F8C8-40AA-448A-8AA7-F73668022F4C}"/>
+              </a:ext>
+            </a:extLst>
+          </p:cNvPr>
+          <p:cNvCxnSpPr>
+            <a:cxnSpLocks/>
+          </p:cNvCxnSpPr>
+          <p:nvPr/>
+        </p:nvCxnSpPr>
+        <p:spPr>
+          <a:xfrm>
+            <a:off x="5257800" y="1371600"/>
+            <a:ext cx="0" cy="4937760"/>
+          </a:xfrm>
+          <a:prstGeom prst="line">
+            <a:avLst/>
+          </a:prstGeom>
+        </p:spPr>
+        <p:style>
+          <a:lnRef idx="1">
+            <a:schemeClr val="accent1"/>
+          </a:lnRef>
+          <a:fillRef idx="0">
+            <a:schemeClr val="accent1"/>
+          </a:fillRef>
+          <a:effectRef idx="0">
+            <a:schemeClr val="accent1"/>
+          </a:effectRef>
+          <a:fontRef idx="minor">
+            <a:schemeClr val="tx1"/>
+          </a:fontRef>
+        </p:style>
+      </p:cxnSp>
+      <p:sp>
+        <p:nvSpPr>
+          <p:cNvPr id="14" name="TextBox 13">
+            <a:extLst>
+              <a:ext uri="{FF2B5EF4-FFF2-40B4-BE49-F238E27FC236}">
+                <a16:creationId xmlns:a16="http://schemas.microsoft.com/office/drawing/2014/main" id="{3F4F65F0-4F63-428C-BBA5-F12183C27F37}"/>
+              </a:ext>
+            </a:extLst>
+          </p:cNvPr>
+          <p:cNvSpPr txBox="1"/>
+          <p:nvPr/>
+        </p:nvSpPr>
+        <p:spPr>
+          <a:xfrm rot="16200000">
+            <a:off x="4544706" y="3184542"/>
+            <a:ext cx="1748748" cy="369332"/>
+          </a:xfrm>
+          <a:prstGeom prst="rect">
+            <a:avLst/>
+          </a:prstGeom>
+          <a:noFill/>
+        </p:spPr>
+        <p:txBody>
+          <a:bodyPr wrap="none" rtlCol="0">
+            <a:spAutoFit/>
+          </a:bodyPr>
+          <a:lstStyle/>
+          <a:p>
+            <a:r>
+              <a:rPr lang="en-US" dirty="0"/>
+              <a:t>Duration &gt; 1100 </a:t>
+            </a:r>
+          </a:p>
+        </p:txBody>
+      </p:sp>
     </p:spTree>
     <p:extLst>
       <p:ext uri="{BB962C8B-B14F-4D97-AF65-F5344CB8AC3E}">
-        <p14:creationId xmlns:p14="http://schemas.microsoft.com/office/powerpoint/2010/main" val="935637694"/>
+        <p14:creationId xmlns:p14="http://schemas.microsoft.com/office/powerpoint/2010/main" val="922517876"/>
       </p:ext>
     </p:extLst>
   </p:cSld>
@@ -18757,7 +18874,7 @@
           <a:p>
             <a:fld id="{6700A58B-DD98-43D0-B791-721480A02982}" type="datetime1">
               <a:rPr lang="en-US" smtClean="0"/>
-              <a:t>10/23/23</a:t>
+              <a:t>10/21/24</a:t>
             </a:fld>
             <a:endParaRPr lang="en-US"/>
           </a:p>
@@ -18815,706 +18932,6 @@
             <a:fld id="{37290FF7-652B-4475-AEAB-8B1A5D23AE09}" type="slidenum">
               <a:rPr lang="en-US" smtClean="0"/>
               <a:t>29</a:t>
-            </a:fld>
-            <a:endParaRPr lang="en-US"/>
-          </a:p>
-        </p:txBody>
-      </p:sp>
-      <p:sp>
-        <p:nvSpPr>
-          <p:cNvPr id="5" name="Footer Placeholder 4">
-            <a:extLst>
-              <a:ext uri="{FF2B5EF4-FFF2-40B4-BE49-F238E27FC236}">
-                <a16:creationId xmlns:a16="http://schemas.microsoft.com/office/drawing/2014/main" id="{16F8BC43-5941-46AD-A185-8D6356B93980}"/>
-              </a:ext>
-            </a:extLst>
-          </p:cNvPr>
-          <p:cNvSpPr>
-            <a:spLocks noGrp="1"/>
-          </p:cNvSpPr>
-          <p:nvPr>
-            <p:ph type="ftr" sz="quarter" idx="3"/>
-          </p:nvPr>
-        </p:nvSpPr>
-        <p:spPr/>
-        <p:txBody>
-          <a:bodyPr/>
-          <a:lstStyle/>
-          <a:p>
-            <a:r>
-              <a:rPr lang="en-US" dirty="0"/>
-              <a:t>Kwartler </a:t>
-            </a:r>
-          </a:p>
-        </p:txBody>
-      </p:sp>
-      <p:sp>
-        <p:nvSpPr>
-          <p:cNvPr id="7" name="TextBox 6">
-            <a:extLst>
-              <a:ext uri="{FF2B5EF4-FFF2-40B4-BE49-F238E27FC236}">
-                <a16:creationId xmlns:a16="http://schemas.microsoft.com/office/drawing/2014/main" id="{E97BFE1E-5F1A-4D5B-A90C-2D63F23FB9BF}"/>
-              </a:ext>
-            </a:extLst>
-          </p:cNvPr>
-          <p:cNvSpPr txBox="1"/>
-          <p:nvPr/>
-        </p:nvSpPr>
-        <p:spPr>
-          <a:xfrm>
-            <a:off x="5744308" y="1439976"/>
-            <a:ext cx="3200400" cy="523220"/>
-          </a:xfrm>
-          <a:prstGeom prst="rect">
-            <a:avLst/>
-          </a:prstGeom>
-          <a:solidFill>
-            <a:schemeClr val="accent5"/>
-          </a:solidFill>
-        </p:spPr>
-        <p:txBody>
-          <a:bodyPr wrap="square" rtlCol="0">
-            <a:spAutoFit/>
-          </a:bodyPr>
-          <a:lstStyle/>
-          <a:p>
-            <a:pPr marL="0" marR="0" lvl="0" indent="0" algn="l" defTabSz="914400" rtl="0" eaLnBrk="1" fontAlgn="auto" latinLnBrk="0" hangingPunct="1">
-              <a:lnSpc>
-                <a:spcPct val="100000"/>
-              </a:lnSpc>
-              <a:spcBef>
-                <a:spcPts val="0"/>
-              </a:spcBef>
-              <a:spcAft>
-                <a:spcPts val="0"/>
-              </a:spcAft>
-              <a:buClrTx/>
-              <a:buSzTx/>
-              <a:buFontTx/>
-              <a:buNone/>
-              <a:tabLst/>
-              <a:defRPr/>
-            </a:pPr>
-            <a:r>
-              <a:rPr lang="en-US" sz="1400" dirty="0">
-                <a:solidFill>
-                  <a:prstClr val="black"/>
-                </a:solidFill>
-                <a:latin typeface="Calibri" panose="020F0502020204030204"/>
-              </a:rPr>
-              <a:t>These additional rules look like they help too.</a:t>
-            </a:r>
-            <a:endParaRPr kumimoji="0" lang="en-US" sz="1400" b="0" i="0" u="none" strike="noStrike" kern="1200" cap="none" spc="0" normalizeH="0" baseline="0" noProof="0" dirty="0">
-              <a:ln>
-                <a:noFill/>
-              </a:ln>
-              <a:solidFill>
-                <a:prstClr val="black"/>
-              </a:solidFill>
-              <a:effectLst/>
-              <a:uLnTx/>
-              <a:uFillTx/>
-              <a:latin typeface="Calibri" panose="020F0502020204030204"/>
-              <a:ea typeface="+mn-ea"/>
-              <a:cs typeface="+mn-cs"/>
-            </a:endParaRPr>
-          </a:p>
-        </p:txBody>
-      </p:sp>
-      <p:cxnSp>
-        <p:nvCxnSpPr>
-          <p:cNvPr id="9" name="Straight Connector 8">
-            <a:extLst>
-              <a:ext uri="{FF2B5EF4-FFF2-40B4-BE49-F238E27FC236}">
-                <a16:creationId xmlns:a16="http://schemas.microsoft.com/office/drawing/2014/main" id="{F1B989BF-6D09-4F99-8558-B02294075237}"/>
-              </a:ext>
-            </a:extLst>
-          </p:cNvPr>
-          <p:cNvCxnSpPr/>
-          <p:nvPr/>
-        </p:nvCxnSpPr>
-        <p:spPr>
-          <a:xfrm flipH="1">
-            <a:off x="1295400" y="5562600"/>
-            <a:ext cx="2667000" cy="0"/>
-          </a:xfrm>
-          <a:prstGeom prst="line">
-            <a:avLst/>
-          </a:prstGeom>
-        </p:spPr>
-        <p:style>
-          <a:lnRef idx="1">
-            <a:schemeClr val="accent1"/>
-          </a:lnRef>
-          <a:fillRef idx="0">
-            <a:schemeClr val="accent1"/>
-          </a:fillRef>
-          <a:effectRef idx="0">
-            <a:schemeClr val="accent1"/>
-          </a:effectRef>
-          <a:fontRef idx="minor">
-            <a:schemeClr val="tx1"/>
-          </a:fontRef>
-        </p:style>
-      </p:cxnSp>
-      <p:sp>
-        <p:nvSpPr>
-          <p:cNvPr id="10" name="TextBox 9">
-            <a:extLst>
-              <a:ext uri="{FF2B5EF4-FFF2-40B4-BE49-F238E27FC236}">
-                <a16:creationId xmlns:a16="http://schemas.microsoft.com/office/drawing/2014/main" id="{A85B5247-BAD5-4715-BC07-F01B88B46BFC}"/>
-              </a:ext>
-            </a:extLst>
-          </p:cNvPr>
-          <p:cNvSpPr txBox="1"/>
-          <p:nvPr/>
-        </p:nvSpPr>
-        <p:spPr>
-          <a:xfrm>
-            <a:off x="279565" y="5377934"/>
-            <a:ext cx="995465" cy="369332"/>
-          </a:xfrm>
-          <a:prstGeom prst="rect">
-            <a:avLst/>
-          </a:prstGeom>
-          <a:noFill/>
-        </p:spPr>
-        <p:txBody>
-          <a:bodyPr wrap="none" rtlCol="0">
-            <a:spAutoFit/>
-          </a:bodyPr>
-          <a:lstStyle/>
-          <a:p>
-            <a:r>
-              <a:rPr lang="en-US" dirty="0"/>
-              <a:t>Age &lt; 22</a:t>
-            </a:r>
-          </a:p>
-        </p:txBody>
-      </p:sp>
-      <p:cxnSp>
-        <p:nvCxnSpPr>
-          <p:cNvPr id="11" name="Straight Connector 10">
-            <a:extLst>
-              <a:ext uri="{FF2B5EF4-FFF2-40B4-BE49-F238E27FC236}">
-                <a16:creationId xmlns:a16="http://schemas.microsoft.com/office/drawing/2014/main" id="{B56B45D8-4AF9-4A75-B1BC-F37A316684D3}"/>
-              </a:ext>
-            </a:extLst>
-          </p:cNvPr>
-          <p:cNvCxnSpPr/>
-          <p:nvPr/>
-        </p:nvCxnSpPr>
-        <p:spPr>
-          <a:xfrm flipH="1">
-            <a:off x="1295400" y="2667000"/>
-            <a:ext cx="2667000" cy="0"/>
-          </a:xfrm>
-          <a:prstGeom prst="line">
-            <a:avLst/>
-          </a:prstGeom>
-        </p:spPr>
-        <p:style>
-          <a:lnRef idx="1">
-            <a:schemeClr val="accent1"/>
-          </a:lnRef>
-          <a:fillRef idx="0">
-            <a:schemeClr val="accent1"/>
-          </a:fillRef>
-          <a:effectRef idx="0">
-            <a:schemeClr val="accent1"/>
-          </a:effectRef>
-          <a:fontRef idx="minor">
-            <a:schemeClr val="tx1"/>
-          </a:fontRef>
-        </p:style>
-      </p:cxnSp>
-      <p:sp>
-        <p:nvSpPr>
-          <p:cNvPr id="12" name="TextBox 11">
-            <a:extLst>
-              <a:ext uri="{FF2B5EF4-FFF2-40B4-BE49-F238E27FC236}">
-                <a16:creationId xmlns:a16="http://schemas.microsoft.com/office/drawing/2014/main" id="{7910CBFE-AE67-4759-9761-F48B3425AE17}"/>
-              </a:ext>
-            </a:extLst>
-          </p:cNvPr>
-          <p:cNvSpPr txBox="1"/>
-          <p:nvPr/>
-        </p:nvSpPr>
-        <p:spPr>
-          <a:xfrm>
-            <a:off x="279565" y="2482334"/>
-            <a:ext cx="995465" cy="369332"/>
-          </a:xfrm>
-          <a:prstGeom prst="rect">
-            <a:avLst/>
-          </a:prstGeom>
-          <a:noFill/>
-        </p:spPr>
-        <p:txBody>
-          <a:bodyPr wrap="none" rtlCol="0">
-            <a:spAutoFit/>
-          </a:bodyPr>
-          <a:lstStyle/>
-          <a:p>
-            <a:r>
-              <a:rPr lang="en-US" dirty="0"/>
-              <a:t>Age &gt; 62</a:t>
-            </a:r>
-          </a:p>
-        </p:txBody>
-      </p:sp>
-      <p:cxnSp>
-        <p:nvCxnSpPr>
-          <p:cNvPr id="13" name="Straight Connector 12">
-            <a:extLst>
-              <a:ext uri="{FF2B5EF4-FFF2-40B4-BE49-F238E27FC236}">
-                <a16:creationId xmlns:a16="http://schemas.microsoft.com/office/drawing/2014/main" id="{CC76F8C8-40AA-448A-8AA7-F73668022F4C}"/>
-              </a:ext>
-            </a:extLst>
-          </p:cNvPr>
-          <p:cNvCxnSpPr>
-            <a:cxnSpLocks/>
-          </p:cNvCxnSpPr>
-          <p:nvPr/>
-        </p:nvCxnSpPr>
-        <p:spPr>
-          <a:xfrm>
-            <a:off x="5257800" y="1371600"/>
-            <a:ext cx="0" cy="4937760"/>
-          </a:xfrm>
-          <a:prstGeom prst="line">
-            <a:avLst/>
-          </a:prstGeom>
-        </p:spPr>
-        <p:style>
-          <a:lnRef idx="1">
-            <a:schemeClr val="accent1"/>
-          </a:lnRef>
-          <a:fillRef idx="0">
-            <a:schemeClr val="accent1"/>
-          </a:fillRef>
-          <a:effectRef idx="0">
-            <a:schemeClr val="accent1"/>
-          </a:effectRef>
-          <a:fontRef idx="minor">
-            <a:schemeClr val="tx1"/>
-          </a:fontRef>
-        </p:style>
-      </p:cxnSp>
-      <p:sp>
-        <p:nvSpPr>
-          <p:cNvPr id="14" name="TextBox 13">
-            <a:extLst>
-              <a:ext uri="{FF2B5EF4-FFF2-40B4-BE49-F238E27FC236}">
-                <a16:creationId xmlns:a16="http://schemas.microsoft.com/office/drawing/2014/main" id="{3F4F65F0-4F63-428C-BBA5-F12183C27F37}"/>
-              </a:ext>
-            </a:extLst>
-          </p:cNvPr>
-          <p:cNvSpPr txBox="1"/>
-          <p:nvPr/>
-        </p:nvSpPr>
-        <p:spPr>
-          <a:xfrm rot="16200000">
-            <a:off x="4544706" y="3184542"/>
-            <a:ext cx="1748748" cy="369332"/>
-          </a:xfrm>
-          <a:prstGeom prst="rect">
-            <a:avLst/>
-          </a:prstGeom>
-          <a:noFill/>
-        </p:spPr>
-        <p:txBody>
-          <a:bodyPr wrap="none" rtlCol="0">
-            <a:spAutoFit/>
-          </a:bodyPr>
-          <a:lstStyle/>
-          <a:p>
-            <a:r>
-              <a:rPr lang="en-US" dirty="0"/>
-              <a:t>Duration &gt; 1100 </a:t>
-            </a:r>
-          </a:p>
-        </p:txBody>
-      </p:sp>
-    </p:spTree>
-    <p:extLst>
-      <p:ext uri="{BB962C8B-B14F-4D97-AF65-F5344CB8AC3E}">
-        <p14:creationId xmlns:p14="http://schemas.microsoft.com/office/powerpoint/2010/main" val="922517876"/>
-      </p:ext>
-    </p:extLst>
-  </p:cSld>
-  <p:clrMapOvr>
-    <a:masterClrMapping/>
-  </p:clrMapOvr>
-</p:sld>
-</file>
-
-<file path=ppt/slides/slide3.xml><?xml version="1.0" encoding="utf-8"?>
-<p:sld xmlns:a="http://schemas.openxmlformats.org/drawingml/2006/main" xmlns:r="http://schemas.openxmlformats.org/officeDocument/2006/relationships" xmlns:p="http://schemas.openxmlformats.org/presentationml/2006/main">
-  <p:cSld>
-    <p:spTree>
-      <p:nvGrpSpPr>
-        <p:cNvPr id="1" name=""/>
-        <p:cNvGrpSpPr/>
-        <p:nvPr/>
-      </p:nvGrpSpPr>
-      <p:grpSpPr>
-        <a:xfrm>
-          <a:off x="0" y="0"/>
-          <a:ext cx="0" cy="0"/>
-          <a:chOff x="0" y="0"/>
-          <a:chExt cx="0" cy="0"/>
-        </a:xfrm>
-      </p:grpSpPr>
-      <p:sp>
-        <p:nvSpPr>
-          <p:cNvPr id="2" name="Date Placeholder 1">
-            <a:extLst>
-              <a:ext uri="{FF2B5EF4-FFF2-40B4-BE49-F238E27FC236}">
-                <a16:creationId xmlns:a16="http://schemas.microsoft.com/office/drawing/2014/main" id="{69694DB3-CEFE-49D5-866E-475F55D5BDF4}"/>
-              </a:ext>
-            </a:extLst>
-          </p:cNvPr>
-          <p:cNvSpPr>
-            <a:spLocks noGrp="1"/>
-          </p:cNvSpPr>
-          <p:nvPr>
-            <p:ph type="dt" sz="half" idx="10"/>
-          </p:nvPr>
-        </p:nvSpPr>
-        <p:spPr/>
-        <p:txBody>
-          <a:bodyPr/>
-          <a:lstStyle/>
-          <a:p>
-            <a:fld id="{6700A58B-DD98-43D0-B791-721480A02982}" type="datetime1">
-              <a:rPr lang="en-US" smtClean="0"/>
-              <a:t>10/23/23</a:t>
-            </a:fld>
-            <a:endParaRPr lang="en-US"/>
-          </a:p>
-        </p:txBody>
-      </p:sp>
-      <p:sp>
-        <p:nvSpPr>
-          <p:cNvPr id="3" name="Title 2">
-            <a:extLst>
-              <a:ext uri="{FF2B5EF4-FFF2-40B4-BE49-F238E27FC236}">
-                <a16:creationId xmlns:a16="http://schemas.microsoft.com/office/drawing/2014/main" id="{787E2F7D-50B6-43F4-85CC-C9531D3F6175}"/>
-              </a:ext>
-            </a:extLst>
-          </p:cNvPr>
-          <p:cNvSpPr>
-            <a:spLocks noGrp="1"/>
-          </p:cNvSpPr>
-          <p:nvPr>
-            <p:ph type="title"/>
-          </p:nvPr>
-        </p:nvSpPr>
-        <p:spPr/>
-        <p:txBody>
-          <a:bodyPr/>
-          <a:lstStyle/>
-          <a:p>
-            <a:r>
-              <a:rPr lang="en-US" dirty="0"/>
-              <a:t>Decision Trees</a:t>
-            </a:r>
-          </a:p>
-        </p:txBody>
-      </p:sp>
-      <p:sp>
-        <p:nvSpPr>
-          <p:cNvPr id="4" name="Slide Number Placeholder 3">
-            <a:extLst>
-              <a:ext uri="{FF2B5EF4-FFF2-40B4-BE49-F238E27FC236}">
-                <a16:creationId xmlns:a16="http://schemas.microsoft.com/office/drawing/2014/main" id="{3E8455AE-BF72-4683-9895-6410B5607130}"/>
-              </a:ext>
-            </a:extLst>
-          </p:cNvPr>
-          <p:cNvSpPr>
-            <a:spLocks noGrp="1"/>
-          </p:cNvSpPr>
-          <p:nvPr>
-            <p:ph type="sldNum" sz="quarter" idx="12"/>
-          </p:nvPr>
-        </p:nvSpPr>
-        <p:spPr/>
-        <p:txBody>
-          <a:bodyPr/>
-          <a:lstStyle/>
-          <a:p>
-            <a:fld id="{37290FF7-652B-4475-AEAB-8B1A5D23AE09}" type="slidenum">
-              <a:rPr lang="en-US" smtClean="0"/>
-              <a:t>3</a:t>
-            </a:fld>
-            <a:endParaRPr lang="en-US"/>
-          </a:p>
-        </p:txBody>
-      </p:sp>
-      <p:sp>
-        <p:nvSpPr>
-          <p:cNvPr id="5" name="Footer Placeholder 4">
-            <a:extLst>
-              <a:ext uri="{FF2B5EF4-FFF2-40B4-BE49-F238E27FC236}">
-                <a16:creationId xmlns:a16="http://schemas.microsoft.com/office/drawing/2014/main" id="{7D23332A-1DC2-4197-8097-575B2DC6A8A9}"/>
-              </a:ext>
-            </a:extLst>
-          </p:cNvPr>
-          <p:cNvSpPr>
-            <a:spLocks noGrp="1"/>
-          </p:cNvSpPr>
-          <p:nvPr>
-            <p:ph type="ftr" sz="quarter" idx="3"/>
-          </p:nvPr>
-        </p:nvSpPr>
-        <p:spPr/>
-        <p:txBody>
-          <a:bodyPr/>
-          <a:lstStyle/>
-          <a:p>
-            <a:r>
-              <a:rPr lang="en-US" dirty="0"/>
-              <a:t>Kwartler </a:t>
-            </a:r>
-          </a:p>
-        </p:txBody>
-      </p:sp>
-      <p:sp>
-        <p:nvSpPr>
-          <p:cNvPr id="6" name="TextBox 5">
-            <a:extLst>
-              <a:ext uri="{FF2B5EF4-FFF2-40B4-BE49-F238E27FC236}">
-                <a16:creationId xmlns:a16="http://schemas.microsoft.com/office/drawing/2014/main" id="{767B5567-5D4B-4CE6-B81E-9BAD57C4D2C1}"/>
-              </a:ext>
-            </a:extLst>
-          </p:cNvPr>
-          <p:cNvSpPr txBox="1"/>
-          <p:nvPr/>
-        </p:nvSpPr>
-        <p:spPr>
-          <a:xfrm>
-            <a:off x="250369" y="1676400"/>
-            <a:ext cx="8741232" cy="2308324"/>
-          </a:xfrm>
-          <a:prstGeom prst="rect">
-            <a:avLst/>
-          </a:prstGeom>
-          <a:noFill/>
-        </p:spPr>
-        <p:txBody>
-          <a:bodyPr wrap="square" rtlCol="0">
-            <a:spAutoFit/>
-          </a:bodyPr>
-          <a:lstStyle/>
-          <a:p>
-            <a:pPr marL="285750" indent="-285750">
-              <a:buFont typeface="Arial" panose="020B0604020202020204" pitchFamily="34" charset="0"/>
-              <a:buChar char="•"/>
-            </a:pPr>
-            <a:r>
-              <a:rPr lang="en-US" dirty="0"/>
-              <a:t>By observing the data and splitting it into sections, rules are created for either prediction or classification problems.</a:t>
-            </a:r>
-          </a:p>
-          <a:p>
-            <a:pPr marL="285750" indent="-285750">
-              <a:buFont typeface="Arial" panose="020B0604020202020204" pitchFamily="34" charset="0"/>
-              <a:buChar char="•"/>
-            </a:pPr>
-            <a:endParaRPr lang="en-US" dirty="0"/>
-          </a:p>
-          <a:p>
-            <a:pPr marL="285750" indent="-285750">
-              <a:buFont typeface="Arial" panose="020B0604020202020204" pitchFamily="34" charset="0"/>
-              <a:buChar char="•"/>
-            </a:pPr>
-            <a:r>
-              <a:rPr lang="en-US" dirty="0"/>
-              <a:t>Mimics a subject matter expert…pre data mining days.</a:t>
-            </a:r>
-          </a:p>
-          <a:p>
-            <a:pPr marL="742950" lvl="1" indent="-285750">
-              <a:buFont typeface="Arial" panose="020B0604020202020204" pitchFamily="34" charset="0"/>
-              <a:buChar char="•"/>
-            </a:pPr>
-            <a:r>
-              <a:rPr lang="en-US" dirty="0"/>
-              <a:t>Before data mining, an experienced marketing  bank manager may have said “let’s call our </a:t>
-            </a:r>
-            <a:r>
-              <a:rPr lang="en-US" i="1" dirty="0"/>
-              <a:t>married</a:t>
-            </a:r>
-            <a:r>
-              <a:rPr lang="en-US" dirty="0"/>
-              <a:t> customers </a:t>
-            </a:r>
-            <a:r>
-              <a:rPr lang="en-US" i="1" dirty="0"/>
-              <a:t>over 25 </a:t>
-            </a:r>
-            <a:r>
-              <a:rPr lang="en-US" dirty="0"/>
-              <a:t>that have at </a:t>
-            </a:r>
-            <a:r>
-              <a:rPr lang="en-US" i="1" dirty="0"/>
-              <a:t>least a college education </a:t>
-            </a:r>
-            <a:r>
-              <a:rPr lang="en-US" dirty="0"/>
-              <a:t>to see if they want another loan.”  </a:t>
-            </a:r>
-            <a:br>
-              <a:rPr lang="en-US" dirty="0"/>
-            </a:br>
-            <a:endParaRPr lang="en-US" dirty="0"/>
-          </a:p>
-        </p:txBody>
-      </p:sp>
-    </p:spTree>
-    <p:extLst>
-      <p:ext uri="{BB962C8B-B14F-4D97-AF65-F5344CB8AC3E}">
-        <p14:creationId xmlns:p14="http://schemas.microsoft.com/office/powerpoint/2010/main" val="2239418138"/>
-      </p:ext>
-    </p:extLst>
-  </p:cSld>
-  <p:clrMapOvr>
-    <a:masterClrMapping/>
-  </p:clrMapOvr>
-</p:sld>
-</file>
-
-<file path=ppt/slides/slide30.xml><?xml version="1.0" encoding="utf-8"?>
-<p:sld xmlns:a="http://schemas.openxmlformats.org/drawingml/2006/main" xmlns:r="http://schemas.openxmlformats.org/officeDocument/2006/relationships" xmlns:p="http://schemas.openxmlformats.org/presentationml/2006/main">
-  <p:cSld>
-    <p:spTree>
-      <p:nvGrpSpPr>
-        <p:cNvPr id="1" name=""/>
-        <p:cNvGrpSpPr/>
-        <p:nvPr/>
-      </p:nvGrpSpPr>
-      <p:grpSpPr>
-        <a:xfrm>
-          <a:off x="0" y="0"/>
-          <a:ext cx="0" cy="0"/>
-          <a:chOff x="0" y="0"/>
-          <a:chExt cx="0" cy="0"/>
-        </a:xfrm>
-      </p:grpSpPr>
-      <p:pic>
-        <p:nvPicPr>
-          <p:cNvPr id="6" name="Picture 5">
-            <a:extLst>
-              <a:ext uri="{FF2B5EF4-FFF2-40B4-BE49-F238E27FC236}">
-                <a16:creationId xmlns:a16="http://schemas.microsoft.com/office/drawing/2014/main" id="{F95EBBD1-26D1-4A95-B565-8E6DCD7C19CB}"/>
-              </a:ext>
-            </a:extLst>
-          </p:cNvPr>
-          <p:cNvPicPr>
-            <a:picLocks noChangeAspect="1"/>
-          </p:cNvPicPr>
-          <p:nvPr/>
-        </p:nvPicPr>
-        <p:blipFill>
-          <a:blip r:embed="rId2"/>
-          <a:stretch>
-            <a:fillRect/>
-          </a:stretch>
-        </p:blipFill>
-        <p:spPr>
-          <a:xfrm>
-            <a:off x="1524000" y="1200832"/>
-            <a:ext cx="5614254" cy="5332219"/>
-          </a:xfrm>
-          <a:prstGeom prst="rect">
-            <a:avLst/>
-          </a:prstGeom>
-        </p:spPr>
-      </p:pic>
-      <p:sp>
-        <p:nvSpPr>
-          <p:cNvPr id="2" name="Date Placeholder 1">
-            <a:extLst>
-              <a:ext uri="{FF2B5EF4-FFF2-40B4-BE49-F238E27FC236}">
-                <a16:creationId xmlns:a16="http://schemas.microsoft.com/office/drawing/2014/main" id="{42E0C9CE-67EB-4AD0-836D-C783C61D2488}"/>
-              </a:ext>
-            </a:extLst>
-          </p:cNvPr>
-          <p:cNvSpPr>
-            <a:spLocks noGrp="1"/>
-          </p:cNvSpPr>
-          <p:nvPr>
-            <p:ph type="dt" sz="half" idx="10"/>
-          </p:nvPr>
-        </p:nvSpPr>
-        <p:spPr/>
-        <p:txBody>
-          <a:bodyPr/>
-          <a:lstStyle/>
-          <a:p>
-            <a:fld id="{6700A58B-DD98-43D0-B791-721480A02982}" type="datetime1">
-              <a:rPr lang="en-US" smtClean="0"/>
-              <a:t>10/23/23</a:t>
-            </a:fld>
-            <a:endParaRPr lang="en-US"/>
-          </a:p>
-        </p:txBody>
-      </p:sp>
-      <p:sp>
-        <p:nvSpPr>
-          <p:cNvPr id="3" name="Title 2">
-            <a:extLst>
-              <a:ext uri="{FF2B5EF4-FFF2-40B4-BE49-F238E27FC236}">
-                <a16:creationId xmlns:a16="http://schemas.microsoft.com/office/drawing/2014/main" id="{DE073A4E-881B-4087-888F-54EFDE9A13C8}"/>
-              </a:ext>
-            </a:extLst>
-          </p:cNvPr>
-          <p:cNvSpPr>
-            <a:spLocks noGrp="1"/>
-          </p:cNvSpPr>
-          <p:nvPr>
-            <p:ph type="title"/>
-          </p:nvPr>
-        </p:nvSpPr>
-        <p:spPr/>
-        <p:txBody>
-          <a:bodyPr/>
-          <a:lstStyle/>
-          <a:p>
-            <a:r>
-              <a:rPr lang="en-US" dirty="0"/>
-              <a:t>An example of overfitting…</a:t>
-            </a:r>
-          </a:p>
-        </p:txBody>
-      </p:sp>
-      <p:sp>
-        <p:nvSpPr>
-          <p:cNvPr id="4" name="Slide Number Placeholder 3">
-            <a:extLst>
-              <a:ext uri="{FF2B5EF4-FFF2-40B4-BE49-F238E27FC236}">
-                <a16:creationId xmlns:a16="http://schemas.microsoft.com/office/drawing/2014/main" id="{266C3AAE-17CC-4F12-939B-CC4079F7A6FA}"/>
-              </a:ext>
-            </a:extLst>
-          </p:cNvPr>
-          <p:cNvSpPr>
-            <a:spLocks noGrp="1"/>
-          </p:cNvSpPr>
-          <p:nvPr>
-            <p:ph type="sldNum" sz="quarter" idx="12"/>
-          </p:nvPr>
-        </p:nvSpPr>
-        <p:spPr/>
-        <p:txBody>
-          <a:bodyPr/>
-          <a:lstStyle/>
-          <a:p>
-            <a:fld id="{37290FF7-652B-4475-AEAB-8B1A5D23AE09}" type="slidenum">
-              <a:rPr lang="en-US" smtClean="0"/>
-              <a:t>30</a:t>
             </a:fld>
             <a:endParaRPr lang="en-US"/>
           </a:p>
@@ -20864,7 +20281,7 @@
 </p:sld>
 </file>
 
-<file path=ppt/slides/slide31.xml><?xml version="1.0" encoding="utf-8"?>
+<file path=ppt/slides/slide3.xml><?xml version="1.0" encoding="utf-8"?>
 <p:sld xmlns:a="http://schemas.openxmlformats.org/drawingml/2006/main" xmlns:r="http://schemas.openxmlformats.org/officeDocument/2006/relationships" xmlns:p="http://schemas.openxmlformats.org/presentationml/2006/main">
   <p:cSld>
     <p:spTree>
@@ -20886,7 +20303,7 @@
           <p:cNvPr id="2" name="Date Placeholder 1">
             <a:extLst>
               <a:ext uri="{FF2B5EF4-FFF2-40B4-BE49-F238E27FC236}">
-                <a16:creationId xmlns:a16="http://schemas.microsoft.com/office/drawing/2014/main" id="{D98318D2-FCDC-4C59-8DD5-D9CEC2ABDBC8}"/>
+                <a16:creationId xmlns:a16="http://schemas.microsoft.com/office/drawing/2014/main" id="{69694DB3-CEFE-49D5-866E-475F55D5BDF4}"/>
               </a:ext>
             </a:extLst>
           </p:cNvPr>
@@ -20904,7 +20321,7 @@
           <a:p>
             <a:fld id="{6700A58B-DD98-43D0-B791-721480A02982}" type="datetime1">
               <a:rPr lang="en-US" smtClean="0"/>
-              <a:t>10/23/23</a:t>
+              <a:t>10/21/24</a:t>
             </a:fld>
             <a:endParaRPr lang="en-US"/>
           </a:p>
@@ -20915,7 +20332,7 @@
           <p:cNvPr id="3" name="Title 2">
             <a:extLst>
               <a:ext uri="{FF2B5EF4-FFF2-40B4-BE49-F238E27FC236}">
-                <a16:creationId xmlns:a16="http://schemas.microsoft.com/office/drawing/2014/main" id="{3DD65BA8-85D7-4A45-9F39-B217A21D03CD}"/>
+                <a16:creationId xmlns:a16="http://schemas.microsoft.com/office/drawing/2014/main" id="{787E2F7D-50B6-43F4-85CC-C9531D3F6175}"/>
               </a:ext>
             </a:extLst>
           </p:cNvPr>
@@ -20932,12 +20349,8 @@
           <a:lstStyle/>
           <a:p>
             <a:r>
-              <a:rPr lang="en-US" dirty="0" err="1"/>
-              <a:t>cp</a:t>
-            </a:r>
-            <a:r>
               <a:rPr lang="en-US" dirty="0"/>
-              <a:t>- complexity parameter</a:t>
+              <a:t>Decision Trees</a:t>
             </a:r>
           </a:p>
         </p:txBody>
@@ -20947,7 +20360,7 @@
           <p:cNvPr id="4" name="Slide Number Placeholder 3">
             <a:extLst>
               <a:ext uri="{FF2B5EF4-FFF2-40B4-BE49-F238E27FC236}">
-                <a16:creationId xmlns:a16="http://schemas.microsoft.com/office/drawing/2014/main" id="{5D4EAF60-C73E-45D3-BE12-58A721B142CB}"/>
+                <a16:creationId xmlns:a16="http://schemas.microsoft.com/office/drawing/2014/main" id="{3E8455AE-BF72-4683-9895-6410B5607130}"/>
               </a:ext>
             </a:extLst>
           </p:cNvPr>
@@ -20965,7 +20378,249 @@
           <a:p>
             <a:fld id="{37290FF7-652B-4475-AEAB-8B1A5D23AE09}" type="slidenum">
               <a:rPr lang="en-US" smtClean="0"/>
-              <a:t>31</a:t>
+              <a:t>3</a:t>
+            </a:fld>
+            <a:endParaRPr lang="en-US"/>
+          </a:p>
+        </p:txBody>
+      </p:sp>
+      <p:sp>
+        <p:nvSpPr>
+          <p:cNvPr id="5" name="Footer Placeholder 4">
+            <a:extLst>
+              <a:ext uri="{FF2B5EF4-FFF2-40B4-BE49-F238E27FC236}">
+                <a16:creationId xmlns:a16="http://schemas.microsoft.com/office/drawing/2014/main" id="{7D23332A-1DC2-4197-8097-575B2DC6A8A9}"/>
+              </a:ext>
+            </a:extLst>
+          </p:cNvPr>
+          <p:cNvSpPr>
+            <a:spLocks noGrp="1"/>
+          </p:cNvSpPr>
+          <p:nvPr>
+            <p:ph type="ftr" sz="quarter" idx="3"/>
+          </p:nvPr>
+        </p:nvSpPr>
+        <p:spPr/>
+        <p:txBody>
+          <a:bodyPr/>
+          <a:lstStyle/>
+          <a:p>
+            <a:r>
+              <a:rPr lang="en-US" dirty="0"/>
+              <a:t>Kwartler </a:t>
+            </a:r>
+          </a:p>
+        </p:txBody>
+      </p:sp>
+      <p:sp>
+        <p:nvSpPr>
+          <p:cNvPr id="6" name="TextBox 5">
+            <a:extLst>
+              <a:ext uri="{FF2B5EF4-FFF2-40B4-BE49-F238E27FC236}">
+                <a16:creationId xmlns:a16="http://schemas.microsoft.com/office/drawing/2014/main" id="{767B5567-5D4B-4CE6-B81E-9BAD57C4D2C1}"/>
+              </a:ext>
+            </a:extLst>
+          </p:cNvPr>
+          <p:cNvSpPr txBox="1"/>
+          <p:nvPr/>
+        </p:nvSpPr>
+        <p:spPr>
+          <a:xfrm>
+            <a:off x="250369" y="1676400"/>
+            <a:ext cx="8741232" cy="2308324"/>
+          </a:xfrm>
+          <a:prstGeom prst="rect">
+            <a:avLst/>
+          </a:prstGeom>
+          <a:noFill/>
+        </p:spPr>
+        <p:txBody>
+          <a:bodyPr wrap="square" rtlCol="0">
+            <a:spAutoFit/>
+          </a:bodyPr>
+          <a:lstStyle/>
+          <a:p>
+            <a:pPr marL="285750" indent="-285750">
+              <a:buFont typeface="Arial" panose="020B0604020202020204" pitchFamily="34" charset="0"/>
+              <a:buChar char="•"/>
+            </a:pPr>
+            <a:r>
+              <a:rPr lang="en-US" dirty="0"/>
+              <a:t>By observing the data and splitting it into sections, rules are created for either prediction or classification problems.</a:t>
+            </a:r>
+          </a:p>
+          <a:p>
+            <a:pPr marL="285750" indent="-285750">
+              <a:buFont typeface="Arial" panose="020B0604020202020204" pitchFamily="34" charset="0"/>
+              <a:buChar char="•"/>
+            </a:pPr>
+            <a:endParaRPr lang="en-US" dirty="0"/>
+          </a:p>
+          <a:p>
+            <a:pPr marL="285750" indent="-285750">
+              <a:buFont typeface="Arial" panose="020B0604020202020204" pitchFamily="34" charset="0"/>
+              <a:buChar char="•"/>
+            </a:pPr>
+            <a:r>
+              <a:rPr lang="en-US" dirty="0"/>
+              <a:t>Mimics a subject matter expert…pre data mining days.</a:t>
+            </a:r>
+          </a:p>
+          <a:p>
+            <a:pPr marL="742950" lvl="1" indent="-285750">
+              <a:buFont typeface="Arial" panose="020B0604020202020204" pitchFamily="34" charset="0"/>
+              <a:buChar char="•"/>
+            </a:pPr>
+            <a:r>
+              <a:rPr lang="en-US" dirty="0"/>
+              <a:t>Before data mining, an experienced marketing  bank manager may have said “let’s call our </a:t>
+            </a:r>
+            <a:r>
+              <a:rPr lang="en-US" i="1" dirty="0"/>
+              <a:t>married</a:t>
+            </a:r>
+            <a:r>
+              <a:rPr lang="en-US" dirty="0"/>
+              <a:t> customers </a:t>
+            </a:r>
+            <a:r>
+              <a:rPr lang="en-US" i="1" dirty="0"/>
+              <a:t>over 25 </a:t>
+            </a:r>
+            <a:r>
+              <a:rPr lang="en-US" dirty="0"/>
+              <a:t>that have at </a:t>
+            </a:r>
+            <a:r>
+              <a:rPr lang="en-US" i="1" dirty="0"/>
+              <a:t>least a college education </a:t>
+            </a:r>
+            <a:r>
+              <a:rPr lang="en-US" dirty="0"/>
+              <a:t>to see if they want another loan.”  </a:t>
+            </a:r>
+            <a:br>
+              <a:rPr lang="en-US" dirty="0"/>
+            </a:br>
+            <a:endParaRPr lang="en-US" dirty="0"/>
+          </a:p>
+        </p:txBody>
+      </p:sp>
+    </p:spTree>
+    <p:extLst>
+      <p:ext uri="{BB962C8B-B14F-4D97-AF65-F5344CB8AC3E}">
+        <p14:creationId xmlns:p14="http://schemas.microsoft.com/office/powerpoint/2010/main" val="2239418138"/>
+      </p:ext>
+    </p:extLst>
+  </p:cSld>
+  <p:clrMapOvr>
+    <a:masterClrMapping/>
+  </p:clrMapOvr>
+</p:sld>
+</file>
+
+<file path=ppt/slides/slide30.xml><?xml version="1.0" encoding="utf-8"?>
+<p:sld xmlns:a="http://schemas.openxmlformats.org/drawingml/2006/main" xmlns:r="http://schemas.openxmlformats.org/officeDocument/2006/relationships" xmlns:p="http://schemas.openxmlformats.org/presentationml/2006/main">
+  <p:cSld>
+    <p:spTree>
+      <p:nvGrpSpPr>
+        <p:cNvPr id="1" name=""/>
+        <p:cNvGrpSpPr/>
+        <p:nvPr/>
+      </p:nvGrpSpPr>
+      <p:grpSpPr>
+        <a:xfrm>
+          <a:off x="0" y="0"/>
+          <a:ext cx="0" cy="0"/>
+          <a:chOff x="0" y="0"/>
+          <a:chExt cx="0" cy="0"/>
+        </a:xfrm>
+      </p:grpSpPr>
+      <p:sp>
+        <p:nvSpPr>
+          <p:cNvPr id="2" name="Date Placeholder 1">
+            <a:extLst>
+              <a:ext uri="{FF2B5EF4-FFF2-40B4-BE49-F238E27FC236}">
+                <a16:creationId xmlns:a16="http://schemas.microsoft.com/office/drawing/2014/main" id="{D98318D2-FCDC-4C59-8DD5-D9CEC2ABDBC8}"/>
+              </a:ext>
+            </a:extLst>
+          </p:cNvPr>
+          <p:cNvSpPr>
+            <a:spLocks noGrp="1"/>
+          </p:cNvSpPr>
+          <p:nvPr>
+            <p:ph type="dt" sz="half" idx="10"/>
+          </p:nvPr>
+        </p:nvSpPr>
+        <p:spPr/>
+        <p:txBody>
+          <a:bodyPr/>
+          <a:lstStyle/>
+          <a:p>
+            <a:fld id="{6700A58B-DD98-43D0-B791-721480A02982}" type="datetime1">
+              <a:rPr lang="en-US" smtClean="0"/>
+              <a:t>10/21/24</a:t>
+            </a:fld>
+            <a:endParaRPr lang="en-US"/>
+          </a:p>
+        </p:txBody>
+      </p:sp>
+      <p:sp>
+        <p:nvSpPr>
+          <p:cNvPr id="3" name="Title 2">
+            <a:extLst>
+              <a:ext uri="{FF2B5EF4-FFF2-40B4-BE49-F238E27FC236}">
+                <a16:creationId xmlns:a16="http://schemas.microsoft.com/office/drawing/2014/main" id="{3DD65BA8-85D7-4A45-9F39-B217A21D03CD}"/>
+              </a:ext>
+            </a:extLst>
+          </p:cNvPr>
+          <p:cNvSpPr>
+            <a:spLocks noGrp="1"/>
+          </p:cNvSpPr>
+          <p:nvPr>
+            <p:ph type="title"/>
+          </p:nvPr>
+        </p:nvSpPr>
+        <p:spPr/>
+        <p:txBody>
+          <a:bodyPr/>
+          <a:lstStyle/>
+          <a:p>
+            <a:r>
+              <a:rPr lang="en-US" dirty="0" err="1"/>
+              <a:t>cp</a:t>
+            </a:r>
+            <a:r>
+              <a:rPr lang="en-US" dirty="0"/>
+              <a:t>- complexity parameter</a:t>
+            </a:r>
+          </a:p>
+        </p:txBody>
+      </p:sp>
+      <p:sp>
+        <p:nvSpPr>
+          <p:cNvPr id="4" name="Slide Number Placeholder 3">
+            <a:extLst>
+              <a:ext uri="{FF2B5EF4-FFF2-40B4-BE49-F238E27FC236}">
+                <a16:creationId xmlns:a16="http://schemas.microsoft.com/office/drawing/2014/main" id="{5D4EAF60-C73E-45D3-BE12-58A721B142CB}"/>
+              </a:ext>
+            </a:extLst>
+          </p:cNvPr>
+          <p:cNvSpPr>
+            <a:spLocks noGrp="1"/>
+          </p:cNvSpPr>
+          <p:nvPr>
+            <p:ph type="sldNum" sz="quarter" idx="12"/>
+          </p:nvPr>
+        </p:nvSpPr>
+        <p:spPr/>
+        <p:txBody>
+          <a:bodyPr/>
+          <a:lstStyle/>
+          <a:p>
+            <a:fld id="{37290FF7-652B-4475-AEAB-8B1A5D23AE09}" type="slidenum">
+              <a:rPr lang="en-US" smtClean="0"/>
+              <a:t>30</a:t>
             </a:fld>
             <a:endParaRPr lang="en-US"/>
           </a:p>
@@ -21117,7 +20772,7 @@
 </p:sld>
 </file>
 
-<file path=ppt/slides/slide32.xml><?xml version="1.0" encoding="utf-8"?>
+<file path=ppt/slides/slide31.xml><?xml version="1.0" encoding="utf-8"?>
 <p:sld xmlns:a="http://schemas.openxmlformats.org/drawingml/2006/main" xmlns:r="http://schemas.openxmlformats.org/officeDocument/2006/relationships" xmlns:p="http://schemas.openxmlformats.org/presentationml/2006/main">
   <p:cSld>
     <p:spTree>
@@ -21157,7 +20812,7 @@
           <a:p>
             <a:fld id="{6700A58B-DD98-43D0-B791-721480A02982}" type="datetime1">
               <a:rPr lang="en-US" smtClean="0"/>
-              <a:t>10/23/23</a:t>
+              <a:t>10/21/24</a:t>
             </a:fld>
             <a:endParaRPr lang="en-US"/>
           </a:p>
@@ -21214,7 +20869,7 @@
           <a:p>
             <a:fld id="{37290FF7-652B-4475-AEAB-8B1A5D23AE09}" type="slidenum">
               <a:rPr lang="en-US" smtClean="0"/>
-              <a:t>32</a:t>
+              <a:t>31</a:t>
             </a:fld>
             <a:endParaRPr lang="en-US"/>
           </a:p>
@@ -21899,7 +21554,7 @@
 </p:sld>
 </file>
 
-<file path=ppt/slides/slide33.xml><?xml version="1.0" encoding="utf-8"?>
+<file path=ppt/slides/slide32.xml><?xml version="1.0" encoding="utf-8"?>
 <p:sld xmlns:a="http://schemas.openxmlformats.org/drawingml/2006/main" xmlns:r="http://schemas.openxmlformats.org/officeDocument/2006/relationships" xmlns:p="http://schemas.openxmlformats.org/presentationml/2006/main">
   <p:cSld>
     <p:spTree>
@@ -21939,7 +21594,7 @@
           <a:p>
             <a:fld id="{6700A58B-DD98-43D0-B791-721480A02982}" type="datetime1">
               <a:rPr lang="en-US" smtClean="0"/>
-              <a:t>10/23/23</a:t>
+              <a:t>10/21/24</a:t>
             </a:fld>
             <a:endParaRPr lang="en-US"/>
           </a:p>
@@ -22012,7 +21667,7 @@
           <a:p>
             <a:fld id="{37290FF7-652B-4475-AEAB-8B1A5D23AE09}" type="slidenum">
               <a:rPr lang="en-US" smtClean="0"/>
-              <a:t>33</a:t>
+              <a:t>32</a:t>
             </a:fld>
             <a:endParaRPr lang="en-US"/>
           </a:p>
@@ -22124,7 +21779,7 @@
 </p:sld>
 </file>
 
-<file path=ppt/slides/slide34.xml><?xml version="1.0" encoding="utf-8"?>
+<file path=ppt/slides/slide33.xml><?xml version="1.0" encoding="utf-8"?>
 <p:sld xmlns:a="http://schemas.openxmlformats.org/drawingml/2006/main" xmlns:r="http://schemas.openxmlformats.org/officeDocument/2006/relationships" xmlns:p="http://schemas.openxmlformats.org/presentationml/2006/main">
   <p:cSld>
     <p:spTree>
@@ -22158,7 +21813,7 @@
           <a:p>
             <a:fld id="{6700A58B-DD98-43D0-B791-721480A02982}" type="datetime1">
               <a:rPr lang="en-US" smtClean="0"/>
-              <a:t>10/23/23</a:t>
+              <a:t>10/21/24</a:t>
             </a:fld>
             <a:endParaRPr lang="en-US"/>
           </a:p>
@@ -22203,7 +21858,7 @@
           <a:p>
             <a:fld id="{37290FF7-652B-4475-AEAB-8B1A5D23AE09}" type="slidenum">
               <a:rPr lang="en-US" smtClean="0"/>
-              <a:t>34</a:t>
+              <a:t>33</a:t>
             </a:fld>
             <a:endParaRPr lang="en-US"/>
           </a:p>
@@ -22888,7 +22543,7 @@
           <a:p>
             <a:fld id="{9B19E99B-5349-415A-8E56-8E989211A366}" type="datetime1">
               <a:rPr lang="en-US" smtClean="0"/>
-              <a:t>10/23/23</a:t>
+              <a:t>10/21/24</a:t>
             </a:fld>
             <a:endParaRPr lang="en-US"/>
           </a:p>
@@ -23008,7 +22663,7 @@
           <a:p>
             <a:fld id="{6700A58B-DD98-43D0-B791-721480A02982}" type="datetime1">
               <a:rPr lang="en-US" smtClean="0"/>
-              <a:t>10/23/23</a:t>
+              <a:t>10/21/24</a:t>
             </a:fld>
             <a:endParaRPr lang="en-US"/>
           </a:p>
@@ -23241,7 +22896,7 @@
           <a:p>
             <a:fld id="{6700A58B-DD98-43D0-B791-721480A02982}" type="datetime1">
               <a:rPr lang="en-US" smtClean="0"/>
-              <a:t>10/23/23</a:t>
+              <a:t>10/21/24</a:t>
             </a:fld>
             <a:endParaRPr lang="en-US"/>
           </a:p>
@@ -23454,7 +23109,7 @@
           <a:p>
             <a:fld id="{6700A58B-DD98-43D0-B791-721480A02982}" type="datetime1">
               <a:rPr lang="en-US" smtClean="0"/>
-              <a:t>10/23/23</a:t>
+              <a:t>10/21/24</a:t>
             </a:fld>
             <a:endParaRPr lang="en-US"/>
           </a:p>
@@ -23899,7 +23554,7 @@
           <a:p>
             <a:fld id="{9B19E99B-5349-415A-8E56-8E989211A366}" type="datetime1">
               <a:rPr lang="en-US" smtClean="0"/>
-              <a:t>10/23/23</a:t>
+              <a:t>10/21/24</a:t>
             </a:fld>
             <a:endParaRPr lang="en-US"/>
           </a:p>
@@ -24019,7 +23674,7 @@
           <a:p>
             <a:fld id="{6700A58B-DD98-43D0-B791-721480A02982}" type="datetime1">
               <a:rPr lang="en-US" smtClean="0"/>
-              <a:t>10/23/23</a:t>
+              <a:t>10/21/24</a:t>
             </a:fld>
             <a:endParaRPr lang="en-US"/>
           </a:p>

</xml_diff>

<commit_message>
add plot to today's lesson
</commit_message>
<xml_diff>
--- a/Lessons/F_Tree_RF/B_Decision Trees.pptx
+++ b/Lessons/F_Tree_RF/B_Decision Trees.pptx
@@ -243,7 +243,7 @@
           <a:p>
             <a:fld id="{B0C0A60C-850A-4EA4-9C14-A8FE98B94505}" type="datetimeFigureOut">
               <a:rPr lang="en-US" smtClean="0"/>
-              <a:t>10/21/24</a:t>
+              <a:t>10/30/24</a:t>
             </a:fld>
             <a:endParaRPr lang="en-US"/>
           </a:p>
@@ -1137,7 +1137,7 @@
           <a:p>
             <a:fld id="{5738B90E-0779-4C36-915C-6F05FCD89456}" type="datetime1">
               <a:rPr lang="en-US" smtClean="0"/>
-              <a:t>10/21/24</a:t>
+              <a:t>10/30/24</a:t>
             </a:fld>
             <a:endParaRPr lang="en-US"/>
           </a:p>
@@ -1355,7 +1355,7 @@
           <a:p>
             <a:fld id="{7B9EA29D-D431-42FE-B7B6-AAE4454C77D3}" type="datetime1">
               <a:rPr lang="en-US" smtClean="0"/>
-              <a:t>10/21/24</a:t>
+              <a:t>10/30/24</a:t>
             </a:fld>
             <a:endParaRPr lang="en-US"/>
           </a:p>
@@ -1615,7 +1615,7 @@
           <a:p>
             <a:fld id="{690D8A1E-EA8F-46C1-B891-AE0C00D9C314}" type="datetime1">
               <a:rPr lang="en-US" smtClean="0"/>
-              <a:t>10/21/24</a:t>
+              <a:t>10/30/24</a:t>
             </a:fld>
             <a:endParaRPr lang="en-US"/>
           </a:p>
@@ -1909,7 +1909,7 @@
           <a:p>
             <a:fld id="{D753EFC8-4232-4598-94F6-94C0EBAFC469}" type="datetime1">
               <a:rPr lang="en-US" smtClean="0"/>
-              <a:t>10/21/24</a:t>
+              <a:t>10/30/24</a:t>
             </a:fld>
             <a:endParaRPr lang="en-US"/>
           </a:p>
@@ -2224,7 +2224,7 @@
           <a:p>
             <a:fld id="{F3161074-1C18-4AE7-957D-F18524378C85}" type="datetime1">
               <a:rPr lang="en-US" smtClean="0"/>
-              <a:t>10/21/24</a:t>
+              <a:t>10/30/24</a:t>
             </a:fld>
             <a:endParaRPr lang="en-US"/>
           </a:p>
@@ -2498,7 +2498,7 @@
           <a:p>
             <a:fld id="{69BE256C-8D9A-4404-B47D-41A1AE514425}" type="datetime1">
               <a:rPr lang="en-US" smtClean="0"/>
-              <a:t>10/21/24</a:t>
+              <a:t>10/30/24</a:t>
             </a:fld>
             <a:endParaRPr lang="en-US"/>
           </a:p>
@@ -2932,7 +2932,7 @@
           <a:p>
             <a:fld id="{66CB2154-9035-4012-8189-BAAB61C5A5EE}" type="datetime1">
               <a:rPr lang="en-US" smtClean="0"/>
-              <a:t>10/21/24</a:t>
+              <a:t>10/30/24</a:t>
             </a:fld>
             <a:endParaRPr lang="en-US"/>
           </a:p>
@@ -3106,7 +3106,7 @@
           <a:p>
             <a:fld id="{6700A58B-DD98-43D0-B791-721480A02982}" type="datetime1">
               <a:rPr lang="en-US" smtClean="0"/>
-              <a:t>10/21/24</a:t>
+              <a:t>10/30/24</a:t>
             </a:fld>
             <a:endParaRPr lang="en-US"/>
           </a:p>
@@ -3298,7 +3298,7 @@
           <a:p>
             <a:fld id="{7DB6E382-4F61-4E24-BE1A-377EC83D0E3A}" type="datetime1">
               <a:rPr lang="en-US" smtClean="0"/>
-              <a:t>10/21/24</a:t>
+              <a:t>10/30/24</a:t>
             </a:fld>
             <a:endParaRPr lang="en-US"/>
           </a:p>
@@ -3609,7 +3609,7 @@
           <a:p>
             <a:fld id="{4142EED6-FC16-45B9-B8C4-2BC5DBA88325}" type="datetime1">
               <a:rPr lang="en-US" smtClean="0"/>
-              <a:t>10/21/24</a:t>
+              <a:t>10/30/24</a:t>
             </a:fld>
             <a:endParaRPr lang="en-US"/>
           </a:p>
@@ -3927,7 +3927,7 @@
           <a:p>
             <a:fld id="{DF59512B-4F1D-43D7-8819-2F53FEF69650}" type="datetime1">
               <a:rPr lang="en-US" smtClean="0"/>
-              <a:t>10/21/24</a:t>
+              <a:t>10/30/24</a:t>
             </a:fld>
             <a:endParaRPr lang="en-US"/>
           </a:p>
@@ -4203,7 +4203,7 @@
           <a:p>
             <a:fld id="{08437B94-E2BF-44DC-ADC5-B05FC9934E9D}" type="datetime1">
               <a:rPr lang="en-US" smtClean="0"/>
-              <a:t>10/21/24</a:t>
+              <a:t>10/30/24</a:t>
             </a:fld>
             <a:endParaRPr lang="en-US"/>
           </a:p>
@@ -4723,7 +4723,7 @@
           <a:p>
             <a:fld id="{5738B90E-0779-4C36-915C-6F05FCD89456}" type="datetime1">
               <a:rPr lang="en-US" smtClean="0"/>
-              <a:t>10/21/24</a:t>
+              <a:t>10/30/24</a:t>
             </a:fld>
             <a:endParaRPr lang="en-US"/>
           </a:p>
@@ -4839,7 +4839,7 @@
           <a:p>
             <a:fld id="{6700A58B-DD98-43D0-B791-721480A02982}" type="datetime1">
               <a:rPr lang="en-US" smtClean="0"/>
-              <a:t>10/21/24</a:t>
+              <a:t>10/30/24</a:t>
             </a:fld>
             <a:endParaRPr lang="en-US"/>
           </a:p>
@@ -5193,7 +5193,7 @@
           <a:p>
             <a:fld id="{6700A58B-DD98-43D0-B791-721480A02982}" type="datetime1">
               <a:rPr lang="en-US" smtClean="0"/>
-              <a:t>10/21/24</a:t>
+              <a:t>10/30/24</a:t>
             </a:fld>
             <a:endParaRPr lang="en-US"/>
           </a:p>
@@ -5488,7 +5488,7 @@
           <a:p>
             <a:fld id="{6700A58B-DD98-43D0-B791-721480A02982}" type="datetime1">
               <a:rPr lang="en-US" smtClean="0"/>
-              <a:t>10/21/24</a:t>
+              <a:t>10/30/24</a:t>
             </a:fld>
             <a:endParaRPr lang="en-US"/>
           </a:p>
@@ -5783,7 +5783,7 @@
           <a:p>
             <a:fld id="{6700A58B-DD98-43D0-B791-721480A02982}" type="datetime1">
               <a:rPr lang="en-US" smtClean="0"/>
-              <a:t>10/21/24</a:t>
+              <a:t>10/30/24</a:t>
             </a:fld>
             <a:endParaRPr lang="en-US"/>
           </a:p>
@@ -6216,7 +6216,7 @@
           <a:p>
             <a:fld id="{6700A58B-DD98-43D0-B791-721480A02982}" type="datetime1">
               <a:rPr lang="en-US" smtClean="0"/>
-              <a:t>10/21/24</a:t>
+              <a:t>10/30/24</a:t>
             </a:fld>
             <a:endParaRPr lang="en-US"/>
           </a:p>
@@ -7010,7 +7010,7 @@
           <a:p>
             <a:fld id="{6700A58B-DD98-43D0-B791-721480A02982}" type="datetime1">
               <a:rPr lang="en-US" smtClean="0"/>
-              <a:t>10/21/24</a:t>
+              <a:t>10/30/24</a:t>
             </a:fld>
             <a:endParaRPr lang="en-US"/>
           </a:p>
@@ -7931,7 +7931,7 @@
           <a:p>
             <a:fld id="{6700A58B-DD98-43D0-B791-721480A02982}" type="datetime1">
               <a:rPr lang="en-US" smtClean="0"/>
-              <a:t>10/21/24</a:t>
+              <a:t>10/30/24</a:t>
             </a:fld>
             <a:endParaRPr lang="en-US"/>
           </a:p>
@@ -9365,7 +9365,7 @@
           <a:p>
             <a:fld id="{6700A58B-DD98-43D0-B791-721480A02982}" type="datetime1">
               <a:rPr lang="en-US" smtClean="0"/>
-              <a:t>10/21/24</a:t>
+              <a:t>10/30/24</a:t>
             </a:fld>
             <a:endParaRPr lang="en-US"/>
           </a:p>
@@ -10263,7 +10263,7 @@
           <a:p>
             <a:fld id="{6700A58B-DD98-43D0-B791-721480A02982}" type="datetime1">
               <a:rPr lang="en-US" smtClean="0"/>
-              <a:t>10/21/24</a:t>
+              <a:t>10/30/24</a:t>
             </a:fld>
             <a:endParaRPr lang="en-US"/>
           </a:p>
@@ -11198,7 +11198,7 @@
           <a:p>
             <a:fld id="{6700A58B-DD98-43D0-B791-721480A02982}" type="datetime1">
               <a:rPr lang="en-US" smtClean="0"/>
-              <a:t>10/21/24</a:t>
+              <a:t>10/30/24</a:t>
             </a:fld>
             <a:endParaRPr lang="en-US"/>
           </a:p>
@@ -11519,7 +11519,7 @@
           <a:p>
             <a:fld id="{6700A58B-DD98-43D0-B791-721480A02982}" type="datetime1">
               <a:rPr lang="en-US" smtClean="0"/>
-              <a:t>10/21/24</a:t>
+              <a:t>10/30/24</a:t>
             </a:fld>
             <a:endParaRPr lang="en-US"/>
           </a:p>
@@ -12019,7 +12019,7 @@
           <a:p>
             <a:fld id="{6700A58B-DD98-43D0-B791-721480A02982}" type="datetime1">
               <a:rPr lang="en-US" smtClean="0"/>
-              <a:t>10/21/24</a:t>
+              <a:t>10/30/24</a:t>
             </a:fld>
             <a:endParaRPr lang="en-US"/>
           </a:p>
@@ -13304,7 +13304,7 @@
                 <a:tabLst/>
                 <a:defRPr/>
               </a:pPr>
-              <a:t>10/21/24</a:t>
+              <a:t>10/30/24</a:t>
             </a:fld>
             <a:endParaRPr kumimoji="0" lang="en-US" sz="900" b="0" i="0" u="none" strike="noStrike" kern="1200" cap="none" spc="0" normalizeH="0" baseline="0" noProof="0">
               <a:ln>
@@ -14794,7 +14794,7 @@
                 <a:tabLst/>
                 <a:defRPr/>
               </a:pPr>
-              <a:t>10/21/24</a:t>
+              <a:t>10/30/24</a:t>
             </a:fld>
             <a:endParaRPr kumimoji="0" lang="en-US" sz="900" b="0" i="0" u="none" strike="noStrike" kern="1200" cap="none" spc="0" normalizeH="0" baseline="0" noProof="0">
               <a:ln>
@@ -16346,7 +16346,7 @@
                 <a:tabLst/>
                 <a:defRPr/>
               </a:pPr>
-              <a:t>10/21/24</a:t>
+              <a:t>10/30/24</a:t>
             </a:fld>
             <a:endParaRPr kumimoji="0" lang="en-US" sz="900" b="0" i="0" u="none" strike="noStrike" kern="1200" cap="none" spc="0" normalizeH="0" baseline="0" noProof="0">
               <a:ln>
@@ -16999,7 +16999,7 @@
                 <a:tabLst/>
                 <a:defRPr/>
               </a:pPr>
-              <a:t>10/21/24</a:t>
+              <a:t>10/30/24</a:t>
             </a:fld>
             <a:endParaRPr kumimoji="0" lang="en-US" sz="900" b="0" i="0" u="none" strike="noStrike" kern="1200" cap="none" spc="0" normalizeH="0" baseline="0" noProof="0">
               <a:ln>
@@ -17697,7 +17697,7 @@
           <a:p>
             <a:fld id="{9B19E99B-5349-415A-8E56-8E989211A366}" type="datetime1">
               <a:rPr lang="en-US" smtClean="0"/>
-              <a:t>10/21/24</a:t>
+              <a:t>10/30/24</a:t>
             </a:fld>
             <a:endParaRPr lang="en-US"/>
           </a:p>
@@ -17847,7 +17847,7 @@
           <a:p>
             <a:fld id="{6700A58B-DD98-43D0-B791-721480A02982}" type="datetime1">
               <a:rPr lang="en-US" smtClean="0"/>
-              <a:t>10/21/24</a:t>
+              <a:t>10/30/24</a:t>
             </a:fld>
             <a:endParaRPr lang="en-US"/>
           </a:p>
@@ -18094,7 +18094,7 @@
           <a:p>
             <a:fld id="{6700A58B-DD98-43D0-B791-721480A02982}" type="datetime1">
               <a:rPr lang="en-US" smtClean="0"/>
-              <a:t>10/21/24</a:t>
+              <a:t>10/30/24</a:t>
             </a:fld>
             <a:endParaRPr lang="en-US"/>
           </a:p>
@@ -18412,7 +18412,7 @@
           <a:p>
             <a:fld id="{6700A58B-DD98-43D0-B791-721480A02982}" type="datetime1">
               <a:rPr lang="en-US" smtClean="0"/>
-              <a:t>10/21/24</a:t>
+              <a:t>10/30/24</a:t>
             </a:fld>
             <a:endParaRPr lang="en-US"/>
           </a:p>
@@ -18874,7 +18874,7 @@
           <a:p>
             <a:fld id="{6700A58B-DD98-43D0-B791-721480A02982}" type="datetime1">
               <a:rPr lang="en-US" smtClean="0"/>
-              <a:t>10/21/24</a:t>
+              <a:t>10/30/24</a:t>
             </a:fld>
             <a:endParaRPr lang="en-US"/>
           </a:p>
@@ -20321,7 +20321,7 @@
           <a:p>
             <a:fld id="{6700A58B-DD98-43D0-B791-721480A02982}" type="datetime1">
               <a:rPr lang="en-US" smtClean="0"/>
-              <a:t>10/21/24</a:t>
+              <a:t>10/30/24</a:t>
             </a:fld>
             <a:endParaRPr lang="en-US"/>
           </a:p>
@@ -20559,7 +20559,7 @@
           <a:p>
             <a:fld id="{6700A58B-DD98-43D0-B791-721480A02982}" type="datetime1">
               <a:rPr lang="en-US" smtClean="0"/>
-              <a:t>10/21/24</a:t>
+              <a:t>10/30/24</a:t>
             </a:fld>
             <a:endParaRPr lang="en-US"/>
           </a:p>
@@ -20668,7 +20668,7 @@
         </p:nvSpPr>
         <p:spPr>
           <a:xfrm>
-            <a:off x="324232" y="2733147"/>
+            <a:off x="324232" y="1359954"/>
             <a:ext cx="8495535" cy="1015663"/>
           </a:xfrm>
           <a:prstGeom prst="rect">
@@ -20756,6 +20756,130 @@
               <a:rPr lang="en-US"/>
               <a:t>Setting cp to a negative amount ensures that the tree will be fully grown.</a:t>
             </a:r>
+          </a:p>
+        </p:txBody>
+      </p:sp>
+      <p:sp>
+        <p:nvSpPr>
+          <p:cNvPr id="6" name="TextBox 5">
+            <a:extLst>
+              <a:ext uri="{FF2B5EF4-FFF2-40B4-BE49-F238E27FC236}">
+                <a16:creationId xmlns:a16="http://schemas.microsoft.com/office/drawing/2014/main" id="{3ED72527-BCF2-413E-1045-5FBBA64FB75E}"/>
+              </a:ext>
+            </a:extLst>
+          </p:cNvPr>
+          <p:cNvSpPr txBox="1"/>
+          <p:nvPr/>
+        </p:nvSpPr>
+        <p:spPr>
+          <a:xfrm>
+            <a:off x="516835" y="2752320"/>
+            <a:ext cx="7998515" cy="2308324"/>
+          </a:xfrm>
+          <a:prstGeom prst="rect">
+            <a:avLst/>
+          </a:prstGeom>
+          <a:noFill/>
+        </p:spPr>
+        <p:txBody>
+          <a:bodyPr wrap="square" rtlCol="0">
+            <a:spAutoFit/>
+          </a:bodyPr>
+          <a:lstStyle/>
+          <a:p>
+            <a:pPr marL="285750" indent="-285750" algn="l">
+              <a:buFont typeface="Arial" panose="020B0604020202020204" pitchFamily="34" charset="0"/>
+              <a:buChar char="•"/>
+            </a:pPr>
+            <a:r>
+              <a:rPr lang="en-US" b="0" i="0" dirty="0">
+                <a:solidFill>
+                  <a:srgbClr val="1C2B33"/>
+                </a:solidFill>
+                <a:effectLst/>
+                <a:latin typeface="var(--body-font-family)"/>
+              </a:rPr>
+              <a:t>cp is a threshold value (0 ≤ cp &lt; 1).</a:t>
+            </a:r>
+            <a:endParaRPr lang="en-US" b="0" i="0" dirty="0">
+              <a:solidFill>
+                <a:srgbClr val="1C2B33"/>
+              </a:solidFill>
+              <a:effectLst/>
+              <a:latin typeface="Optimistic"/>
+            </a:endParaRPr>
+          </a:p>
+          <a:p>
+            <a:pPr marL="285750" indent="-285750" algn="l">
+              <a:buFont typeface="Arial" panose="020B0604020202020204" pitchFamily="34" charset="0"/>
+              <a:buChar char="•"/>
+            </a:pPr>
+            <a:r>
+              <a:rPr lang="en-US" b="0" i="0" dirty="0">
+                <a:solidFill>
+                  <a:srgbClr val="1C2B33"/>
+                </a:solidFill>
+                <a:effectLst/>
+                <a:latin typeface="var(--body-font-family)"/>
+              </a:rPr>
+              <a:t>The algorithm calculates the improvement in purity (reduction in impurity or increase in accuracy) for each potential split.</a:t>
+            </a:r>
+            <a:endParaRPr lang="en-US" b="0" i="0" dirty="0">
+              <a:solidFill>
+                <a:srgbClr val="1C2B33"/>
+              </a:solidFill>
+              <a:effectLst/>
+              <a:latin typeface="Optimistic"/>
+            </a:endParaRPr>
+          </a:p>
+          <a:p>
+            <a:pPr marL="285750" indent="-285750" algn="l">
+              <a:buFont typeface="Arial" panose="020B0604020202020204" pitchFamily="34" charset="0"/>
+              <a:buChar char="•"/>
+            </a:pPr>
+            <a:r>
+              <a:rPr lang="en-US" b="0" i="0" dirty="0">
+                <a:solidFill>
+                  <a:srgbClr val="1C2B33"/>
+                </a:solidFill>
+                <a:effectLst/>
+                <a:latin typeface="var(--body-font-family)"/>
+              </a:rPr>
+              <a:t>If the improvement is less than cp, the split is not made, and the node becomes a leaf (terminal) node.</a:t>
+            </a:r>
+            <a:endParaRPr lang="en-US" b="0" i="0" dirty="0">
+              <a:solidFill>
+                <a:srgbClr val="1C2B33"/>
+              </a:solidFill>
+              <a:effectLst/>
+              <a:latin typeface="Optimistic"/>
+            </a:endParaRPr>
+          </a:p>
+          <a:p>
+            <a:pPr marL="285750" indent="-285750" algn="l">
+              <a:buFont typeface="Arial" panose="020B0604020202020204" pitchFamily="34" charset="0"/>
+              <a:buChar char="•"/>
+            </a:pPr>
+            <a:r>
+              <a:rPr lang="en-US" b="0" i="0" dirty="0">
+                <a:solidFill>
+                  <a:srgbClr val="1C2B33"/>
+                </a:solidFill>
+                <a:effectLst/>
+                <a:latin typeface="var(--body-font-family)"/>
+              </a:rPr>
+              <a:t>Lower cp values allow for more splits, creating a more complex tree, while higher values result in fewer splits, producing a simpler tree.</a:t>
+            </a:r>
+            <a:endParaRPr lang="en-US" b="0" i="0" dirty="0">
+              <a:solidFill>
+                <a:srgbClr val="1C2B33"/>
+              </a:solidFill>
+              <a:effectLst/>
+              <a:latin typeface="Optimistic"/>
+            </a:endParaRPr>
+          </a:p>
+          <a:p>
+            <a:endParaRPr lang="en-US" dirty="0"/>
           </a:p>
         </p:txBody>
       </p:sp>
@@ -20812,7 +20936,7 @@
           <a:p>
             <a:fld id="{6700A58B-DD98-43D0-B791-721480A02982}" type="datetime1">
               <a:rPr lang="en-US" smtClean="0"/>
-              <a:t>10/21/24</a:t>
+              <a:t>10/30/24</a:t>
             </a:fld>
             <a:endParaRPr lang="en-US"/>
           </a:p>
@@ -21594,7 +21718,7 @@
           <a:p>
             <a:fld id="{6700A58B-DD98-43D0-B791-721480A02982}" type="datetime1">
               <a:rPr lang="en-US" smtClean="0"/>
-              <a:t>10/21/24</a:t>
+              <a:t>10/30/24</a:t>
             </a:fld>
             <a:endParaRPr lang="en-US"/>
           </a:p>
@@ -21813,7 +21937,7 @@
           <a:p>
             <a:fld id="{6700A58B-DD98-43D0-B791-721480A02982}" type="datetime1">
               <a:rPr lang="en-US" smtClean="0"/>
-              <a:t>10/21/24</a:t>
+              <a:t>10/30/24</a:t>
             </a:fld>
             <a:endParaRPr lang="en-US"/>
           </a:p>
@@ -22543,7 +22667,7 @@
           <a:p>
             <a:fld id="{9B19E99B-5349-415A-8E56-8E989211A366}" type="datetime1">
               <a:rPr lang="en-US" smtClean="0"/>
-              <a:t>10/21/24</a:t>
+              <a:t>10/30/24</a:t>
             </a:fld>
             <a:endParaRPr lang="en-US"/>
           </a:p>
@@ -22663,7 +22787,7 @@
           <a:p>
             <a:fld id="{6700A58B-DD98-43D0-B791-721480A02982}" type="datetime1">
               <a:rPr lang="en-US" smtClean="0"/>
-              <a:t>10/21/24</a:t>
+              <a:t>10/30/24</a:t>
             </a:fld>
             <a:endParaRPr lang="en-US"/>
           </a:p>
@@ -22896,7 +23020,7 @@
           <a:p>
             <a:fld id="{6700A58B-DD98-43D0-B791-721480A02982}" type="datetime1">
               <a:rPr lang="en-US" smtClean="0"/>
-              <a:t>10/21/24</a:t>
+              <a:t>10/30/24</a:t>
             </a:fld>
             <a:endParaRPr lang="en-US"/>
           </a:p>
@@ -23109,7 +23233,7 @@
           <a:p>
             <a:fld id="{6700A58B-DD98-43D0-B791-721480A02982}" type="datetime1">
               <a:rPr lang="en-US" smtClean="0"/>
-              <a:t>10/21/24</a:t>
+              <a:t>10/30/24</a:t>
             </a:fld>
             <a:endParaRPr lang="en-US"/>
           </a:p>
@@ -23554,7 +23678,7 @@
           <a:p>
             <a:fld id="{9B19E99B-5349-415A-8E56-8E989211A366}" type="datetime1">
               <a:rPr lang="en-US" smtClean="0"/>
-              <a:t>10/21/24</a:t>
+              <a:t>10/30/24</a:t>
             </a:fld>
             <a:endParaRPr lang="en-US"/>
           </a:p>
@@ -23674,7 +23798,7 @@
           <a:p>
             <a:fld id="{6700A58B-DD98-43D0-B791-721480A02982}" type="datetime1">
               <a:rPr lang="en-US" smtClean="0"/>
-              <a:t>10/21/24</a:t>
+              <a:t>10/30/24</a:t>
             </a:fld>
             <a:endParaRPr lang="en-US"/>
           </a:p>

</xml_diff>